<commit_message>
add slides and ideas for what to cover
</commit_message>
<xml_diff>
--- a/Rundown-of-our-3-months.pptx
+++ b/Rundown-of-our-3-months.pptx
@@ -8,14 +8,19 @@
     <p:sldId id="256" r:id="rId2"/>
     <p:sldId id="257" r:id="rId3"/>
     <p:sldId id="264" r:id="rId4"/>
-    <p:sldId id="258" r:id="rId5"/>
-    <p:sldId id="259" r:id="rId6"/>
+    <p:sldId id="259" r:id="rId5"/>
+    <p:sldId id="258" r:id="rId6"/>
     <p:sldId id="260" r:id="rId7"/>
-    <p:sldId id="261" r:id="rId8"/>
-    <p:sldId id="262" r:id="rId9"/>
-    <p:sldId id="263" r:id="rId10"/>
-    <p:sldId id="265" r:id="rId11"/>
-    <p:sldId id="266" r:id="rId12"/>
+    <p:sldId id="271" r:id="rId8"/>
+    <p:sldId id="261" r:id="rId9"/>
+    <p:sldId id="270" r:id="rId10"/>
+    <p:sldId id="262" r:id="rId11"/>
+    <p:sldId id="267" r:id="rId12"/>
+    <p:sldId id="268" r:id="rId13"/>
+    <p:sldId id="269" r:id="rId14"/>
+    <p:sldId id="263" r:id="rId15"/>
+    <p:sldId id="265" r:id="rId16"/>
+    <p:sldId id="266" r:id="rId17"/>
   </p:sldIdLst>
   <p:sldSz cx="12192000" cy="6858000"/>
   <p:notesSz cx="6858000" cy="9144000"/>
@@ -271,7 +276,7 @@
           <a:p>
             <a:fld id="{A8A86E47-8070-450A-8193-1A64EF17116A}" type="datetimeFigureOut">
               <a:rPr lang="en-GB" smtClean="0"/>
-              <a:t>08/09/2021</a:t>
+              <a:t>14/09/2021</a:t>
             </a:fld>
             <a:endParaRPr lang="en-GB"/>
           </a:p>
@@ -471,7 +476,7 @@
           <a:p>
             <a:fld id="{A8A86E47-8070-450A-8193-1A64EF17116A}" type="datetimeFigureOut">
               <a:rPr lang="en-GB" smtClean="0"/>
-              <a:t>08/09/2021</a:t>
+              <a:t>14/09/2021</a:t>
             </a:fld>
             <a:endParaRPr lang="en-GB"/>
           </a:p>
@@ -681,7 +686,7 @@
           <a:p>
             <a:fld id="{A8A86E47-8070-450A-8193-1A64EF17116A}" type="datetimeFigureOut">
               <a:rPr lang="en-GB" smtClean="0"/>
-              <a:t>08/09/2021</a:t>
+              <a:t>14/09/2021</a:t>
             </a:fld>
             <a:endParaRPr lang="en-GB"/>
           </a:p>
@@ -881,7 +886,7 @@
           <a:p>
             <a:fld id="{A8A86E47-8070-450A-8193-1A64EF17116A}" type="datetimeFigureOut">
               <a:rPr lang="en-GB" smtClean="0"/>
-              <a:t>08/09/2021</a:t>
+              <a:t>14/09/2021</a:t>
             </a:fld>
             <a:endParaRPr lang="en-GB"/>
           </a:p>
@@ -1157,7 +1162,7 @@
           <a:p>
             <a:fld id="{A8A86E47-8070-450A-8193-1A64EF17116A}" type="datetimeFigureOut">
               <a:rPr lang="en-GB" smtClean="0"/>
-              <a:t>08/09/2021</a:t>
+              <a:t>14/09/2021</a:t>
             </a:fld>
             <a:endParaRPr lang="en-GB"/>
           </a:p>
@@ -1425,7 +1430,7 @@
           <a:p>
             <a:fld id="{A8A86E47-8070-450A-8193-1A64EF17116A}" type="datetimeFigureOut">
               <a:rPr lang="en-GB" smtClean="0"/>
-              <a:t>08/09/2021</a:t>
+              <a:t>14/09/2021</a:t>
             </a:fld>
             <a:endParaRPr lang="en-GB"/>
           </a:p>
@@ -1840,7 +1845,7 @@
           <a:p>
             <a:fld id="{A8A86E47-8070-450A-8193-1A64EF17116A}" type="datetimeFigureOut">
               <a:rPr lang="en-GB" smtClean="0"/>
-              <a:t>08/09/2021</a:t>
+              <a:t>14/09/2021</a:t>
             </a:fld>
             <a:endParaRPr lang="en-GB"/>
           </a:p>
@@ -1982,7 +1987,7 @@
           <a:p>
             <a:fld id="{A8A86E47-8070-450A-8193-1A64EF17116A}" type="datetimeFigureOut">
               <a:rPr lang="en-GB" smtClean="0"/>
-              <a:t>08/09/2021</a:t>
+              <a:t>14/09/2021</a:t>
             </a:fld>
             <a:endParaRPr lang="en-GB"/>
           </a:p>
@@ -2095,7 +2100,7 @@
           <a:p>
             <a:fld id="{A8A86E47-8070-450A-8193-1A64EF17116A}" type="datetimeFigureOut">
               <a:rPr lang="en-GB" smtClean="0"/>
-              <a:t>08/09/2021</a:t>
+              <a:t>14/09/2021</a:t>
             </a:fld>
             <a:endParaRPr lang="en-GB"/>
           </a:p>
@@ -2408,7 +2413,7 @@
           <a:p>
             <a:fld id="{A8A86E47-8070-450A-8193-1A64EF17116A}" type="datetimeFigureOut">
               <a:rPr lang="en-GB" smtClean="0"/>
-              <a:t>08/09/2021</a:t>
+              <a:t>14/09/2021</a:t>
             </a:fld>
             <a:endParaRPr lang="en-GB"/>
           </a:p>
@@ -2697,7 +2702,7 @@
           <a:p>
             <a:fld id="{A8A86E47-8070-450A-8193-1A64EF17116A}" type="datetimeFigureOut">
               <a:rPr lang="en-GB" smtClean="0"/>
-              <a:t>08/09/2021</a:t>
+              <a:t>14/09/2021</a:t>
             </a:fld>
             <a:endParaRPr lang="en-GB"/>
           </a:p>
@@ -2940,7 +2945,7 @@
           <a:p>
             <a:fld id="{A8A86E47-8070-450A-8193-1A64EF17116A}" type="datetimeFigureOut">
               <a:rPr lang="en-GB" smtClean="0"/>
-              <a:t>08/09/2021</a:t>
+              <a:t>14/09/2021</a:t>
             </a:fld>
             <a:endParaRPr lang="en-GB"/>
           </a:p>
@@ -3445,6 +3450,515 @@
           <p:cNvPr id="2" name="Title 1">
             <a:extLst>
               <a:ext uri="{FF2B5EF4-FFF2-40B4-BE49-F238E27FC236}">
+                <a16:creationId xmlns:a16="http://schemas.microsoft.com/office/drawing/2014/main" id="{E455D277-9798-4189-ADE6-CFE864E7FC04}"/>
+              </a:ext>
+            </a:extLst>
+          </p:cNvPr>
+          <p:cNvSpPr>
+            <a:spLocks noGrp="1"/>
+          </p:cNvSpPr>
+          <p:nvPr>
+            <p:ph type="title"/>
+          </p:nvPr>
+        </p:nvSpPr>
+        <p:spPr/>
+        <p:txBody>
+          <a:bodyPr>
+            <a:normAutofit fontScale="90000"/>
+          </a:bodyPr>
+          <a:lstStyle/>
+          <a:p>
+            <a:r>
+              <a:rPr lang="en-GB" dirty="0"/>
+              <a:t>Created Meta Feature scripts</a:t>
+            </a:r>
+            <a:br>
+              <a:rPr lang="en-GB" dirty="0"/>
+            </a:br>
+            <a:br>
+              <a:rPr lang="en-GB" dirty="0"/>
+            </a:br>
+            <a:endParaRPr lang="en-GB" dirty="0"/>
+          </a:p>
+        </p:txBody>
+      </p:sp>
+      <p:sp>
+        <p:nvSpPr>
+          <p:cNvPr id="3" name="Content Placeholder 2">
+            <a:extLst>
+              <a:ext uri="{FF2B5EF4-FFF2-40B4-BE49-F238E27FC236}">
+                <a16:creationId xmlns:a16="http://schemas.microsoft.com/office/drawing/2014/main" id="{D81FC45E-0E9D-45F6-A004-DE5773D8D3A0}"/>
+              </a:ext>
+            </a:extLst>
+          </p:cNvPr>
+          <p:cNvSpPr>
+            <a:spLocks noGrp="1"/>
+          </p:cNvSpPr>
+          <p:nvPr>
+            <p:ph idx="1"/>
+          </p:nvPr>
+        </p:nvSpPr>
+        <p:spPr/>
+        <p:txBody>
+          <a:bodyPr/>
+          <a:lstStyle/>
+          <a:p>
+            <a:r>
+              <a:rPr lang="en-GB" dirty="0"/>
+              <a:t>Codon pairs </a:t>
+            </a:r>
+          </a:p>
+          <a:p>
+            <a:r>
+              <a:rPr lang="en-GB" dirty="0"/>
+              <a:t>Single codons </a:t>
+            </a:r>
+          </a:p>
+          <a:p>
+            <a:r>
+              <a:rPr lang="en-GB" dirty="0"/>
+              <a:t>Nucleotides</a:t>
+            </a:r>
+          </a:p>
+        </p:txBody>
+      </p:sp>
+    </p:spTree>
+    <p:extLst>
+      <p:ext uri="{BB962C8B-B14F-4D97-AF65-F5344CB8AC3E}">
+        <p14:creationId xmlns:p14="http://schemas.microsoft.com/office/powerpoint/2010/main" val="1549034550"/>
+      </p:ext>
+    </p:extLst>
+  </p:cSld>
+  <p:clrMapOvr>
+    <a:masterClrMapping/>
+  </p:clrMapOvr>
+</p:sld>
+</file>
+
+<file path=ppt/slides/slide11.xml><?xml version="1.0" encoding="utf-8"?>
+<p:sld xmlns:a="http://schemas.openxmlformats.org/drawingml/2006/main" xmlns:r="http://schemas.openxmlformats.org/officeDocument/2006/relationships" xmlns:p="http://schemas.openxmlformats.org/presentationml/2006/main">
+  <p:cSld>
+    <p:spTree>
+      <p:nvGrpSpPr>
+        <p:cNvPr id="1" name=""/>
+        <p:cNvGrpSpPr/>
+        <p:nvPr/>
+      </p:nvGrpSpPr>
+      <p:grpSpPr>
+        <a:xfrm>
+          <a:off x="0" y="0"/>
+          <a:ext cx="0" cy="0"/>
+          <a:chOff x="0" y="0"/>
+          <a:chExt cx="0" cy="0"/>
+        </a:xfrm>
+      </p:grpSpPr>
+      <p:sp>
+        <p:nvSpPr>
+          <p:cNvPr id="2" name="Title 1">
+            <a:extLst>
+              <a:ext uri="{FF2B5EF4-FFF2-40B4-BE49-F238E27FC236}">
+                <a16:creationId xmlns:a16="http://schemas.microsoft.com/office/drawing/2014/main" id="{0403F2E7-FE84-42C8-8A2C-352CEE44966B}"/>
+              </a:ext>
+            </a:extLst>
+          </p:cNvPr>
+          <p:cNvSpPr>
+            <a:spLocks noGrp="1"/>
+          </p:cNvSpPr>
+          <p:nvPr>
+            <p:ph type="title"/>
+          </p:nvPr>
+        </p:nvSpPr>
+        <p:spPr/>
+        <p:txBody>
+          <a:bodyPr/>
+          <a:lstStyle/>
+          <a:p>
+            <a:r>
+              <a:rPr lang="en-GB" dirty="0"/>
+              <a:t>Codon pairs – why, how does it work</a:t>
+            </a:r>
+            <a:br>
+              <a:rPr lang="en-GB" dirty="0"/>
+            </a:br>
+            <a:endParaRPr lang="en-GB" dirty="0"/>
+          </a:p>
+        </p:txBody>
+      </p:sp>
+      <p:sp>
+        <p:nvSpPr>
+          <p:cNvPr id="3" name="Content Placeholder 2">
+            <a:extLst>
+              <a:ext uri="{FF2B5EF4-FFF2-40B4-BE49-F238E27FC236}">
+                <a16:creationId xmlns:a16="http://schemas.microsoft.com/office/drawing/2014/main" id="{75BE0852-4FA5-4A4E-A9C2-FC680D756790}"/>
+              </a:ext>
+            </a:extLst>
+          </p:cNvPr>
+          <p:cNvSpPr>
+            <a:spLocks noGrp="1"/>
+          </p:cNvSpPr>
+          <p:nvPr>
+            <p:ph idx="1"/>
+          </p:nvPr>
+        </p:nvSpPr>
+        <p:spPr/>
+        <p:txBody>
+          <a:bodyPr/>
+          <a:lstStyle/>
+          <a:p>
+            <a:endParaRPr lang="en-GB"/>
+          </a:p>
+        </p:txBody>
+      </p:sp>
+    </p:spTree>
+    <p:extLst>
+      <p:ext uri="{BB962C8B-B14F-4D97-AF65-F5344CB8AC3E}">
+        <p14:creationId xmlns:p14="http://schemas.microsoft.com/office/powerpoint/2010/main" val="4039405834"/>
+      </p:ext>
+    </p:extLst>
+  </p:cSld>
+  <p:clrMapOvr>
+    <a:masterClrMapping/>
+  </p:clrMapOvr>
+</p:sld>
+</file>
+
+<file path=ppt/slides/slide12.xml><?xml version="1.0" encoding="utf-8"?>
+<p:sld xmlns:a="http://schemas.openxmlformats.org/drawingml/2006/main" xmlns:r="http://schemas.openxmlformats.org/officeDocument/2006/relationships" xmlns:p="http://schemas.openxmlformats.org/presentationml/2006/main">
+  <p:cSld>
+    <p:spTree>
+      <p:nvGrpSpPr>
+        <p:cNvPr id="1" name=""/>
+        <p:cNvGrpSpPr/>
+        <p:nvPr/>
+      </p:nvGrpSpPr>
+      <p:grpSpPr>
+        <a:xfrm>
+          <a:off x="0" y="0"/>
+          <a:ext cx="0" cy="0"/>
+          <a:chOff x="0" y="0"/>
+          <a:chExt cx="0" cy="0"/>
+        </a:xfrm>
+      </p:grpSpPr>
+      <p:sp>
+        <p:nvSpPr>
+          <p:cNvPr id="2" name="Title 1">
+            <a:extLst>
+              <a:ext uri="{FF2B5EF4-FFF2-40B4-BE49-F238E27FC236}">
+                <a16:creationId xmlns:a16="http://schemas.microsoft.com/office/drawing/2014/main" id="{565200E1-D110-4281-91EB-14B2141C87DB}"/>
+              </a:ext>
+            </a:extLst>
+          </p:cNvPr>
+          <p:cNvSpPr>
+            <a:spLocks noGrp="1"/>
+          </p:cNvSpPr>
+          <p:nvPr>
+            <p:ph type="title"/>
+          </p:nvPr>
+        </p:nvSpPr>
+        <p:spPr/>
+        <p:txBody>
+          <a:bodyPr>
+            <a:normAutofit fontScale="90000"/>
+          </a:bodyPr>
+          <a:lstStyle/>
+          <a:p>
+            <a:r>
+              <a:rPr lang="en-GB" dirty="0"/>
+              <a:t>Single codons – why, how does it work, outputs</a:t>
+            </a:r>
+            <a:br>
+              <a:rPr lang="en-GB" dirty="0"/>
+            </a:br>
+            <a:endParaRPr lang="en-GB" dirty="0"/>
+          </a:p>
+        </p:txBody>
+      </p:sp>
+      <p:sp>
+        <p:nvSpPr>
+          <p:cNvPr id="3" name="Content Placeholder 2">
+            <a:extLst>
+              <a:ext uri="{FF2B5EF4-FFF2-40B4-BE49-F238E27FC236}">
+                <a16:creationId xmlns:a16="http://schemas.microsoft.com/office/drawing/2014/main" id="{3BE85511-19BB-47D8-8F60-120F887A7460}"/>
+              </a:ext>
+            </a:extLst>
+          </p:cNvPr>
+          <p:cNvSpPr>
+            <a:spLocks noGrp="1"/>
+          </p:cNvSpPr>
+          <p:nvPr>
+            <p:ph idx="1"/>
+          </p:nvPr>
+        </p:nvSpPr>
+        <p:spPr/>
+        <p:txBody>
+          <a:bodyPr/>
+          <a:lstStyle/>
+          <a:p>
+            <a:endParaRPr lang="en-GB"/>
+          </a:p>
+        </p:txBody>
+      </p:sp>
+    </p:spTree>
+    <p:extLst>
+      <p:ext uri="{BB962C8B-B14F-4D97-AF65-F5344CB8AC3E}">
+        <p14:creationId xmlns:p14="http://schemas.microsoft.com/office/powerpoint/2010/main" val="152534160"/>
+      </p:ext>
+    </p:extLst>
+  </p:cSld>
+  <p:clrMapOvr>
+    <a:masterClrMapping/>
+  </p:clrMapOvr>
+</p:sld>
+</file>
+
+<file path=ppt/slides/slide13.xml><?xml version="1.0" encoding="utf-8"?>
+<p:sld xmlns:a="http://schemas.openxmlformats.org/drawingml/2006/main" xmlns:r="http://schemas.openxmlformats.org/officeDocument/2006/relationships" xmlns:p="http://schemas.openxmlformats.org/presentationml/2006/main">
+  <p:cSld>
+    <p:spTree>
+      <p:nvGrpSpPr>
+        <p:cNvPr id="1" name=""/>
+        <p:cNvGrpSpPr/>
+        <p:nvPr/>
+      </p:nvGrpSpPr>
+      <p:grpSpPr>
+        <a:xfrm>
+          <a:off x="0" y="0"/>
+          <a:ext cx="0" cy="0"/>
+          <a:chOff x="0" y="0"/>
+          <a:chExt cx="0" cy="0"/>
+        </a:xfrm>
+      </p:grpSpPr>
+      <p:sp>
+        <p:nvSpPr>
+          <p:cNvPr id="2" name="Title 1">
+            <a:extLst>
+              <a:ext uri="{FF2B5EF4-FFF2-40B4-BE49-F238E27FC236}">
+                <a16:creationId xmlns:a16="http://schemas.microsoft.com/office/drawing/2014/main" id="{5E05A194-24EC-4C63-805F-C1BE5CED12BF}"/>
+              </a:ext>
+            </a:extLst>
+          </p:cNvPr>
+          <p:cNvSpPr>
+            <a:spLocks noGrp="1"/>
+          </p:cNvSpPr>
+          <p:nvPr>
+            <p:ph type="title"/>
+          </p:nvPr>
+        </p:nvSpPr>
+        <p:spPr/>
+        <p:txBody>
+          <a:bodyPr/>
+          <a:lstStyle/>
+          <a:p>
+            <a:r>
+              <a:rPr lang="en-GB" dirty="0"/>
+              <a:t>Nucleotides – why, how does it work </a:t>
+            </a:r>
+            <a:br>
+              <a:rPr lang="en-GB" dirty="0"/>
+            </a:br>
+            <a:endParaRPr lang="en-GB" dirty="0"/>
+          </a:p>
+        </p:txBody>
+      </p:sp>
+      <p:sp>
+        <p:nvSpPr>
+          <p:cNvPr id="3" name="Content Placeholder 2">
+            <a:extLst>
+              <a:ext uri="{FF2B5EF4-FFF2-40B4-BE49-F238E27FC236}">
+                <a16:creationId xmlns:a16="http://schemas.microsoft.com/office/drawing/2014/main" id="{58E41B35-1F9F-4F11-8690-3332DE72D0CC}"/>
+              </a:ext>
+            </a:extLst>
+          </p:cNvPr>
+          <p:cNvSpPr>
+            <a:spLocks noGrp="1"/>
+          </p:cNvSpPr>
+          <p:nvPr>
+            <p:ph idx="1"/>
+          </p:nvPr>
+        </p:nvSpPr>
+        <p:spPr/>
+        <p:txBody>
+          <a:bodyPr/>
+          <a:lstStyle/>
+          <a:p>
+            <a:endParaRPr lang="en-GB"/>
+          </a:p>
+        </p:txBody>
+      </p:sp>
+    </p:spTree>
+    <p:extLst>
+      <p:ext uri="{BB962C8B-B14F-4D97-AF65-F5344CB8AC3E}">
+        <p14:creationId xmlns:p14="http://schemas.microsoft.com/office/powerpoint/2010/main" val="1239354963"/>
+      </p:ext>
+    </p:extLst>
+  </p:cSld>
+  <p:clrMapOvr>
+    <a:masterClrMapping/>
+  </p:clrMapOvr>
+</p:sld>
+</file>
+
+<file path=ppt/slides/slide14.xml><?xml version="1.0" encoding="utf-8"?>
+<p:sld xmlns:a="http://schemas.openxmlformats.org/drawingml/2006/main" xmlns:r="http://schemas.openxmlformats.org/officeDocument/2006/relationships" xmlns:p="http://schemas.openxmlformats.org/presentationml/2006/main">
+  <p:cSld>
+    <p:spTree>
+      <p:nvGrpSpPr>
+        <p:cNvPr id="1" name=""/>
+        <p:cNvGrpSpPr/>
+        <p:nvPr/>
+      </p:nvGrpSpPr>
+      <p:grpSpPr>
+        <a:xfrm>
+          <a:off x="0" y="0"/>
+          <a:ext cx="0" cy="0"/>
+          <a:chOff x="0" y="0"/>
+          <a:chExt cx="0" cy="0"/>
+        </a:xfrm>
+      </p:grpSpPr>
+      <p:sp>
+        <p:nvSpPr>
+          <p:cNvPr id="2" name="Title 1">
+            <a:extLst>
+              <a:ext uri="{FF2B5EF4-FFF2-40B4-BE49-F238E27FC236}">
+                <a16:creationId xmlns:a16="http://schemas.microsoft.com/office/drawing/2014/main" id="{CD84C0C1-70FE-4FCE-A9C9-6C783AE5BCA2}"/>
+              </a:ext>
+            </a:extLst>
+          </p:cNvPr>
+          <p:cNvSpPr>
+            <a:spLocks noGrp="1"/>
+          </p:cNvSpPr>
+          <p:nvPr>
+            <p:ph type="title"/>
+          </p:nvPr>
+        </p:nvSpPr>
+        <p:spPr/>
+        <p:txBody>
+          <a:bodyPr/>
+          <a:lstStyle/>
+          <a:p>
+            <a:r>
+              <a:rPr lang="en-GB" dirty="0"/>
+              <a:t>Next steps</a:t>
+            </a:r>
+          </a:p>
+        </p:txBody>
+      </p:sp>
+      <p:sp>
+        <p:nvSpPr>
+          <p:cNvPr id="3" name="Content Placeholder 2">
+            <a:extLst>
+              <a:ext uri="{FF2B5EF4-FFF2-40B4-BE49-F238E27FC236}">
+                <a16:creationId xmlns:a16="http://schemas.microsoft.com/office/drawing/2014/main" id="{EAAC464D-CD24-4F20-B9E8-DE256CD69653}"/>
+              </a:ext>
+            </a:extLst>
+          </p:cNvPr>
+          <p:cNvSpPr>
+            <a:spLocks noGrp="1"/>
+          </p:cNvSpPr>
+          <p:nvPr>
+            <p:ph idx="1"/>
+          </p:nvPr>
+        </p:nvSpPr>
+        <p:spPr/>
+        <p:txBody>
+          <a:bodyPr/>
+          <a:lstStyle/>
+          <a:p>
+            <a:r>
+              <a:rPr lang="en-GB" dirty="0"/>
+              <a:t>Test on datasets – reconfirm results from </a:t>
+            </a:r>
+            <a:r>
+              <a:rPr lang="en-GB" b="0" i="0" dirty="0">
+                <a:solidFill>
+                  <a:srgbClr val="24292F"/>
+                </a:solidFill>
+                <a:effectLst/>
+                <a:latin typeface="-apple-system"/>
+              </a:rPr>
+              <a:t>Gamble et al., 2016 </a:t>
+            </a:r>
+            <a:endParaRPr lang="en-GB" dirty="0"/>
+          </a:p>
+          <a:p>
+            <a:r>
+              <a:rPr lang="en-GB" dirty="0"/>
+              <a:t>Add functionality to identify feature locations for </a:t>
+            </a:r>
+            <a:r>
+              <a:rPr lang="en-GB" dirty="0" err="1"/>
+              <a:t>nt</a:t>
+            </a:r>
+            <a:r>
+              <a:rPr lang="en-GB" dirty="0"/>
+              <a:t> </a:t>
+            </a:r>
+            <a:r>
+              <a:rPr lang="en-GB" dirty="0" err="1"/>
+              <a:t>metafeature</a:t>
+            </a:r>
+            <a:r>
+              <a:rPr lang="en-GB" dirty="0"/>
+              <a:t> script</a:t>
+            </a:r>
+          </a:p>
+          <a:p>
+            <a:pPr lvl="1">
+              <a:buFontTx/>
+              <a:buChar char="-"/>
+            </a:pPr>
+            <a:r>
+              <a:rPr lang="en-GB" dirty="0"/>
+              <a:t>Codons and Codon pairs would likely be easy</a:t>
+            </a:r>
+          </a:p>
+          <a:p>
+            <a:pPr lvl="1">
+              <a:buFontTx/>
+              <a:buChar char="-"/>
+            </a:pPr>
+            <a:r>
+              <a:rPr lang="en-GB" dirty="0"/>
+              <a:t>Is there a tool or protein database that can identify positions of secondary structural features? Can this data be downloaded for each gene? Will the names be compatible? Ligand binding positions?</a:t>
+            </a:r>
+          </a:p>
+        </p:txBody>
+      </p:sp>
+    </p:spTree>
+    <p:extLst>
+      <p:ext uri="{BB962C8B-B14F-4D97-AF65-F5344CB8AC3E}">
+        <p14:creationId xmlns:p14="http://schemas.microsoft.com/office/powerpoint/2010/main" val="1511006915"/>
+      </p:ext>
+    </p:extLst>
+  </p:cSld>
+  <p:clrMapOvr>
+    <a:masterClrMapping/>
+  </p:clrMapOvr>
+</p:sld>
+</file>
+
+<file path=ppt/slides/slide15.xml><?xml version="1.0" encoding="utf-8"?>
+<p:sld xmlns:a="http://schemas.openxmlformats.org/drawingml/2006/main" xmlns:r="http://schemas.openxmlformats.org/officeDocument/2006/relationships" xmlns:p="http://schemas.openxmlformats.org/presentationml/2006/main">
+  <p:cSld>
+    <p:spTree>
+      <p:nvGrpSpPr>
+        <p:cNvPr id="1" name=""/>
+        <p:cNvGrpSpPr/>
+        <p:nvPr/>
+      </p:nvGrpSpPr>
+      <p:grpSpPr>
+        <a:xfrm>
+          <a:off x="0" y="0"/>
+          <a:ext cx="0" cy="0"/>
+          <a:chOff x="0" y="0"/>
+          <a:chExt cx="0" cy="0"/>
+        </a:xfrm>
+      </p:grpSpPr>
+      <p:sp>
+        <p:nvSpPr>
+          <p:cNvPr id="2" name="Title 1">
+            <a:extLst>
+              <a:ext uri="{FF2B5EF4-FFF2-40B4-BE49-F238E27FC236}">
                 <a16:creationId xmlns:a16="http://schemas.microsoft.com/office/drawing/2014/main" id="{ACDBBFD3-C77D-42BD-9492-20B5B068356F}"/>
               </a:ext>
             </a:extLst>
@@ -3489,7 +4003,42 @@
           <a:bodyPr/>
           <a:lstStyle/>
           <a:p>
-            <a:endParaRPr lang="en-GB"/>
+            <a:r>
+              <a:rPr lang="en-GB" dirty="0"/>
+              <a:t>Collaboration - prioritise tasks that aid the team</a:t>
+            </a:r>
+          </a:p>
+          <a:p>
+            <a:r>
+              <a:rPr lang="en-GB" dirty="0"/>
+              <a:t>Communication – better updates on </a:t>
+            </a:r>
+            <a:r>
+              <a:rPr lang="en-GB" dirty="0" err="1"/>
+              <a:t>Github</a:t>
+            </a:r>
+            <a:r>
+              <a:rPr lang="en-GB" dirty="0"/>
+              <a:t> and clearer comments in code</a:t>
+            </a:r>
+          </a:p>
+          <a:p>
+            <a:r>
+              <a:rPr lang="en-GB" dirty="0"/>
+              <a:t>Insights into the process of writing papers</a:t>
+            </a:r>
+          </a:p>
+          <a:p>
+            <a:r>
+              <a:rPr lang="en-GB" dirty="0"/>
+              <a:t>Insights into software development and maintenance </a:t>
+            </a:r>
+          </a:p>
+          <a:p>
+            <a:r>
+              <a:rPr lang="en-GB" dirty="0"/>
+              <a:t>Greatly improved the quality of code we write</a:t>
+            </a:r>
           </a:p>
         </p:txBody>
       </p:sp>
@@ -3506,7 +4055,7 @@
 </p:sld>
 </file>
 
-<file path=ppt/slides/slide11.xml><?xml version="1.0" encoding="utf-8"?>
+<file path=ppt/slides/slide16.xml><?xml version="1.0" encoding="utf-8"?>
 <p:sld xmlns:a="http://schemas.openxmlformats.org/drawingml/2006/main" xmlns:r="http://schemas.openxmlformats.org/officeDocument/2006/relationships" xmlns:p="http://schemas.openxmlformats.org/presentationml/2006/main">
   <p:cSld>
     <p:spTree>
@@ -3777,7 +4326,16 @@
           <a:bodyPr/>
           <a:lstStyle/>
           <a:p>
-            <a:endParaRPr lang="en-GB"/>
+            <a:r>
+              <a:rPr lang="en-GB" dirty="0"/>
+              <a:t>Codon pairs and single codon, what was the goal. What state was it in. structural overview.</a:t>
+            </a:r>
+          </a:p>
+          <a:p>
+            <a:r>
+              <a:rPr lang="en-GB" dirty="0"/>
+              <a:t>Reads on transcript code, working but very specific to my working environment. </a:t>
+            </a:r>
           </a:p>
         </p:txBody>
       </p:sp>
@@ -3816,7 +4374,7 @@
           <p:cNvPr id="2" name="Title 1">
             <a:extLst>
               <a:ext uri="{FF2B5EF4-FFF2-40B4-BE49-F238E27FC236}">
-                <a16:creationId xmlns:a16="http://schemas.microsoft.com/office/drawing/2014/main" id="{20324965-0545-49CE-894A-21E86C1EBACB}"/>
+                <a16:creationId xmlns:a16="http://schemas.microsoft.com/office/drawing/2014/main" id="{055803BC-51C4-4C3C-99A5-CA6D6DAD8C49}"/>
               </a:ext>
             </a:extLst>
           </p:cNvPr>
@@ -3834,7 +4392,7 @@
           <a:p>
             <a:r>
               <a:rPr lang="en-GB" dirty="0"/>
-              <a:t>Added documentation </a:t>
+              <a:t>Upgraded configs </a:t>
             </a:r>
             <a:br>
               <a:rPr lang="en-GB" dirty="0"/>
@@ -3848,7 +4406,7 @@
           <p:cNvPr id="3" name="Content Placeholder 2">
             <a:extLst>
               <a:ext uri="{FF2B5EF4-FFF2-40B4-BE49-F238E27FC236}">
-                <a16:creationId xmlns:a16="http://schemas.microsoft.com/office/drawing/2014/main" id="{5BD7134B-6661-495B-B903-1320D4A1FC10}"/>
+                <a16:creationId xmlns:a16="http://schemas.microsoft.com/office/drawing/2014/main" id="{3BF16494-9607-4D36-955B-10EF2353144D}"/>
               </a:ext>
             </a:extLst>
           </p:cNvPr>
@@ -3864,14 +4422,14 @@
           <a:bodyPr/>
           <a:lstStyle/>
           <a:p>
-            <a:endParaRPr lang="en-GB"/>
+            <a:endParaRPr lang="en-GB" dirty="0"/>
           </a:p>
         </p:txBody>
       </p:sp>
     </p:spTree>
     <p:extLst>
       <p:ext uri="{BB962C8B-B14F-4D97-AF65-F5344CB8AC3E}">
-        <p14:creationId xmlns:p14="http://schemas.microsoft.com/office/powerpoint/2010/main" val="684084646"/>
+        <p14:creationId xmlns:p14="http://schemas.microsoft.com/office/powerpoint/2010/main" val="4031218689"/>
       </p:ext>
     </p:extLst>
   </p:cSld>
@@ -3903,7 +4461,7 @@
           <p:cNvPr id="2" name="Title 1">
             <a:extLst>
               <a:ext uri="{FF2B5EF4-FFF2-40B4-BE49-F238E27FC236}">
-                <a16:creationId xmlns:a16="http://schemas.microsoft.com/office/drawing/2014/main" id="{055803BC-51C4-4C3C-99A5-CA6D6DAD8C49}"/>
+                <a16:creationId xmlns:a16="http://schemas.microsoft.com/office/drawing/2014/main" id="{20324965-0545-49CE-894A-21E86C1EBACB}"/>
               </a:ext>
             </a:extLst>
           </p:cNvPr>
@@ -3921,7 +4479,7 @@
           <a:p>
             <a:r>
               <a:rPr lang="en-GB" dirty="0"/>
-              <a:t>Upgraded configs </a:t>
+              <a:t>Added documentation </a:t>
             </a:r>
             <a:br>
               <a:rPr lang="en-GB" dirty="0"/>
@@ -3935,7 +4493,7 @@
           <p:cNvPr id="3" name="Content Placeholder 2">
             <a:extLst>
               <a:ext uri="{FF2B5EF4-FFF2-40B4-BE49-F238E27FC236}">
-                <a16:creationId xmlns:a16="http://schemas.microsoft.com/office/drawing/2014/main" id="{3BF16494-9607-4D36-955B-10EF2353144D}"/>
+                <a16:creationId xmlns:a16="http://schemas.microsoft.com/office/drawing/2014/main" id="{5BD7134B-6661-495B-B903-1320D4A1FC10}"/>
               </a:ext>
             </a:extLst>
           </p:cNvPr>
@@ -3951,14 +4509,23 @@
           <a:bodyPr/>
           <a:lstStyle/>
           <a:p>
-            <a:endParaRPr lang="en-GB"/>
+            <a:r>
+              <a:rPr lang="en-GB" dirty="0"/>
+              <a:t>How to add new datasets and species </a:t>
+            </a:r>
+          </a:p>
+          <a:p>
+            <a:r>
+              <a:rPr lang="en-GB" dirty="0"/>
+              <a:t>Added checklist for issue tickets</a:t>
+            </a:r>
           </a:p>
         </p:txBody>
       </p:sp>
     </p:spTree>
     <p:extLst>
       <p:ext uri="{BB962C8B-B14F-4D97-AF65-F5344CB8AC3E}">
-        <p14:creationId xmlns:p14="http://schemas.microsoft.com/office/powerpoint/2010/main" val="4031218689"/>
+        <p14:creationId xmlns:p14="http://schemas.microsoft.com/office/powerpoint/2010/main" val="684084646"/>
       </p:ext>
     </p:extLst>
   </p:cSld>
@@ -4038,7 +4605,28 @@
           <a:bodyPr/>
           <a:lstStyle/>
           <a:p>
-            <a:endParaRPr lang="en-GB"/>
+            <a:r>
+              <a:rPr lang="en-GB" dirty="0"/>
+              <a:t>Follow documentation on adding new species</a:t>
+            </a:r>
+          </a:p>
+          <a:p>
+            <a:r>
+              <a:rPr lang="en-GB" dirty="0"/>
+              <a:t>Why Histoplasma?</a:t>
+            </a:r>
+          </a:p>
+          <a:p>
+            <a:r>
+              <a:rPr lang="en-GB" dirty="0"/>
+              <a:t>Why creating annotations is difficult </a:t>
+            </a:r>
+          </a:p>
+          <a:p>
+            <a:r>
+              <a:rPr lang="en-GB" dirty="0"/>
+              <a:t>It is running </a:t>
+            </a:r>
           </a:p>
         </p:txBody>
       </p:sp>
@@ -4077,7 +4665,7 @@
           <p:cNvPr id="2" name="Title 1">
             <a:extLst>
               <a:ext uri="{FF2B5EF4-FFF2-40B4-BE49-F238E27FC236}">
-                <a16:creationId xmlns:a16="http://schemas.microsoft.com/office/drawing/2014/main" id="{9A527122-FD1E-44F0-A291-B52CE28FD4EE}"/>
+                <a16:creationId xmlns:a16="http://schemas.microsoft.com/office/drawing/2014/main" id="{D281E82F-E4F2-4E0A-A0AC-CBA9345C4BB1}"/>
               </a:ext>
             </a:extLst>
           </p:cNvPr>
@@ -4095,12 +4683,8 @@
           <a:p>
             <a:r>
               <a:rPr lang="en-GB" dirty="0"/>
-              <a:t>Updated file names</a:t>
-            </a:r>
-            <a:br>
-              <a:rPr lang="en-GB" dirty="0"/>
-            </a:br>
-            <a:endParaRPr lang="en-GB" dirty="0"/>
+              <a:t>Outputs of new dataset, things to look out for in the future</a:t>
+            </a:r>
           </a:p>
         </p:txBody>
       </p:sp>
@@ -4109,7 +4693,7 @@
           <p:cNvPr id="3" name="Content Placeholder 2">
             <a:extLst>
               <a:ext uri="{FF2B5EF4-FFF2-40B4-BE49-F238E27FC236}">
-                <a16:creationId xmlns:a16="http://schemas.microsoft.com/office/drawing/2014/main" id="{D3C9DAAC-F038-46B9-8D60-C17184E83EB9}"/>
+                <a16:creationId xmlns:a16="http://schemas.microsoft.com/office/drawing/2014/main" id="{06F23BC0-8D74-45C5-8548-A06B8F5EABCA}"/>
               </a:ext>
             </a:extLst>
           </p:cNvPr>
@@ -4125,14 +4709,21 @@
           <a:bodyPr/>
           <a:lstStyle/>
           <a:p>
-            <a:endParaRPr lang="en-GB"/>
+            <a:r>
+              <a:rPr lang="en-GB" dirty="0"/>
+              <a:t>Potentially due to poor annotation, a noncoding sequence is slipping into the final results. Overall there is good periodicity, so potential to analyse in </a:t>
+            </a:r>
+            <a:r>
+              <a:rPr lang="en-GB"/>
+              <a:t>the future</a:t>
+            </a:r>
           </a:p>
         </p:txBody>
       </p:sp>
     </p:spTree>
     <p:extLst>
       <p:ext uri="{BB962C8B-B14F-4D97-AF65-F5344CB8AC3E}">
-        <p14:creationId xmlns:p14="http://schemas.microsoft.com/office/powerpoint/2010/main" val="2809813518"/>
+        <p14:creationId xmlns:p14="http://schemas.microsoft.com/office/powerpoint/2010/main" val="2745679726"/>
       </p:ext>
     </p:extLst>
   </p:cSld>
@@ -4164,7 +4755,7 @@
           <p:cNvPr id="2" name="Title 1">
             <a:extLst>
               <a:ext uri="{FF2B5EF4-FFF2-40B4-BE49-F238E27FC236}">
-                <a16:creationId xmlns:a16="http://schemas.microsoft.com/office/drawing/2014/main" id="{E455D277-9798-4189-ADE6-CFE864E7FC04}"/>
+                <a16:creationId xmlns:a16="http://schemas.microsoft.com/office/drawing/2014/main" id="{9A527122-FD1E-44F0-A291-B52CE28FD4EE}"/>
               </a:ext>
             </a:extLst>
           </p:cNvPr>
@@ -4177,18 +4768,13 @@
         </p:nvSpPr>
         <p:spPr/>
         <p:txBody>
-          <a:bodyPr>
-            <a:normAutofit fontScale="90000"/>
-          </a:bodyPr>
-          <a:lstStyle/>
-          <a:p>
-            <a:r>
-              <a:rPr lang="en-GB" dirty="0"/>
-              <a:t>Created Meta Feature scripts</a:t>
-            </a:r>
-            <a:br>
-              <a:rPr lang="en-GB" dirty="0"/>
-            </a:br>
+          <a:bodyPr/>
+          <a:lstStyle/>
+          <a:p>
+            <a:r>
+              <a:rPr lang="en-GB" dirty="0"/>
+              <a:t>Updated file names</a:t>
+            </a:r>
             <a:br>
               <a:rPr lang="en-GB" dirty="0"/>
             </a:br>
@@ -4201,7 +4787,7 @@
           <p:cNvPr id="3" name="Content Placeholder 2">
             <a:extLst>
               <a:ext uri="{FF2B5EF4-FFF2-40B4-BE49-F238E27FC236}">
-                <a16:creationId xmlns:a16="http://schemas.microsoft.com/office/drawing/2014/main" id="{D81FC45E-0E9D-45F6-A004-DE5773D8D3A0}"/>
+                <a16:creationId xmlns:a16="http://schemas.microsoft.com/office/drawing/2014/main" id="{D3C9DAAC-F038-46B9-8D60-C17184E83EB9}"/>
               </a:ext>
             </a:extLst>
           </p:cNvPr>
@@ -4217,14 +4803,17 @@
           <a:bodyPr/>
           <a:lstStyle/>
           <a:p>
-            <a:endParaRPr lang="en-GB"/>
+            <a:r>
+              <a:rPr lang="en-GB" dirty="0"/>
+              <a:t>To meet reviewers feedback, some of the confusing names had to be addressed. Pretty tedious work, as numerous files but I got my way through it.</a:t>
+            </a:r>
           </a:p>
         </p:txBody>
       </p:sp>
     </p:spTree>
     <p:extLst>
       <p:ext uri="{BB962C8B-B14F-4D97-AF65-F5344CB8AC3E}">
-        <p14:creationId xmlns:p14="http://schemas.microsoft.com/office/powerpoint/2010/main" val="1549034550"/>
+        <p14:creationId xmlns:p14="http://schemas.microsoft.com/office/powerpoint/2010/main" val="2809813518"/>
       </p:ext>
     </p:extLst>
   </p:cSld>
@@ -4256,7 +4845,7 @@
           <p:cNvPr id="2" name="Title 1">
             <a:extLst>
               <a:ext uri="{FF2B5EF4-FFF2-40B4-BE49-F238E27FC236}">
-                <a16:creationId xmlns:a16="http://schemas.microsoft.com/office/drawing/2014/main" id="{CD84C0C1-70FE-4FCE-A9C9-6C783AE5BCA2}"/>
+                <a16:creationId xmlns:a16="http://schemas.microsoft.com/office/drawing/2014/main" id="{768123CA-D61B-44BA-9D9D-7F183FEF3504}"/>
               </a:ext>
             </a:extLst>
           </p:cNvPr>
@@ -4274,7 +4863,7 @@
           <a:p>
             <a:r>
               <a:rPr lang="en-GB" dirty="0"/>
-              <a:t>Next steps</a:t>
+              <a:t>Article writing </a:t>
             </a:r>
           </a:p>
         </p:txBody>
@@ -4284,7 +4873,7 @@
           <p:cNvPr id="3" name="Content Placeholder 2">
             <a:extLst>
               <a:ext uri="{FF2B5EF4-FFF2-40B4-BE49-F238E27FC236}">
-                <a16:creationId xmlns:a16="http://schemas.microsoft.com/office/drawing/2014/main" id="{EAAC464D-CD24-4F20-B9E8-DE256CD69653}"/>
+                <a16:creationId xmlns:a16="http://schemas.microsoft.com/office/drawing/2014/main" id="{17C7A492-2281-44D7-B49A-CB647A365F75}"/>
               </a:ext>
             </a:extLst>
           </p:cNvPr>
@@ -4302,60 +4891,19 @@
           <a:p>
             <a:r>
               <a:rPr lang="en-GB" dirty="0"/>
-              <a:t>Test on datasets – reconfirm results from </a:t>
-            </a:r>
-            <a:r>
-              <a:rPr lang="en-GB" b="0" i="0" dirty="0">
-                <a:solidFill>
-                  <a:srgbClr val="24292F"/>
-                </a:solidFill>
-                <a:effectLst/>
-                <a:latin typeface="-apple-system"/>
-              </a:rPr>
-              <a:t>Gamble et al., 2016 </a:t>
-            </a:r>
-            <a:endParaRPr lang="en-GB" dirty="0"/>
-          </a:p>
-          <a:p>
-            <a:r>
-              <a:rPr lang="en-GB" dirty="0"/>
-              <a:t>Add functionality to identify feature locations for </a:t>
-            </a:r>
-            <a:r>
-              <a:rPr lang="en-GB" dirty="0" err="1"/>
-              <a:t>nt</a:t>
-            </a:r>
-            <a:r>
-              <a:rPr lang="en-GB" dirty="0"/>
-              <a:t> </a:t>
-            </a:r>
-            <a:r>
-              <a:rPr lang="en-GB" dirty="0" err="1"/>
-              <a:t>metafeature</a:t>
-            </a:r>
-            <a:r>
-              <a:rPr lang="en-GB" dirty="0"/>
-              <a:t> script</a:t>
-            </a:r>
-          </a:p>
-          <a:p>
-            <a:pPr lvl="1">
-              <a:buFontTx/>
-              <a:buChar char="-"/>
-            </a:pPr>
-            <a:r>
-              <a:rPr lang="en-GB" dirty="0"/>
-              <a:t>Codons and Codon pairs would likely be easy</a:t>
-            </a:r>
-          </a:p>
-          <a:p>
-            <a:pPr lvl="1">
-              <a:buFontTx/>
-              <a:buChar char="-"/>
-            </a:pPr>
-            <a:r>
-              <a:rPr lang="en-GB" dirty="0"/>
-              <a:t>Is there a tool or protein database that can identify positions of secondary structural features? Can this data be downloaded for each gene? Will the names be compatible? Ligand binding positions?</a:t>
+              <a:t>Open science as an undergraduate. </a:t>
+            </a:r>
+          </a:p>
+          <a:p>
+            <a:r>
+              <a:rPr lang="en-GB" dirty="0"/>
+              <a:t>look over and evaluate our time with the lab, gain a publication</a:t>
+            </a:r>
+          </a:p>
+          <a:p>
+            <a:r>
+              <a:rPr lang="en-GB" dirty="0"/>
+              <a:t>Practice writing</a:t>
             </a:r>
           </a:p>
         </p:txBody>
@@ -4363,7 +4911,7 @@
     </p:spTree>
     <p:extLst>
       <p:ext uri="{BB962C8B-B14F-4D97-AF65-F5344CB8AC3E}">
-        <p14:creationId xmlns:p14="http://schemas.microsoft.com/office/powerpoint/2010/main" val="1511006915"/>
+        <p14:creationId xmlns:p14="http://schemas.microsoft.com/office/powerpoint/2010/main" val="2278273156"/>
       </p:ext>
     </p:extLst>
   </p:cSld>

</xml_diff>

<commit_message>
add codon pair graphs and table of file names
</commit_message>
<xml_diff>
--- a/Rundown-of-our-3-months.pptx
+++ b/Rundown-of-our-3-months.pptx
@@ -13,14 +13,17 @@
     <p:sldId id="260" r:id="rId7"/>
     <p:sldId id="271" r:id="rId8"/>
     <p:sldId id="261" r:id="rId9"/>
-    <p:sldId id="270" r:id="rId10"/>
-    <p:sldId id="262" r:id="rId11"/>
-    <p:sldId id="267" r:id="rId12"/>
-    <p:sldId id="268" r:id="rId13"/>
-    <p:sldId id="269" r:id="rId14"/>
-    <p:sldId id="263" r:id="rId15"/>
-    <p:sldId id="265" r:id="rId16"/>
-    <p:sldId id="266" r:id="rId17"/>
+    <p:sldId id="272" r:id="rId10"/>
+    <p:sldId id="270" r:id="rId11"/>
+    <p:sldId id="262" r:id="rId12"/>
+    <p:sldId id="267" r:id="rId13"/>
+    <p:sldId id="268" r:id="rId14"/>
+    <p:sldId id="269" r:id="rId15"/>
+    <p:sldId id="273" r:id="rId16"/>
+    <p:sldId id="274" r:id="rId17"/>
+    <p:sldId id="263" r:id="rId18"/>
+    <p:sldId id="265" r:id="rId19"/>
+    <p:sldId id="266" r:id="rId20"/>
   </p:sldIdLst>
   <p:sldSz cx="12192000" cy="6858000"/>
   <p:notesSz cx="6858000" cy="9144000"/>
@@ -276,7 +279,7 @@
           <a:p>
             <a:fld id="{A8A86E47-8070-450A-8193-1A64EF17116A}" type="datetimeFigureOut">
               <a:rPr lang="en-GB" smtClean="0"/>
-              <a:t>14/09/2021</a:t>
+              <a:t>16/09/2021</a:t>
             </a:fld>
             <a:endParaRPr lang="en-GB"/>
           </a:p>
@@ -476,7 +479,7 @@
           <a:p>
             <a:fld id="{A8A86E47-8070-450A-8193-1A64EF17116A}" type="datetimeFigureOut">
               <a:rPr lang="en-GB" smtClean="0"/>
-              <a:t>14/09/2021</a:t>
+              <a:t>16/09/2021</a:t>
             </a:fld>
             <a:endParaRPr lang="en-GB"/>
           </a:p>
@@ -686,7 +689,7 @@
           <a:p>
             <a:fld id="{A8A86E47-8070-450A-8193-1A64EF17116A}" type="datetimeFigureOut">
               <a:rPr lang="en-GB" smtClean="0"/>
-              <a:t>14/09/2021</a:t>
+              <a:t>16/09/2021</a:t>
             </a:fld>
             <a:endParaRPr lang="en-GB"/>
           </a:p>
@@ -886,7 +889,7 @@
           <a:p>
             <a:fld id="{A8A86E47-8070-450A-8193-1A64EF17116A}" type="datetimeFigureOut">
               <a:rPr lang="en-GB" smtClean="0"/>
-              <a:t>14/09/2021</a:t>
+              <a:t>16/09/2021</a:t>
             </a:fld>
             <a:endParaRPr lang="en-GB"/>
           </a:p>
@@ -1162,7 +1165,7 @@
           <a:p>
             <a:fld id="{A8A86E47-8070-450A-8193-1A64EF17116A}" type="datetimeFigureOut">
               <a:rPr lang="en-GB" smtClean="0"/>
-              <a:t>14/09/2021</a:t>
+              <a:t>16/09/2021</a:t>
             </a:fld>
             <a:endParaRPr lang="en-GB"/>
           </a:p>
@@ -1430,7 +1433,7 @@
           <a:p>
             <a:fld id="{A8A86E47-8070-450A-8193-1A64EF17116A}" type="datetimeFigureOut">
               <a:rPr lang="en-GB" smtClean="0"/>
-              <a:t>14/09/2021</a:t>
+              <a:t>16/09/2021</a:t>
             </a:fld>
             <a:endParaRPr lang="en-GB"/>
           </a:p>
@@ -1845,7 +1848,7 @@
           <a:p>
             <a:fld id="{A8A86E47-8070-450A-8193-1A64EF17116A}" type="datetimeFigureOut">
               <a:rPr lang="en-GB" smtClean="0"/>
-              <a:t>14/09/2021</a:t>
+              <a:t>16/09/2021</a:t>
             </a:fld>
             <a:endParaRPr lang="en-GB"/>
           </a:p>
@@ -1987,7 +1990,7 @@
           <a:p>
             <a:fld id="{A8A86E47-8070-450A-8193-1A64EF17116A}" type="datetimeFigureOut">
               <a:rPr lang="en-GB" smtClean="0"/>
-              <a:t>14/09/2021</a:t>
+              <a:t>16/09/2021</a:t>
             </a:fld>
             <a:endParaRPr lang="en-GB"/>
           </a:p>
@@ -2100,7 +2103,7 @@
           <a:p>
             <a:fld id="{A8A86E47-8070-450A-8193-1A64EF17116A}" type="datetimeFigureOut">
               <a:rPr lang="en-GB" smtClean="0"/>
-              <a:t>14/09/2021</a:t>
+              <a:t>16/09/2021</a:t>
             </a:fld>
             <a:endParaRPr lang="en-GB"/>
           </a:p>
@@ -2413,7 +2416,7 @@
           <a:p>
             <a:fld id="{A8A86E47-8070-450A-8193-1A64EF17116A}" type="datetimeFigureOut">
               <a:rPr lang="en-GB" smtClean="0"/>
-              <a:t>14/09/2021</a:t>
+              <a:t>16/09/2021</a:t>
             </a:fld>
             <a:endParaRPr lang="en-GB"/>
           </a:p>
@@ -2702,7 +2705,7 @@
           <a:p>
             <a:fld id="{A8A86E47-8070-450A-8193-1A64EF17116A}" type="datetimeFigureOut">
               <a:rPr lang="en-GB" smtClean="0"/>
-              <a:t>14/09/2021</a:t>
+              <a:t>16/09/2021</a:t>
             </a:fld>
             <a:endParaRPr lang="en-GB"/>
           </a:p>
@@ -2945,7 +2948,7 @@
           <a:p>
             <a:fld id="{A8A86E47-8070-450A-8193-1A64EF17116A}" type="datetimeFigureOut">
               <a:rPr lang="en-GB" smtClean="0"/>
-              <a:t>14/09/2021</a:t>
+              <a:t>16/09/2021</a:t>
             </a:fld>
             <a:endParaRPr lang="en-GB"/>
           </a:p>
@@ -3450,7 +3453,7 @@
           <p:cNvPr id="2" name="Title 1">
             <a:extLst>
               <a:ext uri="{FF2B5EF4-FFF2-40B4-BE49-F238E27FC236}">
-                <a16:creationId xmlns:a16="http://schemas.microsoft.com/office/drawing/2014/main" id="{E455D277-9798-4189-ADE6-CFE864E7FC04}"/>
+                <a16:creationId xmlns:a16="http://schemas.microsoft.com/office/drawing/2014/main" id="{768123CA-D61B-44BA-9D9D-7F183FEF3504}"/>
               </a:ext>
             </a:extLst>
           </p:cNvPr>
@@ -3463,22 +3466,13 @@
         </p:nvSpPr>
         <p:spPr/>
         <p:txBody>
-          <a:bodyPr>
-            <a:normAutofit fontScale="90000"/>
-          </a:bodyPr>
-          <a:lstStyle/>
-          <a:p>
-            <a:r>
-              <a:rPr lang="en-GB" dirty="0"/>
-              <a:t>Created Meta Feature scripts</a:t>
-            </a:r>
-            <a:br>
-              <a:rPr lang="en-GB" dirty="0"/>
-            </a:br>
-            <a:br>
-              <a:rPr lang="en-GB" dirty="0"/>
-            </a:br>
-            <a:endParaRPr lang="en-GB" dirty="0"/>
+          <a:bodyPr/>
+          <a:lstStyle/>
+          <a:p>
+            <a:r>
+              <a:rPr lang="en-GB" dirty="0"/>
+              <a:t>Article writing </a:t>
+            </a:r>
           </a:p>
         </p:txBody>
       </p:sp>
@@ -3487,7 +3481,7 @@
           <p:cNvPr id="3" name="Content Placeholder 2">
             <a:extLst>
               <a:ext uri="{FF2B5EF4-FFF2-40B4-BE49-F238E27FC236}">
-                <a16:creationId xmlns:a16="http://schemas.microsoft.com/office/drawing/2014/main" id="{D81FC45E-0E9D-45F6-A004-DE5773D8D3A0}"/>
+                <a16:creationId xmlns:a16="http://schemas.microsoft.com/office/drawing/2014/main" id="{17C7A492-2281-44D7-B49A-CB647A365F75}"/>
               </a:ext>
             </a:extLst>
           </p:cNvPr>
@@ -3505,19 +3499,19 @@
           <a:p>
             <a:r>
               <a:rPr lang="en-GB" dirty="0"/>
-              <a:t>Codon pairs </a:t>
-            </a:r>
-          </a:p>
-          <a:p>
-            <a:r>
-              <a:rPr lang="en-GB" dirty="0"/>
-              <a:t>Single codons </a:t>
-            </a:r>
-          </a:p>
-          <a:p>
-            <a:r>
-              <a:rPr lang="en-GB" dirty="0"/>
-              <a:t>Nucleotides</a:t>
+              <a:t>Open science as an undergraduate. </a:t>
+            </a:r>
+          </a:p>
+          <a:p>
+            <a:r>
+              <a:rPr lang="en-GB" dirty="0"/>
+              <a:t>look over and evaluate our time with the lab, gain a publication</a:t>
+            </a:r>
+          </a:p>
+          <a:p>
+            <a:r>
+              <a:rPr lang="en-GB" dirty="0"/>
+              <a:t>Practice writing</a:t>
             </a:r>
           </a:p>
         </p:txBody>
@@ -3525,7 +3519,7 @@
     </p:spTree>
     <p:extLst>
       <p:ext uri="{BB962C8B-B14F-4D97-AF65-F5344CB8AC3E}">
-        <p14:creationId xmlns:p14="http://schemas.microsoft.com/office/powerpoint/2010/main" val="1549034550"/>
+        <p14:creationId xmlns:p14="http://schemas.microsoft.com/office/powerpoint/2010/main" val="2278273156"/>
       </p:ext>
     </p:extLst>
   </p:cSld>
@@ -3557,7 +3551,7 @@
           <p:cNvPr id="2" name="Title 1">
             <a:extLst>
               <a:ext uri="{FF2B5EF4-FFF2-40B4-BE49-F238E27FC236}">
-                <a16:creationId xmlns:a16="http://schemas.microsoft.com/office/drawing/2014/main" id="{0403F2E7-FE84-42C8-8A2C-352CEE44966B}"/>
+                <a16:creationId xmlns:a16="http://schemas.microsoft.com/office/drawing/2014/main" id="{E455D277-9798-4189-ADE6-CFE864E7FC04}"/>
               </a:ext>
             </a:extLst>
           </p:cNvPr>
@@ -3570,13 +3564,18 @@
         </p:nvSpPr>
         <p:spPr/>
         <p:txBody>
-          <a:bodyPr/>
-          <a:lstStyle/>
-          <a:p>
-            <a:r>
-              <a:rPr lang="en-GB" dirty="0"/>
-              <a:t>Codon pairs – why, how does it work</a:t>
-            </a:r>
+          <a:bodyPr>
+            <a:normAutofit fontScale="90000"/>
+          </a:bodyPr>
+          <a:lstStyle/>
+          <a:p>
+            <a:r>
+              <a:rPr lang="en-GB" dirty="0"/>
+              <a:t>Created Meta Feature scripts</a:t>
+            </a:r>
+            <a:br>
+              <a:rPr lang="en-GB" dirty="0"/>
+            </a:br>
             <a:br>
               <a:rPr lang="en-GB" dirty="0"/>
             </a:br>
@@ -3589,7 +3588,7 @@
           <p:cNvPr id="3" name="Content Placeholder 2">
             <a:extLst>
               <a:ext uri="{FF2B5EF4-FFF2-40B4-BE49-F238E27FC236}">
-                <a16:creationId xmlns:a16="http://schemas.microsoft.com/office/drawing/2014/main" id="{75BE0852-4FA5-4A4E-A9C2-FC680D756790}"/>
+                <a16:creationId xmlns:a16="http://schemas.microsoft.com/office/drawing/2014/main" id="{D81FC45E-0E9D-45F6-A004-DE5773D8D3A0}"/>
               </a:ext>
             </a:extLst>
           </p:cNvPr>
@@ -3605,14 +3604,29 @@
           <a:bodyPr/>
           <a:lstStyle/>
           <a:p>
-            <a:endParaRPr lang="en-GB"/>
+            <a:r>
+              <a:rPr lang="en-GB" dirty="0"/>
+              <a:t>Codon pairs </a:t>
+            </a:r>
+          </a:p>
+          <a:p>
+            <a:r>
+              <a:rPr lang="en-GB" dirty="0"/>
+              <a:t>Single codons </a:t>
+            </a:r>
+          </a:p>
+          <a:p>
+            <a:r>
+              <a:rPr lang="en-GB" dirty="0"/>
+              <a:t>Nucleotides</a:t>
+            </a:r>
           </a:p>
         </p:txBody>
       </p:sp>
     </p:spTree>
     <p:extLst>
       <p:ext uri="{BB962C8B-B14F-4D97-AF65-F5344CB8AC3E}">
-        <p14:creationId xmlns:p14="http://schemas.microsoft.com/office/powerpoint/2010/main" val="4039405834"/>
+        <p14:creationId xmlns:p14="http://schemas.microsoft.com/office/powerpoint/2010/main" val="1549034550"/>
       </p:ext>
     </p:extLst>
   </p:cSld>
@@ -3644,7 +3658,7 @@
           <p:cNvPr id="2" name="Title 1">
             <a:extLst>
               <a:ext uri="{FF2B5EF4-FFF2-40B4-BE49-F238E27FC236}">
-                <a16:creationId xmlns:a16="http://schemas.microsoft.com/office/drawing/2014/main" id="{565200E1-D110-4281-91EB-14B2141C87DB}"/>
+                <a16:creationId xmlns:a16="http://schemas.microsoft.com/office/drawing/2014/main" id="{0403F2E7-FE84-42C8-8A2C-352CEE44966B}"/>
               </a:ext>
             </a:extLst>
           </p:cNvPr>
@@ -3657,14 +3671,12 @@
         </p:nvSpPr>
         <p:spPr/>
         <p:txBody>
-          <a:bodyPr>
-            <a:normAutofit fontScale="90000"/>
-          </a:bodyPr>
-          <a:lstStyle/>
-          <a:p>
-            <a:r>
-              <a:rPr lang="en-GB" dirty="0"/>
-              <a:t>Single codons – why, how does it work, outputs</a:t>
+          <a:bodyPr/>
+          <a:lstStyle/>
+          <a:p>
+            <a:r>
+              <a:rPr lang="en-GB" dirty="0"/>
+              <a:t>Codon pairs – why, how does it work</a:t>
             </a:r>
             <a:br>
               <a:rPr lang="en-GB" dirty="0"/>
@@ -3678,7 +3690,7 @@
           <p:cNvPr id="3" name="Content Placeholder 2">
             <a:extLst>
               <a:ext uri="{FF2B5EF4-FFF2-40B4-BE49-F238E27FC236}">
-                <a16:creationId xmlns:a16="http://schemas.microsoft.com/office/drawing/2014/main" id="{3BE85511-19BB-47D8-8F60-120F887A7460}"/>
+                <a16:creationId xmlns:a16="http://schemas.microsoft.com/office/drawing/2014/main" id="{75BE0852-4FA5-4A4E-A9C2-FC680D756790}"/>
               </a:ext>
             </a:extLst>
           </p:cNvPr>
@@ -3701,7 +3713,7 @@
     </p:spTree>
     <p:extLst>
       <p:ext uri="{BB962C8B-B14F-4D97-AF65-F5344CB8AC3E}">
-        <p14:creationId xmlns:p14="http://schemas.microsoft.com/office/powerpoint/2010/main" val="152534160"/>
+        <p14:creationId xmlns:p14="http://schemas.microsoft.com/office/powerpoint/2010/main" val="4039405834"/>
       </p:ext>
     </p:extLst>
   </p:cSld>
@@ -3733,7 +3745,7 @@
           <p:cNvPr id="2" name="Title 1">
             <a:extLst>
               <a:ext uri="{FF2B5EF4-FFF2-40B4-BE49-F238E27FC236}">
-                <a16:creationId xmlns:a16="http://schemas.microsoft.com/office/drawing/2014/main" id="{5E05A194-24EC-4C63-805F-C1BE5CED12BF}"/>
+                <a16:creationId xmlns:a16="http://schemas.microsoft.com/office/drawing/2014/main" id="{565200E1-D110-4281-91EB-14B2141C87DB}"/>
               </a:ext>
             </a:extLst>
           </p:cNvPr>
@@ -3746,12 +3758,14 @@
         </p:nvSpPr>
         <p:spPr/>
         <p:txBody>
-          <a:bodyPr/>
-          <a:lstStyle/>
-          <a:p>
-            <a:r>
-              <a:rPr lang="en-GB" dirty="0"/>
-              <a:t>Nucleotides – why, how does it work </a:t>
+          <a:bodyPr>
+            <a:normAutofit fontScale="90000"/>
+          </a:bodyPr>
+          <a:lstStyle/>
+          <a:p>
+            <a:r>
+              <a:rPr lang="en-GB" dirty="0"/>
+              <a:t>Single codons – why, how does it work, outputs</a:t>
             </a:r>
             <a:br>
               <a:rPr lang="en-GB" dirty="0"/>
@@ -3765,7 +3779,7 @@
           <p:cNvPr id="3" name="Content Placeholder 2">
             <a:extLst>
               <a:ext uri="{FF2B5EF4-FFF2-40B4-BE49-F238E27FC236}">
-                <a16:creationId xmlns:a16="http://schemas.microsoft.com/office/drawing/2014/main" id="{58E41B35-1F9F-4F11-8690-3332DE72D0CC}"/>
+                <a16:creationId xmlns:a16="http://schemas.microsoft.com/office/drawing/2014/main" id="{3BE85511-19BB-47D8-8F60-120F887A7460}"/>
               </a:ext>
             </a:extLst>
           </p:cNvPr>
@@ -3788,7 +3802,7 @@
     </p:spTree>
     <p:extLst>
       <p:ext uri="{BB962C8B-B14F-4D97-AF65-F5344CB8AC3E}">
-        <p14:creationId xmlns:p14="http://schemas.microsoft.com/office/powerpoint/2010/main" val="1239354963"/>
+        <p14:creationId xmlns:p14="http://schemas.microsoft.com/office/powerpoint/2010/main" val="152534160"/>
       </p:ext>
     </p:extLst>
   </p:cSld>
@@ -3820,7 +3834,7 @@
           <p:cNvPr id="2" name="Title 1">
             <a:extLst>
               <a:ext uri="{FF2B5EF4-FFF2-40B4-BE49-F238E27FC236}">
-                <a16:creationId xmlns:a16="http://schemas.microsoft.com/office/drawing/2014/main" id="{CD84C0C1-70FE-4FCE-A9C9-6C783AE5BCA2}"/>
+                <a16:creationId xmlns:a16="http://schemas.microsoft.com/office/drawing/2014/main" id="{5E05A194-24EC-4C63-805F-C1BE5CED12BF}"/>
               </a:ext>
             </a:extLst>
           </p:cNvPr>
@@ -3838,8 +3852,12 @@
           <a:p>
             <a:r>
               <a:rPr lang="en-GB" dirty="0"/>
-              <a:t>Next steps</a:t>
-            </a:r>
+              <a:t>Nucleotides – why, how does it work </a:t>
+            </a:r>
+            <a:br>
+              <a:rPr lang="en-GB" dirty="0"/>
+            </a:br>
+            <a:endParaRPr lang="en-GB" dirty="0"/>
           </a:p>
         </p:txBody>
       </p:sp>
@@ -3848,7 +3866,7 @@
           <p:cNvPr id="3" name="Content Placeholder 2">
             <a:extLst>
               <a:ext uri="{FF2B5EF4-FFF2-40B4-BE49-F238E27FC236}">
-                <a16:creationId xmlns:a16="http://schemas.microsoft.com/office/drawing/2014/main" id="{EAAC464D-CD24-4F20-B9E8-DE256CD69653}"/>
+                <a16:creationId xmlns:a16="http://schemas.microsoft.com/office/drawing/2014/main" id="{58E41B35-1F9F-4F11-8690-3332DE72D0CC}"/>
               </a:ext>
             </a:extLst>
           </p:cNvPr>
@@ -3864,70 +3882,14 @@
           <a:bodyPr/>
           <a:lstStyle/>
           <a:p>
-            <a:r>
-              <a:rPr lang="en-GB" dirty="0"/>
-              <a:t>Test on datasets – reconfirm results from </a:t>
-            </a:r>
-            <a:r>
-              <a:rPr lang="en-GB" b="0" i="0" dirty="0">
-                <a:solidFill>
-                  <a:srgbClr val="24292F"/>
-                </a:solidFill>
-                <a:effectLst/>
-                <a:latin typeface="-apple-system"/>
-              </a:rPr>
-              <a:t>Gamble et al., 2016 </a:t>
-            </a:r>
-            <a:endParaRPr lang="en-GB" dirty="0"/>
-          </a:p>
-          <a:p>
-            <a:r>
-              <a:rPr lang="en-GB" dirty="0"/>
-              <a:t>Add functionality to identify feature locations for </a:t>
-            </a:r>
-            <a:r>
-              <a:rPr lang="en-GB" dirty="0" err="1"/>
-              <a:t>nt</a:t>
-            </a:r>
-            <a:r>
-              <a:rPr lang="en-GB" dirty="0"/>
-              <a:t> </a:t>
-            </a:r>
-            <a:r>
-              <a:rPr lang="en-GB" dirty="0" err="1"/>
-              <a:t>metafeature</a:t>
-            </a:r>
-            <a:r>
-              <a:rPr lang="en-GB" dirty="0"/>
-              <a:t> script</a:t>
-            </a:r>
-          </a:p>
-          <a:p>
-            <a:pPr lvl="1">
-              <a:buFontTx/>
-              <a:buChar char="-"/>
-            </a:pPr>
-            <a:r>
-              <a:rPr lang="en-GB" dirty="0"/>
-              <a:t>Codons and Codon pairs would likely be easy</a:t>
-            </a:r>
-          </a:p>
-          <a:p>
-            <a:pPr lvl="1">
-              <a:buFontTx/>
-              <a:buChar char="-"/>
-            </a:pPr>
-            <a:r>
-              <a:rPr lang="en-GB" dirty="0"/>
-              <a:t>Is there a tool or protein database that can identify positions of secondary structural features? Can this data be downloaded for each gene? Will the names be compatible? Ligand binding positions?</a:t>
-            </a:r>
+            <a:endParaRPr lang="en-GB"/>
           </a:p>
         </p:txBody>
       </p:sp>
     </p:spTree>
     <p:extLst>
       <p:ext uri="{BB962C8B-B14F-4D97-AF65-F5344CB8AC3E}">
-        <p14:creationId xmlns:p14="http://schemas.microsoft.com/office/powerpoint/2010/main" val="1511006915"/>
+        <p14:creationId xmlns:p14="http://schemas.microsoft.com/office/powerpoint/2010/main" val="1239354963"/>
       </p:ext>
     </p:extLst>
   </p:cSld>
@@ -3959,6 +3921,469 @@
           <p:cNvPr id="2" name="Title 1">
             <a:extLst>
               <a:ext uri="{FF2B5EF4-FFF2-40B4-BE49-F238E27FC236}">
+                <a16:creationId xmlns:a16="http://schemas.microsoft.com/office/drawing/2014/main" id="{73774DD4-B98C-4230-910D-F5D804D9E0FA}"/>
+              </a:ext>
+            </a:extLst>
+          </p:cNvPr>
+          <p:cNvSpPr>
+            <a:spLocks noGrp="1"/>
+          </p:cNvSpPr>
+          <p:nvPr>
+            <p:ph type="title"/>
+          </p:nvPr>
+        </p:nvSpPr>
+        <p:spPr/>
+        <p:txBody>
+          <a:bodyPr/>
+          <a:lstStyle/>
+          <a:p>
+            <a:r>
+              <a:rPr lang="en-GB" dirty="0"/>
+              <a:t>Recreating data from Gamble et al, 2016</a:t>
+            </a:r>
+          </a:p>
+        </p:txBody>
+      </p:sp>
+      <p:pic>
+        <p:nvPicPr>
+          <p:cNvPr id="5" name="Content Placeholder 4">
+            <a:extLst>
+              <a:ext uri="{FF2B5EF4-FFF2-40B4-BE49-F238E27FC236}">
+                <a16:creationId xmlns:a16="http://schemas.microsoft.com/office/drawing/2014/main" id="{68818898-CDB2-4F35-B54B-CFD6C44867CC}"/>
+              </a:ext>
+            </a:extLst>
+          </p:cNvPr>
+          <p:cNvPicPr>
+            <a:picLocks noGrp="1" noChangeAspect="1"/>
+          </p:cNvPicPr>
+          <p:nvPr>
+            <p:ph idx="1"/>
+          </p:nvPr>
+        </p:nvPicPr>
+        <p:blipFill rotWithShape="1">
+          <a:blip r:embed="rId2"/>
+          <a:srcRect l="742" t="985" r="660" b="949"/>
+          <a:stretch/>
+        </p:blipFill>
+        <p:spPr>
+          <a:xfrm>
+            <a:off x="4848225" y="1690688"/>
+            <a:ext cx="5486400" cy="4501662"/>
+          </a:xfrm>
+        </p:spPr>
+      </p:pic>
+      <p:pic>
+        <p:nvPicPr>
+          <p:cNvPr id="7" name="Picture 6">
+            <a:extLst>
+              <a:ext uri="{FF2B5EF4-FFF2-40B4-BE49-F238E27FC236}">
+                <a16:creationId xmlns:a16="http://schemas.microsoft.com/office/drawing/2014/main" id="{BA9DCE99-3901-41E9-9F21-3250B1857830}"/>
+              </a:ext>
+            </a:extLst>
+          </p:cNvPr>
+          <p:cNvPicPr>
+            <a:picLocks noChangeAspect="1"/>
+          </p:cNvPicPr>
+          <p:nvPr/>
+        </p:nvPicPr>
+        <p:blipFill rotWithShape="1">
+          <a:blip r:embed="rId3"/>
+          <a:srcRect l="3585"/>
+          <a:stretch/>
+        </p:blipFill>
+        <p:spPr>
+          <a:xfrm>
+            <a:off x="1266825" y="1534933"/>
+            <a:ext cx="2628900" cy="4578711"/>
+          </a:xfrm>
+          <a:prstGeom prst="rect">
+            <a:avLst/>
+          </a:prstGeom>
+        </p:spPr>
+      </p:pic>
+    </p:spTree>
+    <p:extLst>
+      <p:ext uri="{BB962C8B-B14F-4D97-AF65-F5344CB8AC3E}">
+        <p14:creationId xmlns:p14="http://schemas.microsoft.com/office/powerpoint/2010/main" val="4278489843"/>
+      </p:ext>
+    </p:extLst>
+  </p:cSld>
+  <p:clrMapOvr>
+    <a:masterClrMapping/>
+  </p:clrMapOvr>
+</p:sld>
+</file>
+
+<file path=ppt/slides/slide16.xml><?xml version="1.0" encoding="utf-8"?>
+<p:sld xmlns:a="http://schemas.openxmlformats.org/drawingml/2006/main" xmlns:r="http://schemas.openxmlformats.org/officeDocument/2006/relationships" xmlns:p="http://schemas.openxmlformats.org/presentationml/2006/main">
+  <p:cSld>
+    <p:bg>
+      <p:bgPr>
+        <a:solidFill>
+          <a:schemeClr val="bg1"/>
+        </a:solidFill>
+        <a:effectLst/>
+      </p:bgPr>
+    </p:bg>
+    <p:spTree>
+      <p:nvGrpSpPr>
+        <p:cNvPr id="1" name=""/>
+        <p:cNvGrpSpPr/>
+        <p:nvPr/>
+      </p:nvGrpSpPr>
+      <p:grpSpPr>
+        <a:xfrm>
+          <a:off x="0" y="0"/>
+          <a:ext cx="0" cy="0"/>
+          <a:chOff x="0" y="0"/>
+          <a:chExt cx="0" cy="0"/>
+        </a:xfrm>
+      </p:grpSpPr>
+      <p:sp useBgFill="1">
+        <p:nvSpPr>
+          <p:cNvPr id="12" name="Rectangle 11">
+            <a:extLst>
+              <a:ext uri="{FF2B5EF4-FFF2-40B4-BE49-F238E27FC236}">
+                <a16:creationId xmlns:a16="http://schemas.microsoft.com/office/drawing/2014/main" id="{53F29798-D584-4792-9B62-3F5F5C36D619}"/>
+              </a:ext>
+              <a:ext uri="{C183D7F6-B498-43B3-948B-1728B52AA6E4}">
+                <adec:decorative xmlns:adec="http://schemas.microsoft.com/office/drawing/2017/decorative" val="1"/>
+              </a:ext>
+            </a:extLst>
+          </p:cNvPr>
+          <p:cNvSpPr>
+            <a:spLocks noGrp="1" noRot="1" noChangeAspect="1" noMove="1" noResize="1" noEditPoints="1" noAdjustHandles="1" noChangeArrowheads="1" noChangeShapeType="1" noTextEdit="1"/>
+          </p:cNvSpPr>
+          <p:nvPr>
+            <p:extLst>
+              <p:ext uri="{386F3935-93C4-4BCD-93E2-E3B085C9AB24}">
+                <p16:designElem xmlns:p16="http://schemas.microsoft.com/office/powerpoint/2015/main" val="1"/>
+              </p:ext>
+            </p:extLst>
+          </p:nvPr>
+        </p:nvSpPr>
+        <p:spPr>
+          <a:xfrm>
+            <a:off x="0" y="0"/>
+            <a:ext cx="12188952" cy="6858000"/>
+          </a:xfrm>
+          <a:prstGeom prst="rect">
+            <a:avLst/>
+          </a:prstGeom>
+          <a:ln>
+            <a:noFill/>
+          </a:ln>
+        </p:spPr>
+        <p:style>
+          <a:lnRef idx="2">
+            <a:schemeClr val="accent1">
+              <a:shade val="50000"/>
+            </a:schemeClr>
+          </a:lnRef>
+          <a:fillRef idx="1">
+            <a:schemeClr val="accent1"/>
+          </a:fillRef>
+          <a:effectRef idx="0">
+            <a:schemeClr val="accent1"/>
+          </a:effectRef>
+          <a:fontRef idx="minor">
+            <a:schemeClr val="lt1"/>
+          </a:fontRef>
+        </p:style>
+        <p:txBody>
+          <a:bodyPr rtlCol="0" anchor="ctr"/>
+          <a:lstStyle/>
+          <a:p>
+            <a:pPr algn="ctr"/>
+            <a:endParaRPr lang="en-US"/>
+          </a:p>
+        </p:txBody>
+      </p:sp>
+      <p:pic>
+        <p:nvPicPr>
+          <p:cNvPr id="7" name="Picture 6">
+            <a:extLst>
+              <a:ext uri="{FF2B5EF4-FFF2-40B4-BE49-F238E27FC236}">
+                <a16:creationId xmlns:a16="http://schemas.microsoft.com/office/drawing/2014/main" id="{880FE286-5BD5-4FBF-BA91-8340A0CD3757}"/>
+              </a:ext>
+            </a:extLst>
+          </p:cNvPr>
+          <p:cNvPicPr>
+            <a:picLocks noChangeAspect="1"/>
+          </p:cNvPicPr>
+          <p:nvPr/>
+        </p:nvPicPr>
+        <p:blipFill rotWithShape="1">
+          <a:blip r:embed="rId2"/>
+          <a:srcRect l="636" t="1449" r="1" b="2211"/>
+          <a:stretch/>
+        </p:blipFill>
+        <p:spPr>
+          <a:xfrm>
+            <a:off x="676275" y="1943100"/>
+            <a:ext cx="5203825" cy="4219575"/>
+          </a:xfrm>
+          <a:prstGeom prst="rect">
+            <a:avLst/>
+          </a:prstGeom>
+        </p:spPr>
+      </p:pic>
+      <p:pic>
+        <p:nvPicPr>
+          <p:cNvPr id="5" name="Picture 4">
+            <a:extLst>
+              <a:ext uri="{FF2B5EF4-FFF2-40B4-BE49-F238E27FC236}">
+                <a16:creationId xmlns:a16="http://schemas.microsoft.com/office/drawing/2014/main" id="{3B553974-4DB4-4B06-BD82-253D7083E262}"/>
+              </a:ext>
+            </a:extLst>
+          </p:cNvPr>
+          <p:cNvPicPr>
+            <a:picLocks noChangeAspect="1"/>
+          </p:cNvPicPr>
+          <p:nvPr/>
+        </p:nvPicPr>
+        <p:blipFill rotWithShape="1">
+          <a:blip r:embed="rId3"/>
+          <a:srcRect l="698" t="1449" r="636" b="2211"/>
+          <a:stretch/>
+        </p:blipFill>
+        <p:spPr>
+          <a:xfrm>
+            <a:off x="6149976" y="1943100"/>
+            <a:ext cx="5167313" cy="4219575"/>
+          </a:xfrm>
+          <a:prstGeom prst="rect">
+            <a:avLst/>
+          </a:prstGeom>
+        </p:spPr>
+      </p:pic>
+      <p:sp>
+        <p:nvSpPr>
+          <p:cNvPr id="2" name="Title 1">
+            <a:extLst>
+              <a:ext uri="{FF2B5EF4-FFF2-40B4-BE49-F238E27FC236}">
+                <a16:creationId xmlns:a16="http://schemas.microsoft.com/office/drawing/2014/main" id="{477B7EE3-F904-4A2F-9C86-9438EC9887F5}"/>
+              </a:ext>
+            </a:extLst>
+          </p:cNvPr>
+          <p:cNvSpPr>
+            <a:spLocks noGrp="1"/>
+          </p:cNvSpPr>
+          <p:nvPr>
+            <p:ph type="title"/>
+          </p:nvPr>
+        </p:nvSpPr>
+        <p:spPr>
+          <a:xfrm>
+            <a:off x="838200" y="184805"/>
+            <a:ext cx="10515600" cy="1505883"/>
+          </a:xfrm>
+        </p:spPr>
+        <p:txBody>
+          <a:bodyPr vert="horz" lIns="91440" tIns="45720" rIns="91440" bIns="45720" rtlCol="0" anchor="ctr">
+            <a:normAutofit/>
+          </a:bodyPr>
+          <a:lstStyle/>
+          <a:p>
+            <a:r>
+              <a:rPr lang="en-US" sz="4000" kern="1200" dirty="0">
+                <a:solidFill>
+                  <a:schemeClr val="tx1"/>
+                </a:solidFill>
+                <a:latin typeface="+mj-lt"/>
+                <a:ea typeface="+mj-ea"/>
+                <a:cs typeface="+mj-cs"/>
+              </a:rPr>
+              <a:t>Comparing inhibitory and </a:t>
+            </a:r>
+            <a:r>
+              <a:rPr lang="en-US" sz="4000" kern="1200" dirty="0" err="1">
+                <a:solidFill>
+                  <a:schemeClr val="tx1"/>
+                </a:solidFill>
+                <a:latin typeface="+mj-lt"/>
+                <a:ea typeface="+mj-ea"/>
+                <a:cs typeface="+mj-cs"/>
+              </a:rPr>
+              <a:t>optimised</a:t>
+            </a:r>
+            <a:r>
+              <a:rPr lang="en-US" sz="4000" kern="1200" dirty="0">
+                <a:solidFill>
+                  <a:schemeClr val="tx1"/>
+                </a:solidFill>
+                <a:latin typeface="+mj-lt"/>
+                <a:ea typeface="+mj-ea"/>
+                <a:cs typeface="+mj-cs"/>
+              </a:rPr>
+              <a:t> codon pairs</a:t>
+            </a:r>
+          </a:p>
+        </p:txBody>
+      </p:sp>
+    </p:spTree>
+    <p:extLst>
+      <p:ext uri="{BB962C8B-B14F-4D97-AF65-F5344CB8AC3E}">
+        <p14:creationId xmlns:p14="http://schemas.microsoft.com/office/powerpoint/2010/main" val="4156861680"/>
+      </p:ext>
+    </p:extLst>
+  </p:cSld>
+  <p:clrMapOvr>
+    <a:masterClrMapping/>
+  </p:clrMapOvr>
+</p:sld>
+</file>
+
+<file path=ppt/slides/slide17.xml><?xml version="1.0" encoding="utf-8"?>
+<p:sld xmlns:a="http://schemas.openxmlformats.org/drawingml/2006/main" xmlns:r="http://schemas.openxmlformats.org/officeDocument/2006/relationships" xmlns:p="http://schemas.openxmlformats.org/presentationml/2006/main">
+  <p:cSld>
+    <p:spTree>
+      <p:nvGrpSpPr>
+        <p:cNvPr id="1" name=""/>
+        <p:cNvGrpSpPr/>
+        <p:nvPr/>
+      </p:nvGrpSpPr>
+      <p:grpSpPr>
+        <a:xfrm>
+          <a:off x="0" y="0"/>
+          <a:ext cx="0" cy="0"/>
+          <a:chOff x="0" y="0"/>
+          <a:chExt cx="0" cy="0"/>
+        </a:xfrm>
+      </p:grpSpPr>
+      <p:sp>
+        <p:nvSpPr>
+          <p:cNvPr id="2" name="Title 1">
+            <a:extLst>
+              <a:ext uri="{FF2B5EF4-FFF2-40B4-BE49-F238E27FC236}">
+                <a16:creationId xmlns:a16="http://schemas.microsoft.com/office/drawing/2014/main" id="{CD84C0C1-70FE-4FCE-A9C9-6C783AE5BCA2}"/>
+              </a:ext>
+            </a:extLst>
+          </p:cNvPr>
+          <p:cNvSpPr>
+            <a:spLocks noGrp="1"/>
+          </p:cNvSpPr>
+          <p:nvPr>
+            <p:ph type="title"/>
+          </p:nvPr>
+        </p:nvSpPr>
+        <p:spPr/>
+        <p:txBody>
+          <a:bodyPr/>
+          <a:lstStyle/>
+          <a:p>
+            <a:r>
+              <a:rPr lang="en-GB" dirty="0"/>
+              <a:t>Next steps</a:t>
+            </a:r>
+          </a:p>
+        </p:txBody>
+      </p:sp>
+      <p:sp>
+        <p:nvSpPr>
+          <p:cNvPr id="3" name="Content Placeholder 2">
+            <a:extLst>
+              <a:ext uri="{FF2B5EF4-FFF2-40B4-BE49-F238E27FC236}">
+                <a16:creationId xmlns:a16="http://schemas.microsoft.com/office/drawing/2014/main" id="{EAAC464D-CD24-4F20-B9E8-DE256CD69653}"/>
+              </a:ext>
+            </a:extLst>
+          </p:cNvPr>
+          <p:cNvSpPr>
+            <a:spLocks noGrp="1"/>
+          </p:cNvSpPr>
+          <p:nvPr>
+            <p:ph idx="1"/>
+          </p:nvPr>
+        </p:nvSpPr>
+        <p:spPr/>
+        <p:txBody>
+          <a:bodyPr/>
+          <a:lstStyle/>
+          <a:p>
+            <a:r>
+              <a:rPr lang="en-GB" dirty="0"/>
+              <a:t>Add functionality to identify feature locations for </a:t>
+            </a:r>
+            <a:r>
+              <a:rPr lang="en-GB" dirty="0" err="1"/>
+              <a:t>nt</a:t>
+            </a:r>
+            <a:r>
+              <a:rPr lang="en-GB" dirty="0"/>
+              <a:t> </a:t>
+            </a:r>
+            <a:r>
+              <a:rPr lang="en-GB" dirty="0" err="1"/>
+              <a:t>metafeature</a:t>
+            </a:r>
+            <a:r>
+              <a:rPr lang="en-GB" dirty="0"/>
+              <a:t> script</a:t>
+            </a:r>
+          </a:p>
+          <a:p>
+            <a:pPr lvl="1">
+              <a:buFontTx/>
+              <a:buChar char="-"/>
+            </a:pPr>
+            <a:r>
+              <a:rPr lang="en-GB" dirty="0"/>
+              <a:t>Codons and Codon pairs would likely be easy</a:t>
+            </a:r>
+          </a:p>
+          <a:p>
+            <a:pPr lvl="1">
+              <a:buFontTx/>
+              <a:buChar char="-"/>
+            </a:pPr>
+            <a:r>
+              <a:rPr lang="en-GB" dirty="0"/>
+              <a:t>Is there a tool or protein database that can identify positions of secondary structural features? Can this data be downloaded for each gene? Will the names be compatible? Ligand binding positions?</a:t>
+            </a:r>
+          </a:p>
+          <a:p>
+            <a:r>
+              <a:rPr lang="en-GB" dirty="0"/>
+              <a:t>Restructure to have one script containing function definitions and another calling the functions.</a:t>
+            </a:r>
+          </a:p>
+        </p:txBody>
+      </p:sp>
+    </p:spTree>
+    <p:extLst>
+      <p:ext uri="{BB962C8B-B14F-4D97-AF65-F5344CB8AC3E}">
+        <p14:creationId xmlns:p14="http://schemas.microsoft.com/office/powerpoint/2010/main" val="1511006915"/>
+      </p:ext>
+    </p:extLst>
+  </p:cSld>
+  <p:clrMapOvr>
+    <a:masterClrMapping/>
+  </p:clrMapOvr>
+</p:sld>
+</file>
+
+<file path=ppt/slides/slide18.xml><?xml version="1.0" encoding="utf-8"?>
+<p:sld xmlns:a="http://schemas.openxmlformats.org/drawingml/2006/main" xmlns:r="http://schemas.openxmlformats.org/officeDocument/2006/relationships" xmlns:p="http://schemas.openxmlformats.org/presentationml/2006/main">
+  <p:cSld>
+    <p:spTree>
+      <p:nvGrpSpPr>
+        <p:cNvPr id="1" name=""/>
+        <p:cNvGrpSpPr/>
+        <p:nvPr/>
+      </p:nvGrpSpPr>
+      <p:grpSpPr>
+        <a:xfrm>
+          <a:off x="0" y="0"/>
+          <a:ext cx="0" cy="0"/>
+          <a:chOff x="0" y="0"/>
+          <a:chExt cx="0" cy="0"/>
+        </a:xfrm>
+      </p:grpSpPr>
+      <p:sp>
+        <p:nvSpPr>
+          <p:cNvPr id="2" name="Title 1">
+            <a:extLst>
+              <a:ext uri="{FF2B5EF4-FFF2-40B4-BE49-F238E27FC236}">
                 <a16:creationId xmlns:a16="http://schemas.microsoft.com/office/drawing/2014/main" id="{ACDBBFD3-C77D-42BD-9492-20B5B068356F}"/>
               </a:ext>
             </a:extLst>
@@ -4055,7 +4480,7 @@
 </p:sld>
 </file>
 
-<file path=ppt/slides/slide16.xml><?xml version="1.0" encoding="utf-8"?>
+<file path=ppt/slides/slide19.xml><?xml version="1.0" encoding="utf-8"?>
 <p:sld xmlns:a="http://schemas.openxmlformats.org/drawingml/2006/main" xmlns:r="http://schemas.openxmlformats.org/officeDocument/2006/relationships" xmlns:p="http://schemas.openxmlformats.org/presentationml/2006/main">
   <p:cSld>
     <p:spTree>
@@ -4808,6 +5233,9 @@
               <a:t>To meet reviewers feedback, some of the confusing names had to be addressed. Pretty tedious work, as numerous files but I got my way through it.</a:t>
             </a:r>
           </a:p>
+          <a:p>
+            <a:endParaRPr lang="en-GB" dirty="0"/>
+          </a:p>
         </p:txBody>
       </p:sp>
     </p:spTree>
@@ -4840,78 +5268,70 @@
           <a:chExt cx="0" cy="0"/>
         </a:xfrm>
       </p:grpSpPr>
-      <p:sp>
-        <p:nvSpPr>
-          <p:cNvPr id="2" name="Title 1">
-            <a:extLst>
-              <a:ext uri="{FF2B5EF4-FFF2-40B4-BE49-F238E27FC236}">
-                <a16:creationId xmlns:a16="http://schemas.microsoft.com/office/drawing/2014/main" id="{768123CA-D61B-44BA-9D9D-7F183FEF3504}"/>
-              </a:ext>
-            </a:extLst>
-          </p:cNvPr>
-          <p:cNvSpPr>
-            <a:spLocks noGrp="1"/>
-          </p:cNvSpPr>
-          <p:nvPr>
-            <p:ph type="title"/>
-          </p:nvPr>
-        </p:nvSpPr>
-        <p:spPr/>
-        <p:txBody>
-          <a:bodyPr/>
-          <a:lstStyle/>
-          <a:p>
-            <a:r>
-              <a:rPr lang="en-GB" dirty="0"/>
-              <a:t>Article writing </a:t>
-            </a:r>
-          </a:p>
-        </p:txBody>
-      </p:sp>
-      <p:sp>
-        <p:nvSpPr>
-          <p:cNvPr id="3" name="Content Placeholder 2">
-            <a:extLst>
-              <a:ext uri="{FF2B5EF4-FFF2-40B4-BE49-F238E27FC236}">
-                <a16:creationId xmlns:a16="http://schemas.microsoft.com/office/drawing/2014/main" id="{17C7A492-2281-44D7-B49A-CB647A365F75}"/>
-              </a:ext>
-            </a:extLst>
-          </p:cNvPr>
-          <p:cNvSpPr>
-            <a:spLocks noGrp="1"/>
-          </p:cNvSpPr>
-          <p:nvPr>
-            <p:ph idx="1"/>
-          </p:nvPr>
-        </p:nvSpPr>
-        <p:spPr/>
-        <p:txBody>
-          <a:bodyPr/>
-          <a:lstStyle/>
-          <a:p>
-            <a:r>
-              <a:rPr lang="en-GB" dirty="0"/>
-              <a:t>Open science as an undergraduate. </a:t>
-            </a:r>
-          </a:p>
-          <a:p>
-            <a:r>
-              <a:rPr lang="en-GB" dirty="0"/>
-              <a:t>look over and evaluate our time with the lab, gain a publication</a:t>
-            </a:r>
-          </a:p>
-          <a:p>
-            <a:r>
-              <a:rPr lang="en-GB" dirty="0"/>
-              <a:t>Practice writing</a:t>
-            </a:r>
-          </a:p>
-        </p:txBody>
-      </p:sp>
+      <p:pic>
+        <p:nvPicPr>
+          <p:cNvPr id="5" name="Picture 4">
+            <a:extLst>
+              <a:ext uri="{FF2B5EF4-FFF2-40B4-BE49-F238E27FC236}">
+                <a16:creationId xmlns:a16="http://schemas.microsoft.com/office/drawing/2014/main" id="{5A9B6B21-7C1A-409D-8589-470F9432CD94}"/>
+              </a:ext>
+            </a:extLst>
+          </p:cNvPr>
+          <p:cNvPicPr>
+            <a:picLocks noChangeAspect="1"/>
+          </p:cNvPicPr>
+          <p:nvPr/>
+        </p:nvPicPr>
+        <p:blipFill>
+          <a:blip r:embed="rId2"/>
+          <a:stretch>
+            <a:fillRect/>
+          </a:stretch>
+        </p:blipFill>
+        <p:spPr>
+          <a:xfrm>
+            <a:off x="161925" y="109537"/>
+            <a:ext cx="5934075" cy="6638925"/>
+          </a:xfrm>
+          <a:prstGeom prst="rect">
+            <a:avLst/>
+          </a:prstGeom>
+        </p:spPr>
+      </p:pic>
+      <p:pic>
+        <p:nvPicPr>
+          <p:cNvPr id="11" name="Picture 10">
+            <a:extLst>
+              <a:ext uri="{FF2B5EF4-FFF2-40B4-BE49-F238E27FC236}">
+                <a16:creationId xmlns:a16="http://schemas.microsoft.com/office/drawing/2014/main" id="{1B6CE6D2-53FC-4EB3-BEE5-821B0FF276D4}"/>
+              </a:ext>
+            </a:extLst>
+          </p:cNvPr>
+          <p:cNvPicPr>
+            <a:picLocks noChangeAspect="1"/>
+          </p:cNvPicPr>
+          <p:nvPr/>
+        </p:nvPicPr>
+        <p:blipFill>
+          <a:blip r:embed="rId3"/>
+          <a:stretch>
+            <a:fillRect/>
+          </a:stretch>
+        </p:blipFill>
+        <p:spPr>
+          <a:xfrm>
+            <a:off x="6096000" y="109537"/>
+            <a:ext cx="6105092" cy="6638924"/>
+          </a:xfrm>
+          <a:prstGeom prst="rect">
+            <a:avLst/>
+          </a:prstGeom>
+        </p:spPr>
+      </p:pic>
     </p:spTree>
     <p:extLst>
       <p:ext uri="{BB962C8B-B14F-4D97-AF65-F5344CB8AC3E}">
-        <p14:creationId xmlns:p14="http://schemas.microsoft.com/office/powerpoint/2010/main" val="2278273156"/>
+        <p14:creationId xmlns:p14="http://schemas.microsoft.com/office/powerpoint/2010/main" val="3808274060"/>
       </p:ext>
     </p:extLst>
   </p:cSld>

</xml_diff>

<commit_message>
added detail to added documentation and added new species and dataset sections
</commit_message>
<xml_diff>
--- a/Rundown-of-our-3-months.pptx
+++ b/Rundown-of-our-3-months.pptx
@@ -4817,7 +4817,7 @@
           <a:p>
             <a:r>
               <a:rPr lang="en-GB" dirty="0"/>
-              <a:t>Upgraded configs </a:t>
+              <a:t>Upgraded configs for riboviz 2.1 release </a:t>
             </a:r>
             <a:br>
               <a:rPr lang="en-GB" dirty="0"/>
@@ -4847,7 +4847,30 @@
           <a:bodyPr/>
           <a:lstStyle/>
           <a:p>
-            <a:endParaRPr lang="en-GB" dirty="0"/>
+            <a:r>
+              <a:rPr lang="en-GB" dirty="0"/>
+              <a:t>Updated configuration </a:t>
+            </a:r>
+            <a:r>
+              <a:rPr lang="en-GB" dirty="0" err="1"/>
+              <a:t>yamls</a:t>
+            </a:r>
+            <a:r>
+              <a:rPr lang="en-GB" dirty="0"/>
+              <a:t> in example-datasets by running </a:t>
+            </a:r>
+            <a:r>
+              <a:rPr lang="en-GB" sz="2600" dirty="0" err="1">
+                <a:latin typeface="Consolas" panose="020B0609020204030204" pitchFamily="49" charset="0"/>
+              </a:rPr>
+              <a:t>riboviz.tools.upgrade_config_file</a:t>
+            </a:r>
+            <a:r>
+              <a:rPr lang="en-GB" sz="2600" dirty="0">
+                <a:latin typeface="Consolas" panose="020B0609020204030204" pitchFamily="49" charset="0"/>
+              </a:rPr>
+              <a:t> </a:t>
+            </a:r>
           </a:p>
         </p:txBody>
       </p:sp>
@@ -4935,14 +4958,42 @@
           <a:lstStyle/>
           <a:p>
             <a:r>
-              <a:rPr lang="en-GB" dirty="0"/>
-              <a:t>How to add new datasets and species </a:t>
-            </a:r>
-          </a:p>
-          <a:p>
-            <a:r>
-              <a:rPr lang="en-GB" dirty="0"/>
-              <a:t>Added checklist for issue tickets</a:t>
+              <a:rPr lang="en-GB" sz="2600" dirty="0">
+                <a:latin typeface="Consolas" panose="020B0609020204030204" pitchFamily="49" charset="0"/>
+              </a:rPr>
+              <a:t>Add-new-dataset.md </a:t>
+            </a:r>
+            <a:r>
+              <a:rPr lang="en-GB" dirty="0"/>
+              <a:t>in riboviz/example-datasets </a:t>
+            </a:r>
+          </a:p>
+          <a:p>
+            <a:pPr lvl="1"/>
+            <a:r>
+              <a:rPr lang="en-GB" dirty="0"/>
+              <a:t>Documentation of steps involved in adding new species and new datasets to the riboviz/example-datasets repository </a:t>
+            </a:r>
+          </a:p>
+          <a:p>
+            <a:pPr marL="457200" lvl="1" indent="0">
+              <a:buNone/>
+            </a:pPr>
+            <a:endParaRPr lang="en-GB" dirty="0"/>
+          </a:p>
+          <a:p>
+            <a:r>
+              <a:rPr lang="en-GB" sz="2600" dirty="0">
+                <a:latin typeface="Consolas" panose="020B0609020204030204" pitchFamily="49" charset="0"/>
+              </a:rPr>
+              <a:t>A template with checklist for adding a new dataset</a:t>
+            </a:r>
+          </a:p>
+          <a:p>
+            <a:pPr lvl="1"/>
+            <a:r>
+              <a:rPr lang="en-GB" dirty="0"/>
+              <a:t>Checklist template you can select when creating an issue ticket for the addition of a new species and/or a new dataset</a:t>
             </a:r>
           </a:p>
         </p:txBody>
@@ -5000,7 +5051,7 @@
           <a:p>
             <a:r>
               <a:rPr lang="en-GB" dirty="0"/>
-              <a:t>Added new dataset</a:t>
+              <a:t>Added new species and dataset</a:t>
             </a:r>
             <a:br>
               <a:rPr lang="en-GB" dirty="0"/>
@@ -5032,8 +5083,59 @@
           <a:p>
             <a:r>
               <a:rPr lang="en-GB" dirty="0"/>
-              <a:t>Follow documentation on adding new species</a:t>
-            </a:r>
+              <a:t>Followed documentation in </a:t>
+            </a:r>
+            <a:r>
+              <a:rPr lang="en-GB" sz="2600" dirty="0">
+                <a:latin typeface="Consolas" panose="020B0609020204030204" pitchFamily="49" charset="0"/>
+              </a:rPr>
+              <a:t>Add-new-dataset.md </a:t>
+            </a:r>
+            <a:r>
+              <a:rPr lang="en-GB" dirty="0"/>
+              <a:t>to test its usability </a:t>
+            </a:r>
+          </a:p>
+          <a:p>
+            <a:r>
+              <a:rPr lang="en-GB" dirty="0"/>
+              <a:t>Added the new species </a:t>
+            </a:r>
+            <a:r>
+              <a:rPr lang="en-GB" i="1" dirty="0"/>
+              <a:t>Histoplasma capsulatum </a:t>
+            </a:r>
+            <a:r>
+              <a:rPr lang="en-GB" dirty="0"/>
+              <a:t>to example-datasets</a:t>
+            </a:r>
+          </a:p>
+          <a:p>
+            <a:pPr lvl="1"/>
+            <a:r>
+              <a:rPr lang="en-GB" dirty="0"/>
+              <a:t>Assembled and tested annotation and contamination files for the species </a:t>
+            </a:r>
+          </a:p>
+          <a:p>
+            <a:r>
+              <a:rPr lang="en-GB" dirty="0"/>
+              <a:t>Added a new dataset for </a:t>
+            </a:r>
+            <a:r>
+              <a:rPr lang="en-GB" i="1" dirty="0"/>
+              <a:t>H. capsulatum </a:t>
+            </a:r>
+            <a:r>
+              <a:rPr lang="en-GB" dirty="0"/>
+              <a:t>from Anita Sil’s lab</a:t>
+            </a:r>
+          </a:p>
+          <a:p>
+            <a:pPr marL="0" indent="0">
+              <a:buNone/>
+            </a:pPr>
+            <a:endParaRPr lang="en-GB" dirty="0"/>
           </a:p>
           <a:p>
             <a:r>

</xml_diff>

<commit_message>
added a sentence for H capsulatum
</commit_message>
<xml_diff>
--- a/Rundown-of-our-3-months.pptx
+++ b/Rundown-of-our-3-months.pptx
@@ -5078,8 +5078,28 @@
         </p:nvSpPr>
         <p:spPr/>
         <p:txBody>
-          <a:bodyPr/>
-          <a:lstStyle/>
+          <a:bodyPr>
+            <a:normAutofit fontScale="92500" lnSpcReduction="10000"/>
+          </a:bodyPr>
+          <a:lstStyle/>
+          <a:p>
+            <a:r>
+              <a:rPr lang="en-GB" dirty="0"/>
+              <a:t>Why </a:t>
+            </a:r>
+            <a:r>
+              <a:rPr lang="en-GB" i="1" dirty="0"/>
+              <a:t>Histoplasma capsulatum: </a:t>
+            </a:r>
+            <a:r>
+              <a:rPr lang="en-GB" dirty="0"/>
+              <a:t>fungal pathogen, commonly observed in immunocompromised patients </a:t>
+            </a:r>
+            <a:endParaRPr lang="en-GB" i="1" dirty="0"/>
+          </a:p>
+          <a:p>
+            <a:endParaRPr lang="en-GB" dirty="0"/>
+          </a:p>
           <a:p>
             <a:r>
               <a:rPr lang="en-GB" dirty="0"/>
@@ -5103,7 +5123,7 @@
             </a:r>
             <a:r>
               <a:rPr lang="en-GB" i="1" dirty="0"/>
-              <a:t>Histoplasma capsulatum </a:t>
+              <a:t>H. capsulatum </a:t>
             </a:r>
             <a:r>
               <a:rPr lang="en-GB" dirty="0"/>
@@ -5136,12 +5156,6 @@
               <a:buNone/>
             </a:pPr>
             <a:endParaRPr lang="en-GB" dirty="0"/>
-          </a:p>
-          <a:p>
-            <a:r>
-              <a:rPr lang="en-GB" dirty="0"/>
-              <a:t>Why Histoplasma?</a:t>
-            </a:r>
           </a:p>
           <a:p>
             <a:r>

</xml_diff>

<commit_message>
added workflow of single codons and codon pair scripts
</commit_message>
<xml_diff>
--- a/Rundown-of-our-3-months.pptx
+++ b/Rundown-of-our-3-months.pptx
@@ -4,6 +4,9 @@
   <p:sldMasterIdLst>
     <p:sldMasterId id="2147483648" r:id="rId1"/>
   </p:sldMasterIdLst>
+  <p:notesMasterIdLst>
+    <p:notesMasterId r:id="rId23"/>
+  </p:notesMasterIdLst>
   <p:sldIdLst>
     <p:sldId id="256" r:id="rId2"/>
     <p:sldId id="257" r:id="rId3"/>
@@ -17,13 +20,15 @@
     <p:sldId id="270" r:id="rId11"/>
     <p:sldId id="262" r:id="rId12"/>
     <p:sldId id="267" r:id="rId13"/>
-    <p:sldId id="268" r:id="rId14"/>
-    <p:sldId id="269" r:id="rId15"/>
-    <p:sldId id="273" r:id="rId16"/>
-    <p:sldId id="274" r:id="rId17"/>
-    <p:sldId id="263" r:id="rId18"/>
-    <p:sldId id="265" r:id="rId19"/>
-    <p:sldId id="266" r:id="rId20"/>
+    <p:sldId id="276" r:id="rId14"/>
+    <p:sldId id="268" r:id="rId15"/>
+    <p:sldId id="275" r:id="rId16"/>
+    <p:sldId id="269" r:id="rId17"/>
+    <p:sldId id="273" r:id="rId18"/>
+    <p:sldId id="274" r:id="rId19"/>
+    <p:sldId id="263" r:id="rId20"/>
+    <p:sldId id="265" r:id="rId21"/>
+    <p:sldId id="266" r:id="rId22"/>
   </p:sldIdLst>
   <p:sldSz cx="12192000" cy="6858000"/>
   <p:notesSz cx="6858000" cy="9144000"/>
@@ -128,6 +133,356 @@
     </p:ext>
   </p:extLst>
 </p:presentation>
+</file>
+
+<file path=ppt/notesMasters/notesMaster1.xml><?xml version="1.0" encoding="utf-8"?>
+<p:notesMaster xmlns:a="http://schemas.openxmlformats.org/drawingml/2006/main" xmlns:r="http://schemas.openxmlformats.org/officeDocument/2006/relationships" xmlns:p="http://schemas.openxmlformats.org/presentationml/2006/main">
+  <p:cSld>
+    <p:bg>
+      <p:bgRef idx="1001">
+        <a:schemeClr val="bg1"/>
+      </p:bgRef>
+    </p:bg>
+    <p:spTree>
+      <p:nvGrpSpPr>
+        <p:cNvPr id="1" name=""/>
+        <p:cNvGrpSpPr/>
+        <p:nvPr/>
+      </p:nvGrpSpPr>
+      <p:grpSpPr>
+        <a:xfrm>
+          <a:off x="0" y="0"/>
+          <a:ext cx="0" cy="0"/>
+          <a:chOff x="0" y="0"/>
+          <a:chExt cx="0" cy="0"/>
+        </a:xfrm>
+      </p:grpSpPr>
+      <p:sp>
+        <p:nvSpPr>
+          <p:cNvPr id="2" name="Header Placeholder 1"/>
+          <p:cNvSpPr>
+            <a:spLocks noGrp="1"/>
+          </p:cNvSpPr>
+          <p:nvPr>
+            <p:ph type="hdr" sz="quarter"/>
+          </p:nvPr>
+        </p:nvSpPr>
+        <p:spPr>
+          <a:xfrm>
+            <a:off x="0" y="0"/>
+            <a:ext cx="2971800" cy="458788"/>
+          </a:xfrm>
+          <a:prstGeom prst="rect">
+            <a:avLst/>
+          </a:prstGeom>
+        </p:spPr>
+        <p:txBody>
+          <a:bodyPr vert="horz" lIns="91440" tIns="45720" rIns="91440" bIns="45720" rtlCol="0"/>
+          <a:lstStyle>
+            <a:lvl1pPr algn="l">
+              <a:defRPr sz="1200"/>
+            </a:lvl1pPr>
+          </a:lstStyle>
+          <a:p>
+            <a:endParaRPr lang="en-GB"/>
+          </a:p>
+        </p:txBody>
+      </p:sp>
+      <p:sp>
+        <p:nvSpPr>
+          <p:cNvPr id="3" name="Date Placeholder 2"/>
+          <p:cNvSpPr>
+            <a:spLocks noGrp="1"/>
+          </p:cNvSpPr>
+          <p:nvPr>
+            <p:ph type="dt" idx="1"/>
+          </p:nvPr>
+        </p:nvSpPr>
+        <p:spPr>
+          <a:xfrm>
+            <a:off x="3884613" y="0"/>
+            <a:ext cx="2971800" cy="458788"/>
+          </a:xfrm>
+          <a:prstGeom prst="rect">
+            <a:avLst/>
+          </a:prstGeom>
+        </p:spPr>
+        <p:txBody>
+          <a:bodyPr vert="horz" lIns="91440" tIns="45720" rIns="91440" bIns="45720" rtlCol="0"/>
+          <a:lstStyle>
+            <a:lvl1pPr algn="r">
+              <a:defRPr sz="1200"/>
+            </a:lvl1pPr>
+          </a:lstStyle>
+          <a:p>
+            <a:fld id="{FD52AC41-1663-4577-8D00-94F262E4E392}" type="datetimeFigureOut">
+              <a:rPr lang="en-GB" smtClean="0"/>
+              <a:t>16/09/2021</a:t>
+            </a:fld>
+            <a:endParaRPr lang="en-GB"/>
+          </a:p>
+        </p:txBody>
+      </p:sp>
+      <p:sp>
+        <p:nvSpPr>
+          <p:cNvPr id="4" name="Slide Image Placeholder 3"/>
+          <p:cNvSpPr>
+            <a:spLocks noGrp="1" noRot="1" noChangeAspect="1"/>
+          </p:cNvSpPr>
+          <p:nvPr>
+            <p:ph type="sldImg" idx="2"/>
+          </p:nvPr>
+        </p:nvSpPr>
+        <p:spPr>
+          <a:xfrm>
+            <a:off x="685800" y="1143000"/>
+            <a:ext cx="5486400" cy="3086100"/>
+          </a:xfrm>
+          <a:prstGeom prst="rect">
+            <a:avLst/>
+          </a:prstGeom>
+          <a:noFill/>
+          <a:ln w="12700">
+            <a:solidFill>
+              <a:prstClr val="black"/>
+            </a:solidFill>
+          </a:ln>
+        </p:spPr>
+        <p:txBody>
+          <a:bodyPr vert="horz" lIns="91440" tIns="45720" rIns="91440" bIns="45720" rtlCol="0" anchor="ctr"/>
+          <a:lstStyle/>
+          <a:p>
+            <a:endParaRPr lang="en-GB"/>
+          </a:p>
+        </p:txBody>
+      </p:sp>
+      <p:sp>
+        <p:nvSpPr>
+          <p:cNvPr id="5" name="Notes Placeholder 4"/>
+          <p:cNvSpPr>
+            <a:spLocks noGrp="1"/>
+          </p:cNvSpPr>
+          <p:nvPr>
+            <p:ph type="body" sz="quarter" idx="3"/>
+          </p:nvPr>
+        </p:nvSpPr>
+        <p:spPr>
+          <a:xfrm>
+            <a:off x="685800" y="4400550"/>
+            <a:ext cx="5486400" cy="3600450"/>
+          </a:xfrm>
+          <a:prstGeom prst="rect">
+            <a:avLst/>
+          </a:prstGeom>
+        </p:spPr>
+        <p:txBody>
+          <a:bodyPr vert="horz" lIns="91440" tIns="45720" rIns="91440" bIns="45720" rtlCol="0"/>
+          <a:lstStyle/>
+          <a:p>
+            <a:pPr lvl="0"/>
+            <a:r>
+              <a:rPr lang="en-US"/>
+              <a:t>Click to edit Master text styles</a:t>
+            </a:r>
+          </a:p>
+          <a:p>
+            <a:pPr lvl="1"/>
+            <a:r>
+              <a:rPr lang="en-US"/>
+              <a:t>Second level</a:t>
+            </a:r>
+          </a:p>
+          <a:p>
+            <a:pPr lvl="2"/>
+            <a:r>
+              <a:rPr lang="en-US"/>
+              <a:t>Third level</a:t>
+            </a:r>
+          </a:p>
+          <a:p>
+            <a:pPr lvl="3"/>
+            <a:r>
+              <a:rPr lang="en-US"/>
+              <a:t>Fourth level</a:t>
+            </a:r>
+          </a:p>
+          <a:p>
+            <a:pPr lvl="4"/>
+            <a:r>
+              <a:rPr lang="en-US"/>
+              <a:t>Fifth level</a:t>
+            </a:r>
+            <a:endParaRPr lang="en-GB"/>
+          </a:p>
+        </p:txBody>
+      </p:sp>
+      <p:sp>
+        <p:nvSpPr>
+          <p:cNvPr id="6" name="Footer Placeholder 5"/>
+          <p:cNvSpPr>
+            <a:spLocks noGrp="1"/>
+          </p:cNvSpPr>
+          <p:nvPr>
+            <p:ph type="ftr" sz="quarter" idx="4"/>
+          </p:nvPr>
+        </p:nvSpPr>
+        <p:spPr>
+          <a:xfrm>
+            <a:off x="0" y="8685213"/>
+            <a:ext cx="2971800" cy="458787"/>
+          </a:xfrm>
+          <a:prstGeom prst="rect">
+            <a:avLst/>
+          </a:prstGeom>
+        </p:spPr>
+        <p:txBody>
+          <a:bodyPr vert="horz" lIns="91440" tIns="45720" rIns="91440" bIns="45720" rtlCol="0" anchor="b"/>
+          <a:lstStyle>
+            <a:lvl1pPr algn="l">
+              <a:defRPr sz="1200"/>
+            </a:lvl1pPr>
+          </a:lstStyle>
+          <a:p>
+            <a:endParaRPr lang="en-GB"/>
+          </a:p>
+        </p:txBody>
+      </p:sp>
+      <p:sp>
+        <p:nvSpPr>
+          <p:cNvPr id="7" name="Slide Number Placeholder 6"/>
+          <p:cNvSpPr>
+            <a:spLocks noGrp="1"/>
+          </p:cNvSpPr>
+          <p:nvPr>
+            <p:ph type="sldNum" sz="quarter" idx="5"/>
+          </p:nvPr>
+        </p:nvSpPr>
+        <p:spPr>
+          <a:xfrm>
+            <a:off x="3884613" y="8685213"/>
+            <a:ext cx="2971800" cy="458787"/>
+          </a:xfrm>
+          <a:prstGeom prst="rect">
+            <a:avLst/>
+          </a:prstGeom>
+        </p:spPr>
+        <p:txBody>
+          <a:bodyPr vert="horz" lIns="91440" tIns="45720" rIns="91440" bIns="45720" rtlCol="0" anchor="b"/>
+          <a:lstStyle>
+            <a:lvl1pPr algn="r">
+              <a:defRPr sz="1200"/>
+            </a:lvl1pPr>
+          </a:lstStyle>
+          <a:p>
+            <a:fld id="{5C6A5481-B4EE-4280-BD96-496AE953E84B}" type="slidenum">
+              <a:rPr lang="en-GB" smtClean="0"/>
+              <a:t>‹#›</a:t>
+            </a:fld>
+            <a:endParaRPr lang="en-GB"/>
+          </a:p>
+        </p:txBody>
+      </p:sp>
+    </p:spTree>
+    <p:extLst>
+      <p:ext uri="{BB962C8B-B14F-4D97-AF65-F5344CB8AC3E}">
+        <p14:creationId xmlns:p14="http://schemas.microsoft.com/office/powerpoint/2010/main" val="4282806385"/>
+      </p:ext>
+    </p:extLst>
+  </p:cSld>
+  <p:clrMap bg1="lt1" tx1="dk1" bg2="lt2" tx2="dk2" accent1="accent1" accent2="accent2" accent3="accent3" accent4="accent4" accent5="accent5" accent6="accent6" hlink="hlink" folHlink="folHlink"/>
+  <p:notesStyle>
+    <a:lvl1pPr marL="0" algn="l" defTabSz="914400" rtl="0" eaLnBrk="1" latinLnBrk="0" hangingPunct="1">
+      <a:defRPr sz="1200" kern="1200">
+        <a:solidFill>
+          <a:schemeClr val="tx1"/>
+        </a:solidFill>
+        <a:latin typeface="+mn-lt"/>
+        <a:ea typeface="+mn-ea"/>
+        <a:cs typeface="+mn-cs"/>
+      </a:defRPr>
+    </a:lvl1pPr>
+    <a:lvl2pPr marL="457200" algn="l" defTabSz="914400" rtl="0" eaLnBrk="1" latinLnBrk="0" hangingPunct="1">
+      <a:defRPr sz="1200" kern="1200">
+        <a:solidFill>
+          <a:schemeClr val="tx1"/>
+        </a:solidFill>
+        <a:latin typeface="+mn-lt"/>
+        <a:ea typeface="+mn-ea"/>
+        <a:cs typeface="+mn-cs"/>
+      </a:defRPr>
+    </a:lvl2pPr>
+    <a:lvl3pPr marL="914400" algn="l" defTabSz="914400" rtl="0" eaLnBrk="1" latinLnBrk="0" hangingPunct="1">
+      <a:defRPr sz="1200" kern="1200">
+        <a:solidFill>
+          <a:schemeClr val="tx1"/>
+        </a:solidFill>
+        <a:latin typeface="+mn-lt"/>
+        <a:ea typeface="+mn-ea"/>
+        <a:cs typeface="+mn-cs"/>
+      </a:defRPr>
+    </a:lvl3pPr>
+    <a:lvl4pPr marL="1371600" algn="l" defTabSz="914400" rtl="0" eaLnBrk="1" latinLnBrk="0" hangingPunct="1">
+      <a:defRPr sz="1200" kern="1200">
+        <a:solidFill>
+          <a:schemeClr val="tx1"/>
+        </a:solidFill>
+        <a:latin typeface="+mn-lt"/>
+        <a:ea typeface="+mn-ea"/>
+        <a:cs typeface="+mn-cs"/>
+      </a:defRPr>
+    </a:lvl4pPr>
+    <a:lvl5pPr marL="1828800" algn="l" defTabSz="914400" rtl="0" eaLnBrk="1" latinLnBrk="0" hangingPunct="1">
+      <a:defRPr sz="1200" kern="1200">
+        <a:solidFill>
+          <a:schemeClr val="tx1"/>
+        </a:solidFill>
+        <a:latin typeface="+mn-lt"/>
+        <a:ea typeface="+mn-ea"/>
+        <a:cs typeface="+mn-cs"/>
+      </a:defRPr>
+    </a:lvl5pPr>
+    <a:lvl6pPr marL="2286000" algn="l" defTabSz="914400" rtl="0" eaLnBrk="1" latinLnBrk="0" hangingPunct="1">
+      <a:defRPr sz="1200" kern="1200">
+        <a:solidFill>
+          <a:schemeClr val="tx1"/>
+        </a:solidFill>
+        <a:latin typeface="+mn-lt"/>
+        <a:ea typeface="+mn-ea"/>
+        <a:cs typeface="+mn-cs"/>
+      </a:defRPr>
+    </a:lvl6pPr>
+    <a:lvl7pPr marL="2743200" algn="l" defTabSz="914400" rtl="0" eaLnBrk="1" latinLnBrk="0" hangingPunct="1">
+      <a:defRPr sz="1200" kern="1200">
+        <a:solidFill>
+          <a:schemeClr val="tx1"/>
+        </a:solidFill>
+        <a:latin typeface="+mn-lt"/>
+        <a:ea typeface="+mn-ea"/>
+        <a:cs typeface="+mn-cs"/>
+      </a:defRPr>
+    </a:lvl7pPr>
+    <a:lvl8pPr marL="3200400" algn="l" defTabSz="914400" rtl="0" eaLnBrk="1" latinLnBrk="0" hangingPunct="1">
+      <a:defRPr sz="1200" kern="1200">
+        <a:solidFill>
+          <a:schemeClr val="tx1"/>
+        </a:solidFill>
+        <a:latin typeface="+mn-lt"/>
+        <a:ea typeface="+mn-ea"/>
+        <a:cs typeface="+mn-cs"/>
+      </a:defRPr>
+    </a:lvl8pPr>
+    <a:lvl9pPr marL="3657600" algn="l" defTabSz="914400" rtl="0" eaLnBrk="1" latinLnBrk="0" hangingPunct="1">
+      <a:defRPr sz="1200" kern="1200">
+        <a:solidFill>
+          <a:schemeClr val="tx1"/>
+        </a:solidFill>
+        <a:latin typeface="+mn-lt"/>
+        <a:ea typeface="+mn-ea"/>
+        <a:cs typeface="+mn-cs"/>
+      </a:defRPr>
+    </a:lvl9pPr>
+  </p:notesStyle>
+</p:notesMaster>
 </file>
 
 <file path=ppt/slideLayouts/slideLayout1.xml><?xml version="1.0" encoding="utf-8"?>
@@ -3676,7 +4031,7 @@
           <a:p>
             <a:r>
               <a:rPr lang="en-GB" dirty="0"/>
-              <a:t>Codon pairs – why, how does it work</a:t>
+              <a:t>Codon pairs – How does it work</a:t>
             </a:r>
             <a:br>
               <a:rPr lang="en-GB" dirty="0"/>
@@ -3685,28 +4040,498 @@
           </a:p>
         </p:txBody>
       </p:sp>
-      <p:sp>
-        <p:nvSpPr>
-          <p:cNvPr id="3" name="Content Placeholder 2">
-            <a:extLst>
-              <a:ext uri="{FF2B5EF4-FFF2-40B4-BE49-F238E27FC236}">
-                <a16:creationId xmlns:a16="http://schemas.microsoft.com/office/drawing/2014/main" id="{75BE0852-4FA5-4A4E-A9C2-FC680D756790}"/>
-              </a:ext>
-            </a:extLst>
-          </p:cNvPr>
-          <p:cNvSpPr>
-            <a:spLocks noGrp="1"/>
-          </p:cNvSpPr>
-          <p:nvPr>
-            <p:ph idx="1"/>
-          </p:nvPr>
-        </p:nvSpPr>
-        <p:spPr/>
-        <p:txBody>
-          <a:bodyPr/>
-          <a:lstStyle/>
-          <a:p>
+      <p:pic>
+        <p:nvPicPr>
+          <p:cNvPr id="7" name="Picture 6">
+            <a:extLst>
+              <a:ext uri="{FF2B5EF4-FFF2-40B4-BE49-F238E27FC236}">
+                <a16:creationId xmlns:a16="http://schemas.microsoft.com/office/drawing/2014/main" id="{E05771E5-1EBE-434E-8DB4-8406028DD55B}"/>
+              </a:ext>
+            </a:extLst>
+          </p:cNvPr>
+          <p:cNvPicPr>
+            <a:picLocks noChangeAspect="1"/>
+          </p:cNvPicPr>
+          <p:nvPr/>
+        </p:nvPicPr>
+        <p:blipFill rotWithShape="1">
+          <a:blip r:embed="rId2"/>
+          <a:srcRect t="7306"/>
+          <a:stretch/>
+        </p:blipFill>
+        <p:spPr>
+          <a:xfrm>
+            <a:off x="7099804" y="4747734"/>
+            <a:ext cx="4171950" cy="1862930"/>
+          </a:xfrm>
+          <a:prstGeom prst="rect">
+            <a:avLst/>
+          </a:prstGeom>
+          <a:ln w="19050">
+            <a:solidFill>
+              <a:schemeClr val="accent2"/>
+            </a:solidFill>
+          </a:ln>
+        </p:spPr>
+      </p:pic>
+      <p:pic>
+        <p:nvPicPr>
+          <p:cNvPr id="11" name="Picture 10">
+            <a:extLst>
+              <a:ext uri="{FF2B5EF4-FFF2-40B4-BE49-F238E27FC236}">
+                <a16:creationId xmlns:a16="http://schemas.microsoft.com/office/drawing/2014/main" id="{AE5A8275-0843-46B2-97B8-1AEC9EB322C4}"/>
+              </a:ext>
+            </a:extLst>
+          </p:cNvPr>
+          <p:cNvPicPr>
+            <a:picLocks noChangeAspect="1"/>
+          </p:cNvPicPr>
+          <p:nvPr/>
+        </p:nvPicPr>
+        <p:blipFill rotWithShape="1">
+          <a:blip r:embed="rId3"/>
+          <a:srcRect t="7170"/>
+          <a:stretch/>
+        </p:blipFill>
+        <p:spPr>
+          <a:xfrm>
+            <a:off x="2230773" y="4524131"/>
+            <a:ext cx="1571625" cy="1901030"/>
+          </a:xfrm>
+          <a:prstGeom prst="rect">
+            <a:avLst/>
+          </a:prstGeom>
+          <a:ln w="19050">
+            <a:solidFill>
+              <a:schemeClr val="accent2"/>
+            </a:solidFill>
+          </a:ln>
+        </p:spPr>
+      </p:pic>
+      <p:sp>
+        <p:nvSpPr>
+          <p:cNvPr id="12" name="TextBox 11">
+            <a:extLst>
+              <a:ext uri="{FF2B5EF4-FFF2-40B4-BE49-F238E27FC236}">
+                <a16:creationId xmlns:a16="http://schemas.microsoft.com/office/drawing/2014/main" id="{CA2204CA-9C29-4C47-80B2-78ABE1EEEDED}"/>
+              </a:ext>
+            </a:extLst>
+          </p:cNvPr>
+          <p:cNvSpPr txBox="1"/>
+          <p:nvPr/>
+        </p:nvSpPr>
+        <p:spPr>
+          <a:xfrm>
+            <a:off x="1452493" y="1519021"/>
+            <a:ext cx="2682292" cy="1328023"/>
+          </a:xfrm>
+          <a:prstGeom prst="roundRect">
+            <a:avLst/>
+          </a:prstGeom>
+          <a:ln>
+            <a:solidFill>
+              <a:schemeClr val="accent2"/>
+            </a:solidFill>
+          </a:ln>
+        </p:spPr>
+        <p:style>
+          <a:lnRef idx="2">
+            <a:schemeClr val="accent2"/>
+          </a:lnRef>
+          <a:fillRef idx="1">
+            <a:schemeClr val="lt1"/>
+          </a:fillRef>
+          <a:effectRef idx="0">
+            <a:schemeClr val="accent2"/>
+          </a:effectRef>
+          <a:fontRef idx="minor">
+            <a:schemeClr val="dk1"/>
+          </a:fontRef>
+        </p:style>
+        <p:txBody>
+          <a:bodyPr wrap="square" rtlCol="0">
+            <a:spAutoFit/>
+          </a:bodyPr>
+          <a:lstStyle/>
+          <a:p>
+            <a:pPr marL="285750" indent="-285750">
+              <a:buFont typeface="Arial" panose="020B0604020202020204" pitchFamily="34" charset="0"/>
+              <a:buChar char="•"/>
+            </a:pPr>
+            <a:r>
+              <a:rPr lang="en-GB" dirty="0"/>
+              <a:t>H5</a:t>
+            </a:r>
+          </a:p>
+          <a:p>
+            <a:pPr marL="285750" indent="-285750">
+              <a:buFont typeface="Arial" panose="020B0604020202020204" pitchFamily="34" charset="0"/>
+              <a:buChar char="•"/>
+            </a:pPr>
+            <a:r>
+              <a:rPr lang="en-GB" dirty="0"/>
+              <a:t>GFF3</a:t>
+            </a:r>
+          </a:p>
+          <a:p>
+            <a:pPr marL="285750" indent="-285750">
+              <a:buFont typeface="Arial" panose="020B0604020202020204" pitchFamily="34" charset="0"/>
+              <a:buChar char="•"/>
+            </a:pPr>
+            <a:r>
+              <a:rPr lang="en-GB" dirty="0"/>
+              <a:t>Codon positions table</a:t>
+            </a:r>
+          </a:p>
+          <a:p>
+            <a:pPr marL="285750" indent="-285750">
+              <a:buFont typeface="Arial" panose="020B0604020202020204" pitchFamily="34" charset="0"/>
+              <a:buChar char="•"/>
+            </a:pPr>
+            <a:r>
+              <a:rPr lang="en-GB" dirty="0"/>
+              <a:t>A site displacement </a:t>
+            </a:r>
+          </a:p>
+        </p:txBody>
+      </p:sp>
+      <p:pic>
+        <p:nvPicPr>
+          <p:cNvPr id="16" name="Content Placeholder 4">
+            <a:extLst>
+              <a:ext uri="{FF2B5EF4-FFF2-40B4-BE49-F238E27FC236}">
+                <a16:creationId xmlns:a16="http://schemas.microsoft.com/office/drawing/2014/main" id="{197A37B8-A93A-4026-9F86-7EB96ECE7589}"/>
+              </a:ext>
+            </a:extLst>
+          </p:cNvPr>
+          <p:cNvPicPr>
+            <a:picLocks noChangeAspect="1"/>
+          </p:cNvPicPr>
+          <p:nvPr/>
+        </p:nvPicPr>
+        <p:blipFill rotWithShape="1">
+          <a:blip r:embed="rId4"/>
+          <a:srcRect l="-721" t="6703" r="-1202" b="1820"/>
+          <a:stretch/>
+        </p:blipFill>
+        <p:spPr>
+          <a:xfrm>
+            <a:off x="7181002" y="1198558"/>
+            <a:ext cx="3558505" cy="1716527"/>
+          </a:xfrm>
+          <a:prstGeom prst="rect">
+            <a:avLst/>
+          </a:prstGeom>
+          <a:ln w="19050">
+            <a:solidFill>
+              <a:schemeClr val="accent2"/>
+            </a:solidFill>
+          </a:ln>
+        </p:spPr>
+      </p:pic>
+      <p:sp>
+        <p:nvSpPr>
+          <p:cNvPr id="3" name="Arrow: Right 2">
+            <a:extLst>
+              <a:ext uri="{FF2B5EF4-FFF2-40B4-BE49-F238E27FC236}">
+                <a16:creationId xmlns:a16="http://schemas.microsoft.com/office/drawing/2014/main" id="{0C68FF1F-4EF7-48A2-A910-4C92CCBA09FA}"/>
+              </a:ext>
+            </a:extLst>
+          </p:cNvPr>
+          <p:cNvSpPr/>
+          <p:nvPr/>
+        </p:nvSpPr>
+        <p:spPr>
+          <a:xfrm>
+            <a:off x="5051369" y="2060090"/>
+            <a:ext cx="880844" cy="364615"/>
+          </a:xfrm>
+          <a:prstGeom prst="rightArrow">
+            <a:avLst/>
+          </a:prstGeom>
+        </p:spPr>
+        <p:style>
+          <a:lnRef idx="2">
+            <a:schemeClr val="accent5">
+              <a:shade val="50000"/>
+            </a:schemeClr>
+          </a:lnRef>
+          <a:fillRef idx="1">
+            <a:schemeClr val="accent5"/>
+          </a:fillRef>
+          <a:effectRef idx="0">
+            <a:schemeClr val="accent5"/>
+          </a:effectRef>
+          <a:fontRef idx="minor">
+            <a:schemeClr val="lt1"/>
+          </a:fontRef>
+        </p:style>
+        <p:txBody>
+          <a:bodyPr rtlCol="0" anchor="ctr"/>
+          <a:lstStyle/>
+          <a:p>
+            <a:pPr algn="ctr"/>
+            <a:endParaRPr lang="en-GB" dirty="0"/>
+          </a:p>
+        </p:txBody>
+      </p:sp>
+      <p:sp>
+        <p:nvSpPr>
+          <p:cNvPr id="8" name="Arrow: Right 7">
+            <a:extLst>
+              <a:ext uri="{FF2B5EF4-FFF2-40B4-BE49-F238E27FC236}">
+                <a16:creationId xmlns:a16="http://schemas.microsoft.com/office/drawing/2014/main" id="{DEEE1FD4-1575-4D33-A322-6CCF92CFE352}"/>
+              </a:ext>
+            </a:extLst>
+          </p:cNvPr>
+          <p:cNvSpPr/>
+          <p:nvPr/>
+        </p:nvSpPr>
+        <p:spPr>
+          <a:xfrm rot="5400000">
+            <a:off x="8563049" y="3760609"/>
+            <a:ext cx="880844" cy="364615"/>
+          </a:xfrm>
+          <a:prstGeom prst="rightArrow">
+            <a:avLst/>
+          </a:prstGeom>
+        </p:spPr>
+        <p:style>
+          <a:lnRef idx="2">
+            <a:schemeClr val="accent5">
+              <a:shade val="50000"/>
+            </a:schemeClr>
+          </a:lnRef>
+          <a:fillRef idx="1">
+            <a:schemeClr val="accent5"/>
+          </a:fillRef>
+          <a:effectRef idx="0">
+            <a:schemeClr val="accent5"/>
+          </a:effectRef>
+          <a:fontRef idx="minor">
+            <a:schemeClr val="lt1"/>
+          </a:fontRef>
+        </p:style>
+        <p:txBody>
+          <a:bodyPr rtlCol="0" anchor="ctr"/>
+          <a:lstStyle/>
+          <a:p>
+            <a:pPr algn="ctr"/>
             <a:endParaRPr lang="en-GB"/>
+          </a:p>
+        </p:txBody>
+      </p:sp>
+      <p:sp>
+        <p:nvSpPr>
+          <p:cNvPr id="9" name="Arrow: Right 8">
+            <a:extLst>
+              <a:ext uri="{FF2B5EF4-FFF2-40B4-BE49-F238E27FC236}">
+                <a16:creationId xmlns:a16="http://schemas.microsoft.com/office/drawing/2014/main" id="{1B2EA1CD-86EA-46E8-A2F0-3F964250A696}"/>
+              </a:ext>
+            </a:extLst>
+          </p:cNvPr>
+          <p:cNvSpPr/>
+          <p:nvPr/>
+        </p:nvSpPr>
+        <p:spPr>
+          <a:xfrm rot="10800000">
+            <a:off x="5092197" y="5355423"/>
+            <a:ext cx="880844" cy="364615"/>
+          </a:xfrm>
+          <a:prstGeom prst="rightArrow">
+            <a:avLst/>
+          </a:prstGeom>
+        </p:spPr>
+        <p:style>
+          <a:lnRef idx="2">
+            <a:schemeClr val="accent5">
+              <a:shade val="50000"/>
+            </a:schemeClr>
+          </a:lnRef>
+          <a:fillRef idx="1">
+            <a:schemeClr val="accent5"/>
+          </a:fillRef>
+          <a:effectRef idx="0">
+            <a:schemeClr val="accent5"/>
+          </a:effectRef>
+          <a:fontRef idx="minor">
+            <a:schemeClr val="lt1"/>
+          </a:fontRef>
+        </p:style>
+        <p:txBody>
+          <a:bodyPr rtlCol="0" anchor="ctr"/>
+          <a:lstStyle/>
+          <a:p>
+            <a:pPr algn="ctr"/>
+            <a:endParaRPr lang="en-GB" dirty="0"/>
+          </a:p>
+        </p:txBody>
+      </p:sp>
+      <p:sp>
+        <p:nvSpPr>
+          <p:cNvPr id="15" name="TextBox 14">
+            <a:extLst>
+              <a:ext uri="{FF2B5EF4-FFF2-40B4-BE49-F238E27FC236}">
+                <a16:creationId xmlns:a16="http://schemas.microsoft.com/office/drawing/2014/main" id="{066EB376-928B-4E48-92C3-B5D5D11F4775}"/>
+              </a:ext>
+            </a:extLst>
+          </p:cNvPr>
+          <p:cNvSpPr txBox="1"/>
+          <p:nvPr/>
+        </p:nvSpPr>
+        <p:spPr>
+          <a:xfrm>
+            <a:off x="9654505" y="3523338"/>
+            <a:ext cx="1851302" cy="715089"/>
+          </a:xfrm>
+          <a:prstGeom prst="roundRect">
+            <a:avLst/>
+          </a:prstGeom>
+          <a:ln/>
+        </p:spPr>
+        <p:style>
+          <a:lnRef idx="2">
+            <a:schemeClr val="accent2"/>
+          </a:lnRef>
+          <a:fillRef idx="1">
+            <a:schemeClr val="lt1"/>
+          </a:fillRef>
+          <a:effectRef idx="0">
+            <a:schemeClr val="accent2"/>
+          </a:effectRef>
+          <a:fontRef idx="minor">
+            <a:schemeClr val="dk1"/>
+          </a:fontRef>
+        </p:style>
+        <p:txBody>
+          <a:bodyPr wrap="square" rtlCol="0">
+            <a:spAutoFit/>
+          </a:bodyPr>
+          <a:lstStyle/>
+          <a:p>
+            <a:pPr marL="285750" indent="-285750">
+              <a:buFont typeface="Arial" panose="020B0604020202020204" pitchFamily="34" charset="0"/>
+              <a:buChar char="•"/>
+            </a:pPr>
+            <a:r>
+              <a:rPr lang="en-GB" dirty="0"/>
+              <a:t>Codon Pair </a:t>
+            </a:r>
+          </a:p>
+          <a:p>
+            <a:pPr marL="285750" indent="-285750">
+              <a:buFont typeface="Arial" panose="020B0604020202020204" pitchFamily="34" charset="0"/>
+              <a:buChar char="•"/>
+            </a:pPr>
+            <a:r>
+              <a:rPr lang="en-GB" dirty="0"/>
+              <a:t>Expand width </a:t>
+            </a:r>
+          </a:p>
+        </p:txBody>
+      </p:sp>
+      <p:sp>
+        <p:nvSpPr>
+          <p:cNvPr id="5" name="TextBox 4">
+            <a:extLst>
+              <a:ext uri="{FF2B5EF4-FFF2-40B4-BE49-F238E27FC236}">
+                <a16:creationId xmlns:a16="http://schemas.microsoft.com/office/drawing/2014/main" id="{3A71B225-DAD1-472B-9C80-5F429967FF42}"/>
+              </a:ext>
+            </a:extLst>
+          </p:cNvPr>
+          <p:cNvSpPr txBox="1"/>
+          <p:nvPr/>
+        </p:nvSpPr>
+        <p:spPr>
+          <a:xfrm>
+            <a:off x="4587536" y="1235326"/>
+            <a:ext cx="2183269" cy="830997"/>
+          </a:xfrm>
+          <a:prstGeom prst="rect">
+            <a:avLst/>
+          </a:prstGeom>
+          <a:noFill/>
+        </p:spPr>
+        <p:txBody>
+          <a:bodyPr wrap="square" rtlCol="0">
+            <a:spAutoFit/>
+          </a:bodyPr>
+          <a:lstStyle/>
+          <a:p>
+            <a:r>
+              <a:rPr lang="en-GB" sz="1600" dirty="0"/>
+              <a:t>Generate a table of Genes, positions, counts and codon pairs </a:t>
+            </a:r>
+          </a:p>
+        </p:txBody>
+      </p:sp>
+      <p:sp>
+        <p:nvSpPr>
+          <p:cNvPr id="6" name="TextBox 5">
+            <a:extLst>
+              <a:ext uri="{FF2B5EF4-FFF2-40B4-BE49-F238E27FC236}">
+                <a16:creationId xmlns:a16="http://schemas.microsoft.com/office/drawing/2014/main" id="{8851D584-BD63-47E4-95CA-035623B31CEF}"/>
+              </a:ext>
+            </a:extLst>
+          </p:cNvPr>
+          <p:cNvSpPr txBox="1"/>
+          <p:nvPr/>
+        </p:nvSpPr>
+        <p:spPr>
+          <a:xfrm>
+            <a:off x="6893766" y="3415911"/>
+            <a:ext cx="2066488" cy="830997"/>
+          </a:xfrm>
+          <a:prstGeom prst="rect">
+            <a:avLst/>
+          </a:prstGeom>
+          <a:noFill/>
+        </p:spPr>
+        <p:txBody>
+          <a:bodyPr wrap="square" rtlCol="0">
+            <a:spAutoFit/>
+          </a:bodyPr>
+          <a:lstStyle/>
+          <a:p>
+            <a:r>
+              <a:rPr lang="en-GB" sz="1600" dirty="0"/>
+              <a:t>Slice a window of positions around the codon of interest </a:t>
+            </a:r>
+          </a:p>
+        </p:txBody>
+      </p:sp>
+      <p:sp>
+        <p:nvSpPr>
+          <p:cNvPr id="10" name="TextBox 9">
+            <a:extLst>
+              <a:ext uri="{FF2B5EF4-FFF2-40B4-BE49-F238E27FC236}">
+                <a16:creationId xmlns:a16="http://schemas.microsoft.com/office/drawing/2014/main" id="{DB8661FD-2A95-411E-8466-663C10CD5790}"/>
+              </a:ext>
+            </a:extLst>
+          </p:cNvPr>
+          <p:cNvSpPr txBox="1"/>
+          <p:nvPr/>
+        </p:nvSpPr>
+        <p:spPr>
+          <a:xfrm>
+            <a:off x="4710497" y="4278205"/>
+            <a:ext cx="2183269" cy="1077218"/>
+          </a:xfrm>
+          <a:prstGeom prst="rect">
+            <a:avLst/>
+          </a:prstGeom>
+          <a:noFill/>
+        </p:spPr>
+        <p:txBody>
+          <a:bodyPr wrap="square" rtlCol="0">
+            <a:spAutoFit/>
+          </a:bodyPr>
+          <a:lstStyle/>
+          <a:p>
+            <a:r>
+              <a:rPr lang="en-GB" sz="1600" dirty="0"/>
+              <a:t>Calculate the Relative count for all occurrences of the codon of interest </a:t>
+            </a:r>
           </a:p>
         </p:txBody>
       </p:sp>
@@ -3745,7 +4570,7 @@
           <p:cNvPr id="2" name="Title 1">
             <a:extLst>
               <a:ext uri="{FF2B5EF4-FFF2-40B4-BE49-F238E27FC236}">
-                <a16:creationId xmlns:a16="http://schemas.microsoft.com/office/drawing/2014/main" id="{565200E1-D110-4281-91EB-14B2141C87DB}"/>
+                <a16:creationId xmlns:a16="http://schemas.microsoft.com/office/drawing/2014/main" id="{0C1AB04C-F691-4CE2-9CA8-3E2C4F9D161C}"/>
               </a:ext>
             </a:extLst>
           </p:cNvPr>
@@ -3758,51 +4583,72 @@
         </p:nvSpPr>
         <p:spPr/>
         <p:txBody>
-          <a:bodyPr>
-            <a:normAutofit fontScale="90000"/>
-          </a:bodyPr>
-          <a:lstStyle/>
-          <a:p>
-            <a:r>
-              <a:rPr lang="en-GB" dirty="0"/>
-              <a:t>Single codons – why, how does it work, outputs</a:t>
-            </a:r>
-            <a:br>
-              <a:rPr lang="en-GB" dirty="0"/>
-            </a:br>
+          <a:bodyPr/>
+          <a:lstStyle/>
+          <a:p>
+            <a:endParaRPr lang="en-GB"/>
+          </a:p>
+        </p:txBody>
+      </p:sp>
+      <p:sp>
+        <p:nvSpPr>
+          <p:cNvPr id="7" name="Content Placeholder 6">
+            <a:extLst>
+              <a:ext uri="{FF2B5EF4-FFF2-40B4-BE49-F238E27FC236}">
+                <a16:creationId xmlns:a16="http://schemas.microsoft.com/office/drawing/2014/main" id="{07A5F777-67ED-4892-8644-2C271AC7A2D2}"/>
+              </a:ext>
+            </a:extLst>
+          </p:cNvPr>
+          <p:cNvSpPr>
+            <a:spLocks noGrp="1"/>
+          </p:cNvSpPr>
+          <p:nvPr>
+            <p:ph idx="1"/>
+          </p:nvPr>
+        </p:nvSpPr>
+        <p:spPr/>
+        <p:txBody>
+          <a:bodyPr/>
+          <a:lstStyle/>
+          <a:p>
             <a:endParaRPr lang="en-GB" dirty="0"/>
           </a:p>
         </p:txBody>
       </p:sp>
-      <p:sp>
-        <p:nvSpPr>
-          <p:cNvPr id="3" name="Content Placeholder 2">
-            <a:extLst>
-              <a:ext uri="{FF2B5EF4-FFF2-40B4-BE49-F238E27FC236}">
-                <a16:creationId xmlns:a16="http://schemas.microsoft.com/office/drawing/2014/main" id="{3BE85511-19BB-47D8-8F60-120F887A7460}"/>
-              </a:ext>
-            </a:extLst>
-          </p:cNvPr>
-          <p:cNvSpPr>
-            <a:spLocks noGrp="1"/>
-          </p:cNvSpPr>
-          <p:nvPr>
-            <p:ph idx="1"/>
-          </p:nvPr>
-        </p:nvSpPr>
-        <p:spPr/>
-        <p:txBody>
-          <a:bodyPr/>
-          <a:lstStyle/>
-          <a:p>
-            <a:endParaRPr lang="en-GB"/>
-          </a:p>
-        </p:txBody>
-      </p:sp>
+      <p:pic>
+        <p:nvPicPr>
+          <p:cNvPr id="9" name="Picture 8">
+            <a:extLst>
+              <a:ext uri="{FF2B5EF4-FFF2-40B4-BE49-F238E27FC236}">
+                <a16:creationId xmlns:a16="http://schemas.microsoft.com/office/drawing/2014/main" id="{240ADD49-7855-4140-9633-E8D3C293C8FD}"/>
+              </a:ext>
+            </a:extLst>
+          </p:cNvPr>
+          <p:cNvPicPr>
+            <a:picLocks noChangeAspect="1"/>
+          </p:cNvPicPr>
+          <p:nvPr/>
+        </p:nvPicPr>
+        <p:blipFill>
+          <a:blip r:embed="rId2"/>
+          <a:stretch>
+            <a:fillRect/>
+          </a:stretch>
+        </p:blipFill>
+        <p:spPr>
+          <a:xfrm>
+            <a:off x="3343275" y="1128712"/>
+            <a:ext cx="5505450" cy="4600575"/>
+          </a:xfrm>
+          <a:prstGeom prst="rect">
+            <a:avLst/>
+          </a:prstGeom>
+        </p:spPr>
+      </p:pic>
     </p:spTree>
     <p:extLst>
       <p:ext uri="{BB962C8B-B14F-4D97-AF65-F5344CB8AC3E}">
-        <p14:creationId xmlns:p14="http://schemas.microsoft.com/office/powerpoint/2010/main" val="152534160"/>
+        <p14:creationId xmlns:p14="http://schemas.microsoft.com/office/powerpoint/2010/main" val="463625301"/>
       </p:ext>
     </p:extLst>
   </p:cSld>
@@ -3834,6 +4680,660 @@
           <p:cNvPr id="2" name="Title 1">
             <a:extLst>
               <a:ext uri="{FF2B5EF4-FFF2-40B4-BE49-F238E27FC236}">
+                <a16:creationId xmlns:a16="http://schemas.microsoft.com/office/drawing/2014/main" id="{565200E1-D110-4281-91EB-14B2141C87DB}"/>
+              </a:ext>
+            </a:extLst>
+          </p:cNvPr>
+          <p:cNvSpPr>
+            <a:spLocks noGrp="1"/>
+          </p:cNvSpPr>
+          <p:nvPr>
+            <p:ph type="title"/>
+          </p:nvPr>
+        </p:nvSpPr>
+        <p:spPr/>
+        <p:txBody>
+          <a:bodyPr>
+            <a:normAutofit fontScale="90000"/>
+          </a:bodyPr>
+          <a:lstStyle/>
+          <a:p>
+            <a:r>
+              <a:rPr lang="en-GB" dirty="0"/>
+              <a:t>Single codons – why, how does it work, outputs</a:t>
+            </a:r>
+            <a:br>
+              <a:rPr lang="en-GB" dirty="0"/>
+            </a:br>
+            <a:endParaRPr lang="en-GB" dirty="0"/>
+          </a:p>
+        </p:txBody>
+      </p:sp>
+      <p:sp>
+        <p:nvSpPr>
+          <p:cNvPr id="6" name="TextBox 5">
+            <a:extLst>
+              <a:ext uri="{FF2B5EF4-FFF2-40B4-BE49-F238E27FC236}">
+                <a16:creationId xmlns:a16="http://schemas.microsoft.com/office/drawing/2014/main" id="{DBEA53B3-731F-44F1-8628-28FA4ACD61B3}"/>
+              </a:ext>
+            </a:extLst>
+          </p:cNvPr>
+          <p:cNvSpPr txBox="1"/>
+          <p:nvPr/>
+        </p:nvSpPr>
+        <p:spPr>
+          <a:xfrm>
+            <a:off x="1678975" y="1462713"/>
+            <a:ext cx="2682292" cy="1328023"/>
+          </a:xfrm>
+          <a:prstGeom prst="roundRect">
+            <a:avLst/>
+          </a:prstGeom>
+          <a:ln>
+            <a:solidFill>
+              <a:schemeClr val="accent2"/>
+            </a:solidFill>
+          </a:ln>
+        </p:spPr>
+        <p:style>
+          <a:lnRef idx="2">
+            <a:schemeClr val="accent2"/>
+          </a:lnRef>
+          <a:fillRef idx="1">
+            <a:schemeClr val="lt1"/>
+          </a:fillRef>
+          <a:effectRef idx="0">
+            <a:schemeClr val="accent2"/>
+          </a:effectRef>
+          <a:fontRef idx="minor">
+            <a:schemeClr val="dk1"/>
+          </a:fontRef>
+        </p:style>
+        <p:txBody>
+          <a:bodyPr wrap="square" rtlCol="0">
+            <a:spAutoFit/>
+          </a:bodyPr>
+          <a:lstStyle/>
+          <a:p>
+            <a:pPr marL="285750" indent="-285750">
+              <a:buFont typeface="Arial" panose="020B0604020202020204" pitchFamily="34" charset="0"/>
+              <a:buChar char="•"/>
+            </a:pPr>
+            <a:r>
+              <a:rPr lang="en-GB" dirty="0"/>
+              <a:t>H5</a:t>
+            </a:r>
+          </a:p>
+          <a:p>
+            <a:pPr marL="285750" indent="-285750">
+              <a:buFont typeface="Arial" panose="020B0604020202020204" pitchFamily="34" charset="0"/>
+              <a:buChar char="•"/>
+            </a:pPr>
+            <a:r>
+              <a:rPr lang="en-GB" dirty="0"/>
+              <a:t>GFF3</a:t>
+            </a:r>
+          </a:p>
+          <a:p>
+            <a:pPr marL="285750" indent="-285750">
+              <a:buFont typeface="Arial" panose="020B0604020202020204" pitchFamily="34" charset="0"/>
+              <a:buChar char="•"/>
+            </a:pPr>
+            <a:r>
+              <a:rPr lang="en-GB" dirty="0"/>
+              <a:t>Codon positions table</a:t>
+            </a:r>
+          </a:p>
+          <a:p>
+            <a:pPr marL="285750" indent="-285750">
+              <a:buFont typeface="Arial" panose="020B0604020202020204" pitchFamily="34" charset="0"/>
+              <a:buChar char="•"/>
+            </a:pPr>
+            <a:r>
+              <a:rPr lang="en-GB" dirty="0"/>
+              <a:t>A site displacement </a:t>
+            </a:r>
+          </a:p>
+        </p:txBody>
+      </p:sp>
+      <p:sp>
+        <p:nvSpPr>
+          <p:cNvPr id="8" name="Arrow: Right 7">
+            <a:extLst>
+              <a:ext uri="{FF2B5EF4-FFF2-40B4-BE49-F238E27FC236}">
+                <a16:creationId xmlns:a16="http://schemas.microsoft.com/office/drawing/2014/main" id="{C9FB61D7-6510-402F-A5AA-933B1DE17D64}"/>
+              </a:ext>
+            </a:extLst>
+          </p:cNvPr>
+          <p:cNvSpPr/>
+          <p:nvPr/>
+        </p:nvSpPr>
+        <p:spPr>
+          <a:xfrm>
+            <a:off x="5051369" y="2060090"/>
+            <a:ext cx="880844" cy="364615"/>
+          </a:xfrm>
+          <a:prstGeom prst="rightArrow">
+            <a:avLst/>
+          </a:prstGeom>
+        </p:spPr>
+        <p:style>
+          <a:lnRef idx="2">
+            <a:schemeClr val="accent5">
+              <a:shade val="50000"/>
+            </a:schemeClr>
+          </a:lnRef>
+          <a:fillRef idx="1">
+            <a:schemeClr val="accent5"/>
+          </a:fillRef>
+          <a:effectRef idx="0">
+            <a:schemeClr val="accent5"/>
+          </a:effectRef>
+          <a:fontRef idx="minor">
+            <a:schemeClr val="lt1"/>
+          </a:fontRef>
+        </p:style>
+        <p:txBody>
+          <a:bodyPr rtlCol="0" anchor="ctr"/>
+          <a:lstStyle/>
+          <a:p>
+            <a:pPr algn="ctr"/>
+            <a:endParaRPr lang="en-GB" dirty="0"/>
+          </a:p>
+        </p:txBody>
+      </p:sp>
+      <p:sp>
+        <p:nvSpPr>
+          <p:cNvPr id="9" name="Arrow: Right 8">
+            <a:extLst>
+              <a:ext uri="{FF2B5EF4-FFF2-40B4-BE49-F238E27FC236}">
+                <a16:creationId xmlns:a16="http://schemas.microsoft.com/office/drawing/2014/main" id="{9BC43008-A1EF-4502-BC37-46E1A2198891}"/>
+              </a:ext>
+            </a:extLst>
+          </p:cNvPr>
+          <p:cNvSpPr/>
+          <p:nvPr/>
+        </p:nvSpPr>
+        <p:spPr>
+          <a:xfrm rot="5400000">
+            <a:off x="8146377" y="3507447"/>
+            <a:ext cx="880844" cy="364615"/>
+          </a:xfrm>
+          <a:prstGeom prst="rightArrow">
+            <a:avLst/>
+          </a:prstGeom>
+        </p:spPr>
+        <p:style>
+          <a:lnRef idx="2">
+            <a:schemeClr val="accent5">
+              <a:shade val="50000"/>
+            </a:schemeClr>
+          </a:lnRef>
+          <a:fillRef idx="1">
+            <a:schemeClr val="accent5"/>
+          </a:fillRef>
+          <a:effectRef idx="0">
+            <a:schemeClr val="accent5"/>
+          </a:effectRef>
+          <a:fontRef idx="minor">
+            <a:schemeClr val="lt1"/>
+          </a:fontRef>
+        </p:style>
+        <p:txBody>
+          <a:bodyPr rtlCol="0" anchor="ctr"/>
+          <a:lstStyle/>
+          <a:p>
+            <a:pPr algn="ctr"/>
+            <a:endParaRPr lang="en-GB" dirty="0"/>
+          </a:p>
+        </p:txBody>
+      </p:sp>
+      <p:sp>
+        <p:nvSpPr>
+          <p:cNvPr id="10" name="Arrow: Right 9">
+            <a:extLst>
+              <a:ext uri="{FF2B5EF4-FFF2-40B4-BE49-F238E27FC236}">
+                <a16:creationId xmlns:a16="http://schemas.microsoft.com/office/drawing/2014/main" id="{B7F1877D-388F-44D7-9769-D9EB22CB4B5B}"/>
+              </a:ext>
+            </a:extLst>
+          </p:cNvPr>
+          <p:cNvSpPr/>
+          <p:nvPr/>
+        </p:nvSpPr>
+        <p:spPr>
+          <a:xfrm rot="10800000">
+            <a:off x="5092197" y="5355423"/>
+            <a:ext cx="880844" cy="364615"/>
+          </a:xfrm>
+          <a:prstGeom prst="rightArrow">
+            <a:avLst/>
+          </a:prstGeom>
+        </p:spPr>
+        <p:style>
+          <a:lnRef idx="2">
+            <a:schemeClr val="accent5">
+              <a:shade val="50000"/>
+            </a:schemeClr>
+          </a:lnRef>
+          <a:fillRef idx="1">
+            <a:schemeClr val="accent5"/>
+          </a:fillRef>
+          <a:effectRef idx="0">
+            <a:schemeClr val="accent5"/>
+          </a:effectRef>
+          <a:fontRef idx="minor">
+            <a:schemeClr val="lt1"/>
+          </a:fontRef>
+        </p:style>
+        <p:txBody>
+          <a:bodyPr rtlCol="0" anchor="ctr"/>
+          <a:lstStyle/>
+          <a:p>
+            <a:pPr algn="ctr"/>
+            <a:endParaRPr lang="en-GB" dirty="0"/>
+          </a:p>
+        </p:txBody>
+      </p:sp>
+      <p:sp>
+        <p:nvSpPr>
+          <p:cNvPr id="11" name="TextBox 10">
+            <a:extLst>
+              <a:ext uri="{FF2B5EF4-FFF2-40B4-BE49-F238E27FC236}">
+                <a16:creationId xmlns:a16="http://schemas.microsoft.com/office/drawing/2014/main" id="{9D00CBD6-36FD-453B-BC63-364C575984F6}"/>
+              </a:ext>
+            </a:extLst>
+          </p:cNvPr>
+          <p:cNvSpPr txBox="1"/>
+          <p:nvPr/>
+        </p:nvSpPr>
+        <p:spPr>
+          <a:xfrm>
+            <a:off x="9050498" y="3306483"/>
+            <a:ext cx="1851302" cy="715089"/>
+          </a:xfrm>
+          <a:prstGeom prst="roundRect">
+            <a:avLst/>
+          </a:prstGeom>
+          <a:ln/>
+        </p:spPr>
+        <p:style>
+          <a:lnRef idx="2">
+            <a:schemeClr val="accent2"/>
+          </a:lnRef>
+          <a:fillRef idx="1">
+            <a:schemeClr val="lt1"/>
+          </a:fillRef>
+          <a:effectRef idx="0">
+            <a:schemeClr val="accent2"/>
+          </a:effectRef>
+          <a:fontRef idx="minor">
+            <a:schemeClr val="dk1"/>
+          </a:fontRef>
+        </p:style>
+        <p:txBody>
+          <a:bodyPr wrap="square" rtlCol="0">
+            <a:spAutoFit/>
+          </a:bodyPr>
+          <a:lstStyle/>
+          <a:p>
+            <a:pPr marL="285750" indent="-285750">
+              <a:buFont typeface="Arial" panose="020B0604020202020204" pitchFamily="34" charset="0"/>
+              <a:buChar char="•"/>
+            </a:pPr>
+            <a:r>
+              <a:rPr lang="en-GB" dirty="0"/>
+              <a:t>Codon Pair </a:t>
+            </a:r>
+          </a:p>
+          <a:p>
+            <a:pPr marL="285750" indent="-285750">
+              <a:buFont typeface="Arial" panose="020B0604020202020204" pitchFamily="34" charset="0"/>
+              <a:buChar char="•"/>
+            </a:pPr>
+            <a:r>
+              <a:rPr lang="en-GB" dirty="0"/>
+              <a:t>Expand width </a:t>
+            </a:r>
+          </a:p>
+        </p:txBody>
+      </p:sp>
+      <p:sp>
+        <p:nvSpPr>
+          <p:cNvPr id="12" name="TextBox 11">
+            <a:extLst>
+              <a:ext uri="{FF2B5EF4-FFF2-40B4-BE49-F238E27FC236}">
+                <a16:creationId xmlns:a16="http://schemas.microsoft.com/office/drawing/2014/main" id="{BD0472CA-A88E-4C5D-A762-AC5C1F55279E}"/>
+              </a:ext>
+            </a:extLst>
+          </p:cNvPr>
+          <p:cNvSpPr txBox="1"/>
+          <p:nvPr/>
+        </p:nvSpPr>
+        <p:spPr>
+          <a:xfrm>
+            <a:off x="4587536" y="1235326"/>
+            <a:ext cx="2183269" cy="830997"/>
+          </a:xfrm>
+          <a:prstGeom prst="rect">
+            <a:avLst/>
+          </a:prstGeom>
+          <a:noFill/>
+        </p:spPr>
+        <p:txBody>
+          <a:bodyPr wrap="square" rtlCol="0">
+            <a:spAutoFit/>
+          </a:bodyPr>
+          <a:lstStyle/>
+          <a:p>
+            <a:r>
+              <a:rPr lang="en-GB" sz="1600" dirty="0"/>
+              <a:t>Generate a table of Genes, positions, counts and codon pairs </a:t>
+            </a:r>
+          </a:p>
+        </p:txBody>
+      </p:sp>
+      <p:sp>
+        <p:nvSpPr>
+          <p:cNvPr id="13" name="TextBox 12">
+            <a:extLst>
+              <a:ext uri="{FF2B5EF4-FFF2-40B4-BE49-F238E27FC236}">
+                <a16:creationId xmlns:a16="http://schemas.microsoft.com/office/drawing/2014/main" id="{B8B1F94F-F390-47B6-B3BE-C693F050FA3F}"/>
+              </a:ext>
+            </a:extLst>
+          </p:cNvPr>
+          <p:cNvSpPr txBox="1"/>
+          <p:nvPr/>
+        </p:nvSpPr>
+        <p:spPr>
+          <a:xfrm>
+            <a:off x="6520312" y="3248530"/>
+            <a:ext cx="2066488" cy="830997"/>
+          </a:xfrm>
+          <a:prstGeom prst="rect">
+            <a:avLst/>
+          </a:prstGeom>
+          <a:noFill/>
+        </p:spPr>
+        <p:txBody>
+          <a:bodyPr wrap="square" rtlCol="0">
+            <a:spAutoFit/>
+          </a:bodyPr>
+          <a:lstStyle/>
+          <a:p>
+            <a:r>
+              <a:rPr lang="en-GB" sz="1600" dirty="0"/>
+              <a:t>Slice a window of positions around the codon of interest </a:t>
+            </a:r>
+          </a:p>
+        </p:txBody>
+      </p:sp>
+      <p:sp>
+        <p:nvSpPr>
+          <p:cNvPr id="14" name="TextBox 13">
+            <a:extLst>
+              <a:ext uri="{FF2B5EF4-FFF2-40B4-BE49-F238E27FC236}">
+                <a16:creationId xmlns:a16="http://schemas.microsoft.com/office/drawing/2014/main" id="{79A1E988-E053-44F8-BF53-E6DB15B00CAD}"/>
+              </a:ext>
+            </a:extLst>
+          </p:cNvPr>
+          <p:cNvSpPr txBox="1"/>
+          <p:nvPr/>
+        </p:nvSpPr>
+        <p:spPr>
+          <a:xfrm>
+            <a:off x="4769220" y="4184516"/>
+            <a:ext cx="2183269" cy="1077218"/>
+          </a:xfrm>
+          <a:prstGeom prst="rect">
+            <a:avLst/>
+          </a:prstGeom>
+          <a:noFill/>
+        </p:spPr>
+        <p:txBody>
+          <a:bodyPr wrap="square" rtlCol="0">
+            <a:spAutoFit/>
+          </a:bodyPr>
+          <a:lstStyle/>
+          <a:p>
+            <a:r>
+              <a:rPr lang="en-GB" sz="1600" dirty="0"/>
+              <a:t>Calculate the Relative count for all occurrences of the codon of interest </a:t>
+            </a:r>
+          </a:p>
+        </p:txBody>
+      </p:sp>
+      <p:pic>
+        <p:nvPicPr>
+          <p:cNvPr id="16" name="Picture 15">
+            <a:extLst>
+              <a:ext uri="{FF2B5EF4-FFF2-40B4-BE49-F238E27FC236}">
+                <a16:creationId xmlns:a16="http://schemas.microsoft.com/office/drawing/2014/main" id="{586C92FF-38AC-4B24-8189-2EFA6B03A811}"/>
+              </a:ext>
+            </a:extLst>
+          </p:cNvPr>
+          <p:cNvPicPr>
+            <a:picLocks noChangeAspect="1"/>
+          </p:cNvPicPr>
+          <p:nvPr/>
+        </p:nvPicPr>
+        <p:blipFill>
+          <a:blip r:embed="rId2"/>
+          <a:stretch>
+            <a:fillRect/>
+          </a:stretch>
+        </p:blipFill>
+        <p:spPr>
+          <a:xfrm>
+            <a:off x="7046367" y="1255188"/>
+            <a:ext cx="2505075" cy="1743075"/>
+          </a:xfrm>
+          <a:prstGeom prst="rect">
+            <a:avLst/>
+          </a:prstGeom>
+          <a:ln w="19050">
+            <a:solidFill>
+              <a:schemeClr val="accent2"/>
+            </a:solidFill>
+          </a:ln>
+        </p:spPr>
+      </p:pic>
+      <p:pic>
+        <p:nvPicPr>
+          <p:cNvPr id="18" name="Picture 17">
+            <a:extLst>
+              <a:ext uri="{FF2B5EF4-FFF2-40B4-BE49-F238E27FC236}">
+                <a16:creationId xmlns:a16="http://schemas.microsoft.com/office/drawing/2014/main" id="{C894B179-0644-4202-8357-4FAA23C786CA}"/>
+              </a:ext>
+            </a:extLst>
+          </p:cNvPr>
+          <p:cNvPicPr>
+            <a:picLocks noChangeAspect="1"/>
+          </p:cNvPicPr>
+          <p:nvPr/>
+        </p:nvPicPr>
+        <p:blipFill>
+          <a:blip r:embed="rId3"/>
+          <a:stretch>
+            <a:fillRect/>
+          </a:stretch>
+        </p:blipFill>
+        <p:spPr>
+          <a:xfrm>
+            <a:off x="7046367" y="4472006"/>
+            <a:ext cx="3286125" cy="1962150"/>
+          </a:xfrm>
+          <a:prstGeom prst="rect">
+            <a:avLst/>
+          </a:prstGeom>
+          <a:ln w="19050">
+            <a:solidFill>
+              <a:schemeClr val="accent2"/>
+            </a:solidFill>
+          </a:ln>
+        </p:spPr>
+      </p:pic>
+      <p:pic>
+        <p:nvPicPr>
+          <p:cNvPr id="20" name="Picture 19">
+            <a:extLst>
+              <a:ext uri="{FF2B5EF4-FFF2-40B4-BE49-F238E27FC236}">
+                <a16:creationId xmlns:a16="http://schemas.microsoft.com/office/drawing/2014/main" id="{019FE913-9235-4062-B4BE-909E1F1463BF}"/>
+              </a:ext>
+            </a:extLst>
+          </p:cNvPr>
+          <p:cNvPicPr>
+            <a:picLocks noChangeAspect="1"/>
+          </p:cNvPicPr>
+          <p:nvPr/>
+        </p:nvPicPr>
+        <p:blipFill>
+          <a:blip r:embed="rId4"/>
+          <a:stretch>
+            <a:fillRect/>
+          </a:stretch>
+        </p:blipFill>
+        <p:spPr>
+          <a:xfrm>
+            <a:off x="2742017" y="4510106"/>
+            <a:ext cx="1619250" cy="1885950"/>
+          </a:xfrm>
+          <a:prstGeom prst="rect">
+            <a:avLst/>
+          </a:prstGeom>
+          <a:ln w="19050">
+            <a:solidFill>
+              <a:schemeClr val="accent2"/>
+            </a:solidFill>
+          </a:ln>
+        </p:spPr>
+      </p:pic>
+    </p:spTree>
+    <p:extLst>
+      <p:ext uri="{BB962C8B-B14F-4D97-AF65-F5344CB8AC3E}">
+        <p14:creationId xmlns:p14="http://schemas.microsoft.com/office/powerpoint/2010/main" val="152534160"/>
+      </p:ext>
+    </p:extLst>
+  </p:cSld>
+  <p:clrMapOvr>
+    <a:masterClrMapping/>
+  </p:clrMapOvr>
+</p:sld>
+</file>
+
+<file path=ppt/slides/slide15.xml><?xml version="1.0" encoding="utf-8"?>
+<p:sld xmlns:a="http://schemas.openxmlformats.org/drawingml/2006/main" xmlns:r="http://schemas.openxmlformats.org/officeDocument/2006/relationships" xmlns:p="http://schemas.openxmlformats.org/presentationml/2006/main">
+  <p:cSld>
+    <p:spTree>
+      <p:nvGrpSpPr>
+        <p:cNvPr id="1" name=""/>
+        <p:cNvGrpSpPr/>
+        <p:nvPr/>
+      </p:nvGrpSpPr>
+      <p:grpSpPr>
+        <a:xfrm>
+          <a:off x="0" y="0"/>
+          <a:ext cx="0" cy="0"/>
+          <a:chOff x="0" y="0"/>
+          <a:chExt cx="0" cy="0"/>
+        </a:xfrm>
+      </p:grpSpPr>
+      <p:sp>
+        <p:nvSpPr>
+          <p:cNvPr id="2" name="Title 1">
+            <a:extLst>
+              <a:ext uri="{FF2B5EF4-FFF2-40B4-BE49-F238E27FC236}">
+                <a16:creationId xmlns:a16="http://schemas.microsoft.com/office/drawing/2014/main" id="{1AEAA30C-CD1C-4D72-81B7-75ADA1941E40}"/>
+              </a:ext>
+            </a:extLst>
+          </p:cNvPr>
+          <p:cNvSpPr>
+            <a:spLocks noGrp="1"/>
+          </p:cNvSpPr>
+          <p:nvPr>
+            <p:ph type="title"/>
+          </p:nvPr>
+        </p:nvSpPr>
+        <p:spPr>
+          <a:xfrm>
+            <a:off x="342900" y="212725"/>
+            <a:ext cx="10515600" cy="1325563"/>
+          </a:xfrm>
+        </p:spPr>
+        <p:txBody>
+          <a:bodyPr/>
+          <a:lstStyle/>
+          <a:p>
+            <a:r>
+              <a:rPr lang="en-GB" dirty="0"/>
+              <a:t>Testing with YAL5 simulated dataset</a:t>
+            </a:r>
+          </a:p>
+        </p:txBody>
+      </p:sp>
+      <p:pic>
+        <p:nvPicPr>
+          <p:cNvPr id="5" name="Content Placeholder 4">
+            <a:extLst>
+              <a:ext uri="{FF2B5EF4-FFF2-40B4-BE49-F238E27FC236}">
+                <a16:creationId xmlns:a16="http://schemas.microsoft.com/office/drawing/2014/main" id="{B127B356-D17D-41D9-B522-B6FE9F2A7D31}"/>
+              </a:ext>
+            </a:extLst>
+          </p:cNvPr>
+          <p:cNvPicPr>
+            <a:picLocks noGrp="1" noChangeAspect="1"/>
+          </p:cNvPicPr>
+          <p:nvPr>
+            <p:ph idx="1"/>
+          </p:nvPr>
+        </p:nvPicPr>
+        <p:blipFill>
+          <a:blip r:embed="rId2"/>
+          <a:stretch>
+            <a:fillRect/>
+          </a:stretch>
+        </p:blipFill>
+        <p:spPr>
+          <a:xfrm>
+            <a:off x="3319861" y="1792069"/>
+            <a:ext cx="5199939" cy="4351338"/>
+          </a:xfrm>
+        </p:spPr>
+      </p:pic>
+    </p:spTree>
+    <p:extLst>
+      <p:ext uri="{BB962C8B-B14F-4D97-AF65-F5344CB8AC3E}">
+        <p14:creationId xmlns:p14="http://schemas.microsoft.com/office/powerpoint/2010/main" val="1134948024"/>
+      </p:ext>
+    </p:extLst>
+  </p:cSld>
+  <p:clrMapOvr>
+    <a:masterClrMapping/>
+  </p:clrMapOvr>
+</p:sld>
+</file>
+
+<file path=ppt/slides/slide16.xml><?xml version="1.0" encoding="utf-8"?>
+<p:sld xmlns:a="http://schemas.openxmlformats.org/drawingml/2006/main" xmlns:r="http://schemas.openxmlformats.org/officeDocument/2006/relationships" xmlns:p="http://schemas.openxmlformats.org/presentationml/2006/main">
+  <p:cSld>
+    <p:spTree>
+      <p:nvGrpSpPr>
+        <p:cNvPr id="1" name=""/>
+        <p:cNvGrpSpPr/>
+        <p:nvPr/>
+      </p:nvGrpSpPr>
+      <p:grpSpPr>
+        <a:xfrm>
+          <a:off x="0" y="0"/>
+          <a:ext cx="0" cy="0"/>
+          <a:chOff x="0" y="0"/>
+          <a:chExt cx="0" cy="0"/>
+        </a:xfrm>
+      </p:grpSpPr>
+      <p:sp>
+        <p:nvSpPr>
+          <p:cNvPr id="2" name="Title 1">
+            <a:extLst>
+              <a:ext uri="{FF2B5EF4-FFF2-40B4-BE49-F238E27FC236}">
                 <a16:creationId xmlns:a16="http://schemas.microsoft.com/office/drawing/2014/main" id="{5E05A194-24EC-4C63-805F-C1BE5CED12BF}"/>
               </a:ext>
             </a:extLst>
@@ -3899,7 +5399,7 @@
 </p:sld>
 </file>
 
-<file path=ppt/slides/slide15.xml><?xml version="1.0" encoding="utf-8"?>
+<file path=ppt/slides/slide17.xml><?xml version="1.0" encoding="utf-8"?>
 <p:sld xmlns:a="http://schemas.openxmlformats.org/drawingml/2006/main" xmlns:r="http://schemas.openxmlformats.org/officeDocument/2006/relationships" xmlns:p="http://schemas.openxmlformats.org/presentationml/2006/main">
   <p:cSld>
     <p:spTree>
@@ -4014,7 +5514,7 @@
 </p:sld>
 </file>
 
-<file path=ppt/slides/slide16.xml><?xml version="1.0" encoding="utf-8"?>
+<file path=ppt/slides/slide18.xml><?xml version="1.0" encoding="utf-8"?>
 <p:sld xmlns:a="http://schemas.openxmlformats.org/drawingml/2006/main" xmlns:r="http://schemas.openxmlformats.org/officeDocument/2006/relationships" xmlns:p="http://schemas.openxmlformats.org/presentationml/2006/main">
   <p:cSld>
     <p:bg>
@@ -4234,252 +5734,6 @@
 </p:sld>
 </file>
 
-<file path=ppt/slides/slide17.xml><?xml version="1.0" encoding="utf-8"?>
-<p:sld xmlns:a="http://schemas.openxmlformats.org/drawingml/2006/main" xmlns:r="http://schemas.openxmlformats.org/officeDocument/2006/relationships" xmlns:p="http://schemas.openxmlformats.org/presentationml/2006/main">
-  <p:cSld>
-    <p:spTree>
-      <p:nvGrpSpPr>
-        <p:cNvPr id="1" name=""/>
-        <p:cNvGrpSpPr/>
-        <p:nvPr/>
-      </p:nvGrpSpPr>
-      <p:grpSpPr>
-        <a:xfrm>
-          <a:off x="0" y="0"/>
-          <a:ext cx="0" cy="0"/>
-          <a:chOff x="0" y="0"/>
-          <a:chExt cx="0" cy="0"/>
-        </a:xfrm>
-      </p:grpSpPr>
-      <p:sp>
-        <p:nvSpPr>
-          <p:cNvPr id="2" name="Title 1">
-            <a:extLst>
-              <a:ext uri="{FF2B5EF4-FFF2-40B4-BE49-F238E27FC236}">
-                <a16:creationId xmlns:a16="http://schemas.microsoft.com/office/drawing/2014/main" id="{CD84C0C1-70FE-4FCE-A9C9-6C783AE5BCA2}"/>
-              </a:ext>
-            </a:extLst>
-          </p:cNvPr>
-          <p:cNvSpPr>
-            <a:spLocks noGrp="1"/>
-          </p:cNvSpPr>
-          <p:nvPr>
-            <p:ph type="title"/>
-          </p:nvPr>
-        </p:nvSpPr>
-        <p:spPr/>
-        <p:txBody>
-          <a:bodyPr/>
-          <a:lstStyle/>
-          <a:p>
-            <a:r>
-              <a:rPr lang="en-GB" dirty="0"/>
-              <a:t>Next steps</a:t>
-            </a:r>
-          </a:p>
-        </p:txBody>
-      </p:sp>
-      <p:sp>
-        <p:nvSpPr>
-          <p:cNvPr id="3" name="Content Placeholder 2">
-            <a:extLst>
-              <a:ext uri="{FF2B5EF4-FFF2-40B4-BE49-F238E27FC236}">
-                <a16:creationId xmlns:a16="http://schemas.microsoft.com/office/drawing/2014/main" id="{EAAC464D-CD24-4F20-B9E8-DE256CD69653}"/>
-              </a:ext>
-            </a:extLst>
-          </p:cNvPr>
-          <p:cNvSpPr>
-            <a:spLocks noGrp="1"/>
-          </p:cNvSpPr>
-          <p:nvPr>
-            <p:ph idx="1"/>
-          </p:nvPr>
-        </p:nvSpPr>
-        <p:spPr/>
-        <p:txBody>
-          <a:bodyPr/>
-          <a:lstStyle/>
-          <a:p>
-            <a:r>
-              <a:rPr lang="en-GB" dirty="0"/>
-              <a:t>Add functionality to identify feature locations for </a:t>
-            </a:r>
-            <a:r>
-              <a:rPr lang="en-GB" dirty="0" err="1"/>
-              <a:t>nt</a:t>
-            </a:r>
-            <a:r>
-              <a:rPr lang="en-GB" dirty="0"/>
-              <a:t> </a:t>
-            </a:r>
-            <a:r>
-              <a:rPr lang="en-GB" dirty="0" err="1"/>
-              <a:t>metafeature</a:t>
-            </a:r>
-            <a:r>
-              <a:rPr lang="en-GB" dirty="0"/>
-              <a:t> script</a:t>
-            </a:r>
-          </a:p>
-          <a:p>
-            <a:pPr lvl="1">
-              <a:buFontTx/>
-              <a:buChar char="-"/>
-            </a:pPr>
-            <a:r>
-              <a:rPr lang="en-GB" dirty="0"/>
-              <a:t>Codons and Codon pairs would likely be easy</a:t>
-            </a:r>
-          </a:p>
-          <a:p>
-            <a:pPr lvl="1">
-              <a:buFontTx/>
-              <a:buChar char="-"/>
-            </a:pPr>
-            <a:r>
-              <a:rPr lang="en-GB" dirty="0"/>
-              <a:t>Is there a tool or protein database that can identify positions of secondary structural features? Can this data be downloaded for each gene? Will the names be compatible? Ligand binding positions?</a:t>
-            </a:r>
-          </a:p>
-          <a:p>
-            <a:r>
-              <a:rPr lang="en-GB" dirty="0"/>
-              <a:t>Restructure to have one script containing function definitions and another calling the functions.</a:t>
-            </a:r>
-          </a:p>
-        </p:txBody>
-      </p:sp>
-    </p:spTree>
-    <p:extLst>
-      <p:ext uri="{BB962C8B-B14F-4D97-AF65-F5344CB8AC3E}">
-        <p14:creationId xmlns:p14="http://schemas.microsoft.com/office/powerpoint/2010/main" val="1511006915"/>
-      </p:ext>
-    </p:extLst>
-  </p:cSld>
-  <p:clrMapOvr>
-    <a:masterClrMapping/>
-  </p:clrMapOvr>
-</p:sld>
-</file>
-
-<file path=ppt/slides/slide18.xml><?xml version="1.0" encoding="utf-8"?>
-<p:sld xmlns:a="http://schemas.openxmlformats.org/drawingml/2006/main" xmlns:r="http://schemas.openxmlformats.org/officeDocument/2006/relationships" xmlns:p="http://schemas.openxmlformats.org/presentationml/2006/main">
-  <p:cSld>
-    <p:spTree>
-      <p:nvGrpSpPr>
-        <p:cNvPr id="1" name=""/>
-        <p:cNvGrpSpPr/>
-        <p:nvPr/>
-      </p:nvGrpSpPr>
-      <p:grpSpPr>
-        <a:xfrm>
-          <a:off x="0" y="0"/>
-          <a:ext cx="0" cy="0"/>
-          <a:chOff x="0" y="0"/>
-          <a:chExt cx="0" cy="0"/>
-        </a:xfrm>
-      </p:grpSpPr>
-      <p:sp>
-        <p:nvSpPr>
-          <p:cNvPr id="2" name="Title 1">
-            <a:extLst>
-              <a:ext uri="{FF2B5EF4-FFF2-40B4-BE49-F238E27FC236}">
-                <a16:creationId xmlns:a16="http://schemas.microsoft.com/office/drawing/2014/main" id="{ACDBBFD3-C77D-42BD-9492-20B5B068356F}"/>
-              </a:ext>
-            </a:extLst>
-          </p:cNvPr>
-          <p:cNvSpPr>
-            <a:spLocks noGrp="1"/>
-          </p:cNvSpPr>
-          <p:nvPr>
-            <p:ph type="title"/>
-          </p:nvPr>
-        </p:nvSpPr>
-        <p:spPr/>
-        <p:txBody>
-          <a:bodyPr/>
-          <a:lstStyle/>
-          <a:p>
-            <a:r>
-              <a:rPr lang="en-GB" dirty="0"/>
-              <a:t>What we learnt</a:t>
-            </a:r>
-          </a:p>
-        </p:txBody>
-      </p:sp>
-      <p:sp>
-        <p:nvSpPr>
-          <p:cNvPr id="3" name="Content Placeholder 2">
-            <a:extLst>
-              <a:ext uri="{FF2B5EF4-FFF2-40B4-BE49-F238E27FC236}">
-                <a16:creationId xmlns:a16="http://schemas.microsoft.com/office/drawing/2014/main" id="{61B07827-D116-4A8A-840D-E72E69D261F6}"/>
-              </a:ext>
-            </a:extLst>
-          </p:cNvPr>
-          <p:cNvSpPr>
-            <a:spLocks noGrp="1"/>
-          </p:cNvSpPr>
-          <p:nvPr>
-            <p:ph idx="1"/>
-          </p:nvPr>
-        </p:nvSpPr>
-        <p:spPr/>
-        <p:txBody>
-          <a:bodyPr/>
-          <a:lstStyle/>
-          <a:p>
-            <a:r>
-              <a:rPr lang="en-GB" dirty="0"/>
-              <a:t>Collaboration - prioritise tasks that aid the team</a:t>
-            </a:r>
-          </a:p>
-          <a:p>
-            <a:r>
-              <a:rPr lang="en-GB" dirty="0"/>
-              <a:t>Communication – better updates on </a:t>
-            </a:r>
-            <a:r>
-              <a:rPr lang="en-GB" dirty="0" err="1"/>
-              <a:t>Github</a:t>
-            </a:r>
-            <a:r>
-              <a:rPr lang="en-GB" dirty="0"/>
-              <a:t> and clearer comments in code</a:t>
-            </a:r>
-          </a:p>
-          <a:p>
-            <a:r>
-              <a:rPr lang="en-GB" dirty="0"/>
-              <a:t>Insights into the process of writing papers</a:t>
-            </a:r>
-          </a:p>
-          <a:p>
-            <a:r>
-              <a:rPr lang="en-GB" dirty="0"/>
-              <a:t>Insights into software development and maintenance </a:t>
-            </a:r>
-          </a:p>
-          <a:p>
-            <a:r>
-              <a:rPr lang="en-GB" dirty="0"/>
-              <a:t>Greatly improved the quality of code we write</a:t>
-            </a:r>
-          </a:p>
-        </p:txBody>
-      </p:sp>
-    </p:spTree>
-    <p:extLst>
-      <p:ext uri="{BB962C8B-B14F-4D97-AF65-F5344CB8AC3E}">
-        <p14:creationId xmlns:p14="http://schemas.microsoft.com/office/powerpoint/2010/main" val="3181137414"/>
-      </p:ext>
-    </p:extLst>
-  </p:cSld>
-  <p:clrMapOvr>
-    <a:masterClrMapping/>
-  </p:clrMapOvr>
-</p:sld>
-</file>
-
 <file path=ppt/slides/slide19.xml><?xml version="1.0" encoding="utf-8"?>
 <p:sld xmlns:a="http://schemas.openxmlformats.org/drawingml/2006/main" xmlns:r="http://schemas.openxmlformats.org/officeDocument/2006/relationships" xmlns:p="http://schemas.openxmlformats.org/presentationml/2006/main">
   <p:cSld>
@@ -4502,7 +5756,7 @@
           <p:cNvPr id="2" name="Title 1">
             <a:extLst>
               <a:ext uri="{FF2B5EF4-FFF2-40B4-BE49-F238E27FC236}">
-                <a16:creationId xmlns:a16="http://schemas.microsoft.com/office/drawing/2014/main" id="{0DB1E929-396C-45B5-B8C6-F409835D2853}"/>
+                <a16:creationId xmlns:a16="http://schemas.microsoft.com/office/drawing/2014/main" id="{CD84C0C1-70FE-4FCE-A9C9-6C783AE5BCA2}"/>
               </a:ext>
             </a:extLst>
           </p:cNvPr>
@@ -4520,7 +5774,7 @@
           <a:p>
             <a:r>
               <a:rPr lang="en-GB" dirty="0"/>
-              <a:t>Thanks to everyone in the lab</a:t>
+              <a:t>Next steps</a:t>
             </a:r>
           </a:p>
         </p:txBody>
@@ -4530,7 +5784,7 @@
           <p:cNvPr id="3" name="Content Placeholder 2">
             <a:extLst>
               <a:ext uri="{FF2B5EF4-FFF2-40B4-BE49-F238E27FC236}">
-                <a16:creationId xmlns:a16="http://schemas.microsoft.com/office/drawing/2014/main" id="{B491A8B3-38F0-4130-A09F-A8C857739DAA}"/>
+                <a16:creationId xmlns:a16="http://schemas.microsoft.com/office/drawing/2014/main" id="{EAAC464D-CD24-4F20-B9E8-DE256CD69653}"/>
               </a:ext>
             </a:extLst>
           </p:cNvPr>
@@ -4546,14 +5800,59 @@
           <a:bodyPr/>
           <a:lstStyle/>
           <a:p>
-            <a:endParaRPr lang="en-GB"/>
+            <a:r>
+              <a:rPr lang="en-GB" dirty="0"/>
+              <a:t>Add functionality to identify feature locations for </a:t>
+            </a:r>
+            <a:r>
+              <a:rPr lang="en-GB" dirty="0" err="1"/>
+              <a:t>nt</a:t>
+            </a:r>
+            <a:r>
+              <a:rPr lang="en-GB" dirty="0"/>
+              <a:t> </a:t>
+            </a:r>
+            <a:r>
+              <a:rPr lang="en-GB" dirty="0" err="1"/>
+              <a:t>metafeature</a:t>
+            </a:r>
+            <a:r>
+              <a:rPr lang="en-GB" dirty="0"/>
+              <a:t> script</a:t>
+            </a:r>
+          </a:p>
+          <a:p>
+            <a:pPr lvl="1">
+              <a:buFontTx/>
+              <a:buChar char="-"/>
+            </a:pPr>
+            <a:r>
+              <a:rPr lang="en-GB" dirty="0"/>
+              <a:t>Codons and Codon pairs would likely be easy</a:t>
+            </a:r>
+          </a:p>
+          <a:p>
+            <a:pPr lvl="1">
+              <a:buFontTx/>
+              <a:buChar char="-"/>
+            </a:pPr>
+            <a:r>
+              <a:rPr lang="en-GB" dirty="0"/>
+              <a:t>Is there a tool or protein database that can identify positions of secondary structural features? Can this data be downloaded for each gene? Will the names be compatible? Ligand binding positions?</a:t>
+            </a:r>
+          </a:p>
+          <a:p>
+            <a:r>
+              <a:rPr lang="en-GB" dirty="0"/>
+              <a:t>Restructure to have one script containing function definitions and another calling the functions.</a:t>
+            </a:r>
           </a:p>
         </p:txBody>
       </p:sp>
     </p:spTree>
     <p:extLst>
       <p:ext uri="{BB962C8B-B14F-4D97-AF65-F5344CB8AC3E}">
-        <p14:creationId xmlns:p14="http://schemas.microsoft.com/office/powerpoint/2010/main" val="2340962711"/>
+        <p14:creationId xmlns:p14="http://schemas.microsoft.com/office/powerpoint/2010/main" val="1511006915"/>
       </p:ext>
     </p:extLst>
   </p:cSld>
@@ -4676,6 +5975,207 @@
     <p:extLst>
       <p:ext uri="{BB962C8B-B14F-4D97-AF65-F5344CB8AC3E}">
         <p14:creationId xmlns:p14="http://schemas.microsoft.com/office/powerpoint/2010/main" val="3097647008"/>
+      </p:ext>
+    </p:extLst>
+  </p:cSld>
+  <p:clrMapOvr>
+    <a:masterClrMapping/>
+  </p:clrMapOvr>
+</p:sld>
+</file>
+
+<file path=ppt/slides/slide20.xml><?xml version="1.0" encoding="utf-8"?>
+<p:sld xmlns:a="http://schemas.openxmlformats.org/drawingml/2006/main" xmlns:r="http://schemas.openxmlformats.org/officeDocument/2006/relationships" xmlns:p="http://schemas.openxmlformats.org/presentationml/2006/main">
+  <p:cSld>
+    <p:spTree>
+      <p:nvGrpSpPr>
+        <p:cNvPr id="1" name=""/>
+        <p:cNvGrpSpPr/>
+        <p:nvPr/>
+      </p:nvGrpSpPr>
+      <p:grpSpPr>
+        <a:xfrm>
+          <a:off x="0" y="0"/>
+          <a:ext cx="0" cy="0"/>
+          <a:chOff x="0" y="0"/>
+          <a:chExt cx="0" cy="0"/>
+        </a:xfrm>
+      </p:grpSpPr>
+      <p:sp>
+        <p:nvSpPr>
+          <p:cNvPr id="2" name="Title 1">
+            <a:extLst>
+              <a:ext uri="{FF2B5EF4-FFF2-40B4-BE49-F238E27FC236}">
+                <a16:creationId xmlns:a16="http://schemas.microsoft.com/office/drawing/2014/main" id="{ACDBBFD3-C77D-42BD-9492-20B5B068356F}"/>
+              </a:ext>
+            </a:extLst>
+          </p:cNvPr>
+          <p:cNvSpPr>
+            <a:spLocks noGrp="1"/>
+          </p:cNvSpPr>
+          <p:nvPr>
+            <p:ph type="title"/>
+          </p:nvPr>
+        </p:nvSpPr>
+        <p:spPr/>
+        <p:txBody>
+          <a:bodyPr/>
+          <a:lstStyle/>
+          <a:p>
+            <a:r>
+              <a:rPr lang="en-GB" dirty="0"/>
+              <a:t>What we learnt</a:t>
+            </a:r>
+          </a:p>
+        </p:txBody>
+      </p:sp>
+      <p:sp>
+        <p:nvSpPr>
+          <p:cNvPr id="3" name="Content Placeholder 2">
+            <a:extLst>
+              <a:ext uri="{FF2B5EF4-FFF2-40B4-BE49-F238E27FC236}">
+                <a16:creationId xmlns:a16="http://schemas.microsoft.com/office/drawing/2014/main" id="{61B07827-D116-4A8A-840D-E72E69D261F6}"/>
+              </a:ext>
+            </a:extLst>
+          </p:cNvPr>
+          <p:cNvSpPr>
+            <a:spLocks noGrp="1"/>
+          </p:cNvSpPr>
+          <p:nvPr>
+            <p:ph idx="1"/>
+          </p:nvPr>
+        </p:nvSpPr>
+        <p:spPr/>
+        <p:txBody>
+          <a:bodyPr/>
+          <a:lstStyle/>
+          <a:p>
+            <a:r>
+              <a:rPr lang="en-GB" dirty="0"/>
+              <a:t>Collaboration - prioritise tasks that aid the team</a:t>
+            </a:r>
+          </a:p>
+          <a:p>
+            <a:r>
+              <a:rPr lang="en-GB" dirty="0"/>
+              <a:t>Communication – better updates on </a:t>
+            </a:r>
+            <a:r>
+              <a:rPr lang="en-GB" dirty="0" err="1"/>
+              <a:t>Github</a:t>
+            </a:r>
+            <a:r>
+              <a:rPr lang="en-GB" dirty="0"/>
+              <a:t> and clearer comments in code</a:t>
+            </a:r>
+          </a:p>
+          <a:p>
+            <a:r>
+              <a:rPr lang="en-GB" dirty="0"/>
+              <a:t>Insights into the process of writing papers</a:t>
+            </a:r>
+          </a:p>
+          <a:p>
+            <a:r>
+              <a:rPr lang="en-GB" dirty="0"/>
+              <a:t>Insights into software development and maintenance </a:t>
+            </a:r>
+          </a:p>
+          <a:p>
+            <a:r>
+              <a:rPr lang="en-GB" dirty="0"/>
+              <a:t>Greatly improved the quality of code we write</a:t>
+            </a:r>
+          </a:p>
+        </p:txBody>
+      </p:sp>
+    </p:spTree>
+    <p:extLst>
+      <p:ext uri="{BB962C8B-B14F-4D97-AF65-F5344CB8AC3E}">
+        <p14:creationId xmlns:p14="http://schemas.microsoft.com/office/powerpoint/2010/main" val="3181137414"/>
+      </p:ext>
+    </p:extLst>
+  </p:cSld>
+  <p:clrMapOvr>
+    <a:masterClrMapping/>
+  </p:clrMapOvr>
+</p:sld>
+</file>
+
+<file path=ppt/slides/slide21.xml><?xml version="1.0" encoding="utf-8"?>
+<p:sld xmlns:a="http://schemas.openxmlformats.org/drawingml/2006/main" xmlns:r="http://schemas.openxmlformats.org/officeDocument/2006/relationships" xmlns:p="http://schemas.openxmlformats.org/presentationml/2006/main">
+  <p:cSld>
+    <p:spTree>
+      <p:nvGrpSpPr>
+        <p:cNvPr id="1" name=""/>
+        <p:cNvGrpSpPr/>
+        <p:nvPr/>
+      </p:nvGrpSpPr>
+      <p:grpSpPr>
+        <a:xfrm>
+          <a:off x="0" y="0"/>
+          <a:ext cx="0" cy="0"/>
+          <a:chOff x="0" y="0"/>
+          <a:chExt cx="0" cy="0"/>
+        </a:xfrm>
+      </p:grpSpPr>
+      <p:sp>
+        <p:nvSpPr>
+          <p:cNvPr id="2" name="Title 1">
+            <a:extLst>
+              <a:ext uri="{FF2B5EF4-FFF2-40B4-BE49-F238E27FC236}">
+                <a16:creationId xmlns:a16="http://schemas.microsoft.com/office/drawing/2014/main" id="{0DB1E929-396C-45B5-B8C6-F409835D2853}"/>
+              </a:ext>
+            </a:extLst>
+          </p:cNvPr>
+          <p:cNvSpPr>
+            <a:spLocks noGrp="1"/>
+          </p:cNvSpPr>
+          <p:nvPr>
+            <p:ph type="title"/>
+          </p:nvPr>
+        </p:nvSpPr>
+        <p:spPr/>
+        <p:txBody>
+          <a:bodyPr/>
+          <a:lstStyle/>
+          <a:p>
+            <a:r>
+              <a:rPr lang="en-GB" dirty="0"/>
+              <a:t>Thanks to everyone in the lab</a:t>
+            </a:r>
+          </a:p>
+        </p:txBody>
+      </p:sp>
+      <p:sp>
+        <p:nvSpPr>
+          <p:cNvPr id="3" name="Content Placeholder 2">
+            <a:extLst>
+              <a:ext uri="{FF2B5EF4-FFF2-40B4-BE49-F238E27FC236}">
+                <a16:creationId xmlns:a16="http://schemas.microsoft.com/office/drawing/2014/main" id="{B491A8B3-38F0-4130-A09F-A8C857739DAA}"/>
+              </a:ext>
+            </a:extLst>
+          </p:cNvPr>
+          <p:cNvSpPr>
+            <a:spLocks noGrp="1"/>
+          </p:cNvSpPr>
+          <p:nvPr>
+            <p:ph idx="1"/>
+          </p:nvPr>
+        </p:nvSpPr>
+        <p:spPr/>
+        <p:txBody>
+          <a:bodyPr/>
+          <a:lstStyle/>
+          <a:p>
+            <a:endParaRPr lang="en-GB"/>
+          </a:p>
+        </p:txBody>
+      </p:sp>
+    </p:spTree>
+    <p:extLst>
+      <p:ext uri="{BB962C8B-B14F-4D97-AF65-F5344CB8AC3E}">
+        <p14:creationId xmlns:p14="http://schemas.microsoft.com/office/powerpoint/2010/main" val="2340962711"/>
       </p:ext>
     </p:extLst>
   </p:cSld>
@@ -4847,7 +6347,10 @@
           <a:bodyPr/>
           <a:lstStyle/>
           <a:p>
-            <a:endParaRPr lang="en-GB" dirty="0"/>
+            <a:r>
+              <a:rPr lang="en-GB" dirty="0"/>
+              <a:t>Older configs did not contain </a:t>
+            </a:r>
           </a:p>
         </p:txBody>
       </p:sp>
@@ -5634,4 +7137,299 @@
     </a:ext>
   </a:extLst>
 </a:theme>
+</file>
+
+<file path=ppt/theme/theme2.xml><?xml version="1.0" encoding="utf-8"?>
+<a:theme xmlns:a="http://schemas.openxmlformats.org/drawingml/2006/main" name="Office Theme">
+  <a:themeElements>
+    <a:clrScheme name="Office">
+      <a:dk1>
+        <a:sysClr val="windowText" lastClr="000000"/>
+      </a:dk1>
+      <a:lt1>
+        <a:sysClr val="window" lastClr="FFFFFF"/>
+      </a:lt1>
+      <a:dk2>
+        <a:srgbClr val="44546A"/>
+      </a:dk2>
+      <a:lt2>
+        <a:srgbClr val="E7E6E6"/>
+      </a:lt2>
+      <a:accent1>
+        <a:srgbClr val="4472C4"/>
+      </a:accent1>
+      <a:accent2>
+        <a:srgbClr val="ED7D31"/>
+      </a:accent2>
+      <a:accent3>
+        <a:srgbClr val="A5A5A5"/>
+      </a:accent3>
+      <a:accent4>
+        <a:srgbClr val="FFC000"/>
+      </a:accent4>
+      <a:accent5>
+        <a:srgbClr val="5B9BD5"/>
+      </a:accent5>
+      <a:accent6>
+        <a:srgbClr val="70AD47"/>
+      </a:accent6>
+      <a:hlink>
+        <a:srgbClr val="0563C1"/>
+      </a:hlink>
+      <a:folHlink>
+        <a:srgbClr val="954F72"/>
+      </a:folHlink>
+    </a:clrScheme>
+    <a:fontScheme name="Office">
+      <a:majorFont>
+        <a:latin typeface="Calibri Light" panose="020F0302020204030204"/>
+        <a:ea typeface=""/>
+        <a:cs typeface=""/>
+        <a:font script="Jpan" typeface="游ゴシック Light"/>
+        <a:font script="Hang" typeface="맑은 고딕"/>
+        <a:font script="Hans" typeface="等线 Light"/>
+        <a:font script="Hant" typeface="新細明體"/>
+        <a:font script="Arab" typeface="Times New Roman"/>
+        <a:font script="Hebr" typeface="Times New Roman"/>
+        <a:font script="Thai" typeface="Angsana New"/>
+        <a:font script="Ethi" typeface="Nyala"/>
+        <a:font script="Beng" typeface="Vrinda"/>
+        <a:font script="Gujr" typeface="Shruti"/>
+        <a:font script="Khmr" typeface="MoolBoran"/>
+        <a:font script="Knda" typeface="Tunga"/>
+        <a:font script="Guru" typeface="Raavi"/>
+        <a:font script="Cans" typeface="Euphemia"/>
+        <a:font script="Cher" typeface="Plantagenet Cherokee"/>
+        <a:font script="Yiii" typeface="Microsoft Yi Baiti"/>
+        <a:font script="Tibt" typeface="Microsoft Himalaya"/>
+        <a:font script="Thaa" typeface="MV Boli"/>
+        <a:font script="Deva" typeface="Mangal"/>
+        <a:font script="Telu" typeface="Gautami"/>
+        <a:font script="Taml" typeface="Latha"/>
+        <a:font script="Syrc" typeface="Estrangelo Edessa"/>
+        <a:font script="Orya" typeface="Kalinga"/>
+        <a:font script="Mlym" typeface="Kartika"/>
+        <a:font script="Laoo" typeface="DokChampa"/>
+        <a:font script="Sinh" typeface="Iskoola Pota"/>
+        <a:font script="Mong" typeface="Mongolian Baiti"/>
+        <a:font script="Viet" typeface="Times New Roman"/>
+        <a:font script="Uigh" typeface="Microsoft Uighur"/>
+        <a:font script="Geor" typeface="Sylfaen"/>
+        <a:font script="Armn" typeface="Arial"/>
+        <a:font script="Bugi" typeface="Leelawadee UI"/>
+        <a:font script="Bopo" typeface="Microsoft JhengHei"/>
+        <a:font script="Java" typeface="Javanese Text"/>
+        <a:font script="Lisu" typeface="Segoe UI"/>
+        <a:font script="Mymr" typeface="Myanmar Text"/>
+        <a:font script="Nkoo" typeface="Ebrima"/>
+        <a:font script="Olck" typeface="Nirmala UI"/>
+        <a:font script="Osma" typeface="Ebrima"/>
+        <a:font script="Phag" typeface="Phagspa"/>
+        <a:font script="Syrn" typeface="Estrangelo Edessa"/>
+        <a:font script="Syrj" typeface="Estrangelo Edessa"/>
+        <a:font script="Syre" typeface="Estrangelo Edessa"/>
+        <a:font script="Sora" typeface="Nirmala UI"/>
+        <a:font script="Tale" typeface="Microsoft Tai Le"/>
+        <a:font script="Talu" typeface="Microsoft New Tai Lue"/>
+        <a:font script="Tfng" typeface="Ebrima"/>
+      </a:majorFont>
+      <a:minorFont>
+        <a:latin typeface="Calibri" panose="020F0502020204030204"/>
+        <a:ea typeface=""/>
+        <a:cs typeface=""/>
+        <a:font script="Jpan" typeface="游ゴシック"/>
+        <a:font script="Hang" typeface="맑은 고딕"/>
+        <a:font script="Hans" typeface="等线"/>
+        <a:font script="Hant" typeface="新細明體"/>
+        <a:font script="Arab" typeface="Arial"/>
+        <a:font script="Hebr" typeface="Arial"/>
+        <a:font script="Thai" typeface="Cordia New"/>
+        <a:font script="Ethi" typeface="Nyala"/>
+        <a:font script="Beng" typeface="Vrinda"/>
+        <a:font script="Gujr" typeface="Shruti"/>
+        <a:font script="Khmr" typeface="DaunPenh"/>
+        <a:font script="Knda" typeface="Tunga"/>
+        <a:font script="Guru" typeface="Raavi"/>
+        <a:font script="Cans" typeface="Euphemia"/>
+        <a:font script="Cher" typeface="Plantagenet Cherokee"/>
+        <a:font script="Yiii" typeface="Microsoft Yi Baiti"/>
+        <a:font script="Tibt" typeface="Microsoft Himalaya"/>
+        <a:font script="Thaa" typeface="MV Boli"/>
+        <a:font script="Deva" typeface="Mangal"/>
+        <a:font script="Telu" typeface="Gautami"/>
+        <a:font script="Taml" typeface="Latha"/>
+        <a:font script="Syrc" typeface="Estrangelo Edessa"/>
+        <a:font script="Orya" typeface="Kalinga"/>
+        <a:font script="Mlym" typeface="Kartika"/>
+        <a:font script="Laoo" typeface="DokChampa"/>
+        <a:font script="Sinh" typeface="Iskoola Pota"/>
+        <a:font script="Mong" typeface="Mongolian Baiti"/>
+        <a:font script="Viet" typeface="Arial"/>
+        <a:font script="Uigh" typeface="Microsoft Uighur"/>
+        <a:font script="Geor" typeface="Sylfaen"/>
+        <a:font script="Armn" typeface="Arial"/>
+        <a:font script="Bugi" typeface="Leelawadee UI"/>
+        <a:font script="Bopo" typeface="Microsoft JhengHei"/>
+        <a:font script="Java" typeface="Javanese Text"/>
+        <a:font script="Lisu" typeface="Segoe UI"/>
+        <a:font script="Mymr" typeface="Myanmar Text"/>
+        <a:font script="Nkoo" typeface="Ebrima"/>
+        <a:font script="Olck" typeface="Nirmala UI"/>
+        <a:font script="Osma" typeface="Ebrima"/>
+        <a:font script="Phag" typeface="Phagspa"/>
+        <a:font script="Syrn" typeface="Estrangelo Edessa"/>
+        <a:font script="Syrj" typeface="Estrangelo Edessa"/>
+        <a:font script="Syre" typeface="Estrangelo Edessa"/>
+        <a:font script="Sora" typeface="Nirmala UI"/>
+        <a:font script="Tale" typeface="Microsoft Tai Le"/>
+        <a:font script="Talu" typeface="Microsoft New Tai Lue"/>
+        <a:font script="Tfng" typeface="Ebrima"/>
+      </a:minorFont>
+    </a:fontScheme>
+    <a:fmtScheme name="Office">
+      <a:fillStyleLst>
+        <a:solidFill>
+          <a:schemeClr val="phClr"/>
+        </a:solidFill>
+        <a:gradFill rotWithShape="1">
+          <a:gsLst>
+            <a:gs pos="0">
+              <a:schemeClr val="phClr">
+                <a:lumMod val="110000"/>
+                <a:satMod val="105000"/>
+                <a:tint val="67000"/>
+              </a:schemeClr>
+            </a:gs>
+            <a:gs pos="50000">
+              <a:schemeClr val="phClr">
+                <a:lumMod val="105000"/>
+                <a:satMod val="103000"/>
+                <a:tint val="73000"/>
+              </a:schemeClr>
+            </a:gs>
+            <a:gs pos="100000">
+              <a:schemeClr val="phClr">
+                <a:lumMod val="105000"/>
+                <a:satMod val="109000"/>
+                <a:tint val="81000"/>
+              </a:schemeClr>
+            </a:gs>
+          </a:gsLst>
+          <a:lin ang="5400000" scaled="0"/>
+        </a:gradFill>
+        <a:gradFill rotWithShape="1">
+          <a:gsLst>
+            <a:gs pos="0">
+              <a:schemeClr val="phClr">
+                <a:satMod val="103000"/>
+                <a:lumMod val="102000"/>
+                <a:tint val="94000"/>
+              </a:schemeClr>
+            </a:gs>
+            <a:gs pos="50000">
+              <a:schemeClr val="phClr">
+                <a:satMod val="110000"/>
+                <a:lumMod val="100000"/>
+                <a:shade val="100000"/>
+              </a:schemeClr>
+            </a:gs>
+            <a:gs pos="100000">
+              <a:schemeClr val="phClr">
+                <a:lumMod val="99000"/>
+                <a:satMod val="120000"/>
+                <a:shade val="78000"/>
+              </a:schemeClr>
+            </a:gs>
+          </a:gsLst>
+          <a:lin ang="5400000" scaled="0"/>
+        </a:gradFill>
+      </a:fillStyleLst>
+      <a:lnStyleLst>
+        <a:ln w="6350" cap="flat" cmpd="sng" algn="ctr">
+          <a:solidFill>
+            <a:schemeClr val="phClr"/>
+          </a:solidFill>
+          <a:prstDash val="solid"/>
+          <a:miter lim="800000"/>
+        </a:ln>
+        <a:ln w="12700" cap="flat" cmpd="sng" algn="ctr">
+          <a:solidFill>
+            <a:schemeClr val="phClr"/>
+          </a:solidFill>
+          <a:prstDash val="solid"/>
+          <a:miter lim="800000"/>
+        </a:ln>
+        <a:ln w="19050" cap="flat" cmpd="sng" algn="ctr">
+          <a:solidFill>
+            <a:schemeClr val="phClr"/>
+          </a:solidFill>
+          <a:prstDash val="solid"/>
+          <a:miter lim="800000"/>
+        </a:ln>
+      </a:lnStyleLst>
+      <a:effectStyleLst>
+        <a:effectStyle>
+          <a:effectLst/>
+        </a:effectStyle>
+        <a:effectStyle>
+          <a:effectLst/>
+        </a:effectStyle>
+        <a:effectStyle>
+          <a:effectLst>
+            <a:outerShdw blurRad="57150" dist="19050" dir="5400000" algn="ctr" rotWithShape="0">
+              <a:srgbClr val="000000">
+                <a:alpha val="63000"/>
+              </a:srgbClr>
+            </a:outerShdw>
+          </a:effectLst>
+        </a:effectStyle>
+      </a:effectStyleLst>
+      <a:bgFillStyleLst>
+        <a:solidFill>
+          <a:schemeClr val="phClr"/>
+        </a:solidFill>
+        <a:solidFill>
+          <a:schemeClr val="phClr">
+            <a:tint val="95000"/>
+            <a:satMod val="170000"/>
+          </a:schemeClr>
+        </a:solidFill>
+        <a:gradFill rotWithShape="1">
+          <a:gsLst>
+            <a:gs pos="0">
+              <a:schemeClr val="phClr">
+                <a:tint val="93000"/>
+                <a:satMod val="150000"/>
+                <a:shade val="98000"/>
+                <a:lumMod val="102000"/>
+              </a:schemeClr>
+            </a:gs>
+            <a:gs pos="50000">
+              <a:schemeClr val="phClr">
+                <a:tint val="98000"/>
+                <a:satMod val="130000"/>
+                <a:shade val="90000"/>
+                <a:lumMod val="103000"/>
+              </a:schemeClr>
+            </a:gs>
+            <a:gs pos="100000">
+              <a:schemeClr val="phClr">
+                <a:shade val="63000"/>
+                <a:satMod val="120000"/>
+              </a:schemeClr>
+            </a:gs>
+          </a:gsLst>
+          <a:lin ang="5400000" scaled="0"/>
+        </a:gradFill>
+      </a:bgFillStyleLst>
+    </a:fmtScheme>
+  </a:themeElements>
+  <a:objectDefaults/>
+  <a:extraClrSchemeLst/>
+  <a:extLst>
+    <a:ext uri="{05A4C25C-085E-4340-85A3-A5531E510DB2}">
+      <thm15:themeFamily xmlns:thm15="http://schemas.microsoft.com/office/thememl/2012/main" name="Office Theme" id="{62F939B6-93AF-4DB8-9C6B-D6C7DFDC589F}" vid="{4A3C46E8-61CC-4603-A589-7422A47A8E4A}"/>
+    </a:ext>
+  </a:extLst>
+</a:theme>
 </file>
</xml_diff>

<commit_message>
begin adding text to Rmd file
</commit_message>
<xml_diff>
--- a/Rundown-of-our-3-months.pptx
+++ b/Rundown-of-our-3-months.pptx
@@ -3962,19 +3962,46 @@
           <a:p>
             <a:r>
               <a:rPr lang="en-GB" dirty="0"/>
-              <a:t>Codon pairs </a:t>
-            </a:r>
-          </a:p>
-          <a:p>
-            <a:r>
-              <a:rPr lang="en-GB" dirty="0"/>
-              <a:t>Single codons </a:t>
-            </a:r>
-          </a:p>
-          <a:p>
-            <a:r>
-              <a:rPr lang="en-GB" dirty="0"/>
-              <a:t>Nucleotides</a:t>
+              <a:t>The goal of Sophie’s undergrad project was to investigate inhibitory codon pairs. This would be done by </a:t>
+            </a:r>
+          </a:p>
+          <a:p>
+            <a:endParaRPr lang="en-GB" dirty="0"/>
+          </a:p>
+          <a:p>
+            <a:r>
+              <a:rPr lang="en-GB" dirty="0"/>
+              <a:t>There are currently 3 scripts, which are running but need some refactoring:</a:t>
+            </a:r>
+          </a:p>
+          <a:p>
+            <a:pPr lvl="1">
+              <a:buFontTx/>
+              <a:buChar char="-"/>
+            </a:pPr>
+            <a:r>
+              <a:rPr lang="en-GB" dirty="0"/>
+              <a:t>A script for codon pairs </a:t>
+            </a:r>
+          </a:p>
+          <a:p>
+            <a:pPr lvl="1">
+              <a:buFontTx/>
+              <a:buChar char="-"/>
+            </a:pPr>
+            <a:r>
+              <a:rPr lang="en-GB" dirty="0"/>
+              <a:t>A script for single codons </a:t>
+            </a:r>
+          </a:p>
+          <a:p>
+            <a:pPr lvl="1">
+              <a:buFontTx/>
+              <a:buChar char="-"/>
+            </a:pPr>
+            <a:r>
+              <a:rPr lang="en-GB" dirty="0"/>
+              <a:t>A script that works by nucleotide position</a:t>
             </a:r>
           </a:p>
         </p:txBody>
@@ -4062,7 +4089,7 @@
         </p:blipFill>
         <p:spPr>
           <a:xfrm>
-            <a:off x="7099804" y="4747734"/>
+            <a:off x="7099804" y="4423958"/>
             <a:ext cx="4171950" cy="1862930"/>
           </a:xfrm>
           <a:prstGeom prst="rect">
@@ -4096,7 +4123,7 @@
         </p:blipFill>
         <p:spPr>
           <a:xfrm>
-            <a:off x="2230773" y="4524131"/>
+            <a:off x="2250041" y="4404908"/>
             <a:ext cx="1571625" cy="1901030"/>
           </a:xfrm>
           <a:prstGeom prst="rect">
@@ -4290,7 +4317,7 @@
         </p:nvSpPr>
         <p:spPr>
           <a:xfrm rot="5400000">
-            <a:off x="8563049" y="3760609"/>
+            <a:off x="8563049" y="3459487"/>
             <a:ext cx="880844" cy="364615"/>
           </a:xfrm>
           <a:prstGeom prst="rightArrow">
@@ -4318,7 +4345,7 @@
           <a:lstStyle/>
           <a:p>
             <a:pPr algn="ctr"/>
-            <a:endParaRPr lang="en-GB"/>
+            <a:endParaRPr lang="en-GB" dirty="0"/>
           </a:p>
         </p:txBody>
       </p:sp>
@@ -4382,7 +4409,7 @@
         </p:nvSpPr>
         <p:spPr>
           <a:xfrm>
-            <a:off x="9654505" y="3523338"/>
+            <a:off x="9654505" y="3247981"/>
             <a:ext cx="1851302" cy="715089"/>
           </a:xfrm>
           <a:prstGeom prst="roundRect">
@@ -4480,7 +4507,7 @@
         </p:nvSpPr>
         <p:spPr>
           <a:xfrm>
-            <a:off x="6893766" y="3415911"/>
+            <a:off x="6824221" y="3190028"/>
             <a:ext cx="2066488" cy="830997"/>
           </a:xfrm>
           <a:prstGeom prst="rect">

</xml_diff>